<commit_message>
CustomPlugin.zip updated Presentation remade logo and business card added
</commit_message>
<xml_diff>
--- a/Presentation/Presentation.pptx
+++ b/Presentation/Presentation.pptx
@@ -5,7 +5,7 @@
     <p:sldMasterId id="2147483648" r:id="rId1"/>
   </p:sldMasterIdLst>
   <p:notesMasterIdLst>
-    <p:notesMasterId r:id="rId23"/>
+    <p:notesMasterId r:id="rId22"/>
   </p:notesMasterIdLst>
   <p:sldIdLst>
     <p:sldId id="256" r:id="rId2"/>
@@ -16,19 +16,18 @@
     <p:sldId id="263" r:id="rId7"/>
     <p:sldId id="265" r:id="rId8"/>
     <p:sldId id="266" r:id="rId9"/>
-    <p:sldId id="275" r:id="rId10"/>
-    <p:sldId id="267" r:id="rId11"/>
-    <p:sldId id="269" r:id="rId12"/>
-    <p:sldId id="277" r:id="rId13"/>
-    <p:sldId id="268" r:id="rId14"/>
-    <p:sldId id="276" r:id="rId15"/>
-    <p:sldId id="270" r:id="rId16"/>
-    <p:sldId id="271" r:id="rId17"/>
+    <p:sldId id="270" r:id="rId10"/>
+    <p:sldId id="271" r:id="rId11"/>
+    <p:sldId id="275" r:id="rId12"/>
+    <p:sldId id="267" r:id="rId13"/>
+    <p:sldId id="269" r:id="rId14"/>
+    <p:sldId id="277" r:id="rId15"/>
+    <p:sldId id="276" r:id="rId16"/>
+    <p:sldId id="281" r:id="rId17"/>
     <p:sldId id="273" r:id="rId18"/>
     <p:sldId id="272" r:id="rId19"/>
     <p:sldId id="280" r:id="rId20"/>
-    <p:sldId id="274" r:id="rId21"/>
-    <p:sldId id="279" r:id="rId22"/>
+    <p:sldId id="279" r:id="rId21"/>
   </p:sldIdLst>
   <p:sldSz cx="9144000" cy="6858000" type="screen4x3"/>
   <p:notesSz cx="6858000" cy="9144000"/>
@@ -1625,6 +1624,378 @@
 </file>
 
 <file path=ppt/diagrams/data1.xml><?xml version="1.0" encoding="utf-8"?>
+<dgm:dataModel xmlns:dgm="http://schemas.openxmlformats.org/drawingml/2006/diagram" xmlns:a="http://schemas.openxmlformats.org/drawingml/2006/main">
+  <dgm:ptLst>
+    <dgm:pt modelId="{96F52D17-C89A-4D45-B6F6-8333BDBD40FA}" type="doc">
+      <dgm:prSet loTypeId="urn:microsoft.com/office/officeart/2005/8/layout/equation2" loCatId="process" qsTypeId="urn:microsoft.com/office/officeart/2005/8/quickstyle/simple1" qsCatId="simple" csTypeId="urn:microsoft.com/office/officeart/2005/8/colors/accent1_2" csCatId="accent1" phldr="1"/>
+      <dgm:spPr/>
+      <dgm:t>
+        <a:bodyPr/>
+        <a:lstStyle/>
+        <a:p>
+          <a:endParaRPr lang="en-US"/>
+        </a:p>
+      </dgm:t>
+    </dgm:pt>
+    <dgm:pt modelId="{1C23360A-8060-44C1-8685-C8BFD07AE3E8}">
+      <dgm:prSet phldrT="[Text]" custT="1"/>
+      <dgm:spPr>
+        <a:solidFill>
+          <a:srgbClr val="1B325F"/>
+        </a:solidFill>
+      </dgm:spPr>
+      <dgm:t>
+        <a:bodyPr/>
+        <a:lstStyle/>
+        <a:p>
+          <a:r>
+            <a:rPr lang="bg-BG" sz="2500" dirty="0" smtClean="0"/>
+            <a:t>граматика</a:t>
+          </a:r>
+        </a:p>
+      </dgm:t>
+    </dgm:pt>
+    <dgm:pt modelId="{F5D5CAB6-D040-4704-92C8-62D6070F9CB4}" type="parTrans" cxnId="{18D15E44-9AE5-4808-AF6F-CEE336F98BCE}">
+      <dgm:prSet/>
+      <dgm:spPr/>
+      <dgm:t>
+        <a:bodyPr/>
+        <a:lstStyle/>
+        <a:p>
+          <a:endParaRPr lang="en-US"/>
+        </a:p>
+      </dgm:t>
+    </dgm:pt>
+    <dgm:pt modelId="{7E09360A-0109-4556-ABBF-2F8710B5F41F}" type="sibTrans" cxnId="{18D15E44-9AE5-4808-AF6F-CEE336F98BCE}">
+      <dgm:prSet/>
+      <dgm:spPr/>
+      <dgm:t>
+        <a:bodyPr/>
+        <a:lstStyle/>
+        <a:p>
+          <a:endParaRPr lang="en-US"/>
+        </a:p>
+      </dgm:t>
+    </dgm:pt>
+    <dgm:pt modelId="{78ECF61E-CBFF-4E50-BFF2-F222D05BE009}">
+      <dgm:prSet phldrT="[Text]"/>
+      <dgm:spPr>
+        <a:solidFill>
+          <a:srgbClr val="3A89C9"/>
+        </a:solidFill>
+      </dgm:spPr>
+      <dgm:t>
+        <a:bodyPr/>
+        <a:lstStyle/>
+        <a:p>
+          <a:r>
+            <a:rPr lang="bg-BG" dirty="0" smtClean="0"/>
+            <a:t>екшън</a:t>
+          </a:r>
+          <a:endParaRPr lang="en-US" dirty="0"/>
+        </a:p>
+      </dgm:t>
+    </dgm:pt>
+    <dgm:pt modelId="{CAC25EDC-63C0-47ED-BC98-477FDCB1E189}" type="parTrans" cxnId="{B9E4C260-0816-4753-A4C2-4314846D4018}">
+      <dgm:prSet/>
+      <dgm:spPr/>
+      <dgm:t>
+        <a:bodyPr/>
+        <a:lstStyle/>
+        <a:p>
+          <a:endParaRPr lang="en-US"/>
+        </a:p>
+      </dgm:t>
+    </dgm:pt>
+    <dgm:pt modelId="{581CEC73-21E6-4AB5-B834-EA2D52C29905}" type="sibTrans" cxnId="{B9E4C260-0816-4753-A4C2-4314846D4018}">
+      <dgm:prSet/>
+      <dgm:spPr/>
+      <dgm:t>
+        <a:bodyPr/>
+        <a:lstStyle/>
+        <a:p>
+          <a:endParaRPr lang="en-US"/>
+        </a:p>
+      </dgm:t>
+    </dgm:pt>
+    <dgm:pt modelId="{20CDA44D-C0C4-4723-B1DC-10A474BAF97E}">
+      <dgm:prSet phldrT="[Text]" custT="1"/>
+      <dgm:spPr>
+        <a:solidFill>
+          <a:srgbClr val="9CC4E4"/>
+        </a:solidFill>
+      </dgm:spPr>
+      <dgm:t>
+        <a:bodyPr/>
+        <a:lstStyle/>
+        <a:p>
+          <a:r>
+            <a:rPr lang="bg-BG" sz="2500" dirty="0" smtClean="0">
+              <a:solidFill>
+                <a:srgbClr val="1B325F"/>
+              </a:solidFill>
+            </a:rPr>
+            <a:t>код</a:t>
+          </a:r>
+          <a:endParaRPr lang="en-US" sz="2500" dirty="0">
+            <a:solidFill>
+              <a:srgbClr val="1B325F"/>
+            </a:solidFill>
+          </a:endParaRPr>
+        </a:p>
+      </dgm:t>
+    </dgm:pt>
+    <dgm:pt modelId="{60767CD1-0A42-472D-AA77-275399564B6A}" type="parTrans" cxnId="{7054B064-C515-4DF4-B969-C1B362A1B895}">
+      <dgm:prSet/>
+      <dgm:spPr/>
+      <dgm:t>
+        <a:bodyPr/>
+        <a:lstStyle/>
+        <a:p>
+          <a:endParaRPr lang="en-US"/>
+        </a:p>
+      </dgm:t>
+    </dgm:pt>
+    <dgm:pt modelId="{C0CF3166-ED11-4259-921B-A4610FD18BF4}" type="sibTrans" cxnId="{7054B064-C515-4DF4-B969-C1B362A1B895}">
+      <dgm:prSet/>
+      <dgm:spPr/>
+      <dgm:t>
+        <a:bodyPr/>
+        <a:lstStyle/>
+        <a:p>
+          <a:endParaRPr lang="en-US"/>
+        </a:p>
+      </dgm:t>
+    </dgm:pt>
+    <dgm:pt modelId="{56EED3BA-025F-4048-9561-952881CB8F9E}">
+      <dgm:prSet phldrT="[Text]"/>
+      <dgm:spPr>
+        <a:solidFill>
+          <a:srgbClr val="F26C4F"/>
+        </a:solidFill>
+      </dgm:spPr>
+      <dgm:t>
+        <a:bodyPr/>
+        <a:lstStyle/>
+        <a:p>
+          <a:r>
+            <a:rPr lang="bg-BG" dirty="0" smtClean="0">
+              <a:solidFill>
+                <a:srgbClr val="E9F2F9"/>
+              </a:solidFill>
+            </a:rPr>
+            <a:t>добавка</a:t>
+          </a:r>
+          <a:endParaRPr lang="en-US" dirty="0">
+            <a:solidFill>
+              <a:srgbClr val="E9F2F9"/>
+            </a:solidFill>
+          </a:endParaRPr>
+        </a:p>
+      </dgm:t>
+    </dgm:pt>
+    <dgm:pt modelId="{BD2DA580-A868-40AB-A889-06D3E988D3FC}" type="parTrans" cxnId="{443EF97F-8171-43AA-B2A7-0A0875DCC1F9}">
+      <dgm:prSet/>
+      <dgm:spPr/>
+      <dgm:t>
+        <a:bodyPr/>
+        <a:lstStyle/>
+        <a:p>
+          <a:endParaRPr lang="en-US"/>
+        </a:p>
+      </dgm:t>
+    </dgm:pt>
+    <dgm:pt modelId="{C5F974B9-BD3F-4DFF-AB61-1B8ADE86907E}" type="sibTrans" cxnId="{443EF97F-8171-43AA-B2A7-0A0875DCC1F9}">
+      <dgm:prSet/>
+      <dgm:spPr/>
+      <dgm:t>
+        <a:bodyPr/>
+        <a:lstStyle/>
+        <a:p>
+          <a:endParaRPr lang="en-US"/>
+        </a:p>
+      </dgm:t>
+    </dgm:pt>
+    <dgm:pt modelId="{D8F7DB6D-AE93-46FE-B19F-70775B96783C}" type="pres">
+      <dgm:prSet presAssocID="{96F52D17-C89A-4D45-B6F6-8333BDBD40FA}" presName="Name0" presStyleCnt="0">
+        <dgm:presLayoutVars>
+          <dgm:dir/>
+          <dgm:resizeHandles val="exact"/>
+        </dgm:presLayoutVars>
+      </dgm:prSet>
+      <dgm:spPr/>
+      <dgm:t>
+        <a:bodyPr/>
+        <a:lstStyle/>
+        <a:p>
+          <a:endParaRPr lang="en-US"/>
+        </a:p>
+      </dgm:t>
+    </dgm:pt>
+    <dgm:pt modelId="{689F2C73-C735-49F7-AFDE-0D51A40BB8D3}" type="pres">
+      <dgm:prSet presAssocID="{96F52D17-C89A-4D45-B6F6-8333BDBD40FA}" presName="vNodes" presStyleCnt="0"/>
+      <dgm:spPr/>
+    </dgm:pt>
+    <dgm:pt modelId="{49AE4FB7-DE33-441D-98DF-87A073531280}" type="pres">
+      <dgm:prSet presAssocID="{1C23360A-8060-44C1-8685-C8BFD07AE3E8}" presName="node" presStyleLbl="node1" presStyleIdx="0" presStyleCnt="4" custScaleX="188720" custScaleY="188720" custLinFactX="-6782" custLinFactY="11984" custLinFactNeighborX="-100000" custLinFactNeighborY="100000">
+        <dgm:presLayoutVars>
+          <dgm:bulletEnabled val="1"/>
+        </dgm:presLayoutVars>
+      </dgm:prSet>
+      <dgm:spPr/>
+      <dgm:t>
+        <a:bodyPr/>
+        <a:lstStyle/>
+        <a:p>
+          <a:endParaRPr lang="en-US"/>
+        </a:p>
+      </dgm:t>
+    </dgm:pt>
+    <dgm:pt modelId="{E73BFC8B-D7F7-4E30-919D-89ADE7F7AF8A}" type="pres">
+      <dgm:prSet presAssocID="{7E09360A-0109-4556-ABBF-2F8710B5F41F}" presName="spacerT" presStyleCnt="0"/>
+      <dgm:spPr/>
+    </dgm:pt>
+    <dgm:pt modelId="{304946E5-8BED-4B93-84BE-58F9FAA59C58}" type="pres">
+      <dgm:prSet presAssocID="{7E09360A-0109-4556-ABBF-2F8710B5F41F}" presName="sibTrans" presStyleLbl="sibTrans2D1" presStyleIdx="0" presStyleCnt="3" custLinFactX="-46923" custLinFactY="24637" custLinFactNeighborX="-100000" custLinFactNeighborY="100000"/>
+      <dgm:spPr/>
+      <dgm:t>
+        <a:bodyPr/>
+        <a:lstStyle/>
+        <a:p>
+          <a:endParaRPr lang="en-US"/>
+        </a:p>
+      </dgm:t>
+    </dgm:pt>
+    <dgm:pt modelId="{51B0C90B-7B3B-444C-9FEE-CE8E92B661F7}" type="pres">
+      <dgm:prSet presAssocID="{7E09360A-0109-4556-ABBF-2F8710B5F41F}" presName="spacerB" presStyleCnt="0"/>
+      <dgm:spPr/>
+    </dgm:pt>
+    <dgm:pt modelId="{F4BD5001-98BC-4CAF-A4B4-FE38A3578189}" type="pres">
+      <dgm:prSet presAssocID="{78ECF61E-CBFF-4E50-BFF2-F222D05BE009}" presName="node" presStyleLbl="node1" presStyleIdx="1" presStyleCnt="4" custScaleX="67473" custScaleY="67473" custLinFactY="10643" custLinFactNeighborX="-58536" custLinFactNeighborY="100000">
+        <dgm:presLayoutVars>
+          <dgm:bulletEnabled val="1"/>
+        </dgm:presLayoutVars>
+      </dgm:prSet>
+      <dgm:spPr/>
+      <dgm:t>
+        <a:bodyPr/>
+        <a:lstStyle/>
+        <a:p>
+          <a:endParaRPr lang="en-US"/>
+        </a:p>
+      </dgm:t>
+    </dgm:pt>
+    <dgm:pt modelId="{8EED3F09-6917-4248-A008-80CE97AFC401}" type="pres">
+      <dgm:prSet presAssocID="{581CEC73-21E6-4AB5-B834-EA2D52C29905}" presName="spacerT" presStyleCnt="0"/>
+      <dgm:spPr/>
+    </dgm:pt>
+    <dgm:pt modelId="{03D53D0F-AAE4-48D7-91CE-E77947BCC36C}" type="pres">
+      <dgm:prSet presAssocID="{581CEC73-21E6-4AB5-B834-EA2D52C29905}" presName="sibTrans" presStyleLbl="sibTrans2D1" presStyleIdx="1" presStyleCnt="3" custLinFactNeighborX="9751" custLinFactNeighborY="18645"/>
+      <dgm:spPr/>
+      <dgm:t>
+        <a:bodyPr/>
+        <a:lstStyle/>
+        <a:p>
+          <a:endParaRPr lang="en-US"/>
+        </a:p>
+      </dgm:t>
+    </dgm:pt>
+    <dgm:pt modelId="{117B23CB-228C-47CE-93BD-4C79E3772A9B}" type="pres">
+      <dgm:prSet presAssocID="{581CEC73-21E6-4AB5-B834-EA2D52C29905}" presName="spacerB" presStyleCnt="0"/>
+      <dgm:spPr/>
+    </dgm:pt>
+    <dgm:pt modelId="{28ED2C84-C598-48FF-B846-8BE54247FCC0}" type="pres">
+      <dgm:prSet presAssocID="{20CDA44D-C0C4-4723-B1DC-10A474BAF97E}" presName="node" presStyleLbl="node1" presStyleIdx="2" presStyleCnt="4" custScaleX="137192" custScaleY="137192" custLinFactY="-5371" custLinFactNeighborX="49373" custLinFactNeighborY="-100000">
+        <dgm:presLayoutVars>
+          <dgm:bulletEnabled val="1"/>
+        </dgm:presLayoutVars>
+      </dgm:prSet>
+      <dgm:spPr/>
+      <dgm:t>
+        <a:bodyPr/>
+        <a:lstStyle/>
+        <a:p>
+          <a:endParaRPr lang="en-US"/>
+        </a:p>
+      </dgm:t>
+    </dgm:pt>
+    <dgm:pt modelId="{556515D3-80A7-4A95-AE4C-7BCC53831641}" type="pres">
+      <dgm:prSet presAssocID="{96F52D17-C89A-4D45-B6F6-8333BDBD40FA}" presName="sibTransLast" presStyleLbl="sibTrans2D1" presStyleIdx="2" presStyleCnt="3" custAng="19446719" custScaleX="210409" custLinFactY="181206" custLinFactNeighborX="16482" custLinFactNeighborY="200000"/>
+      <dgm:spPr/>
+      <dgm:t>
+        <a:bodyPr/>
+        <a:lstStyle/>
+        <a:p>
+          <a:endParaRPr lang="en-US"/>
+        </a:p>
+      </dgm:t>
+    </dgm:pt>
+    <dgm:pt modelId="{02501D2C-622B-4345-9CB5-7188C1A5B2AF}" type="pres">
+      <dgm:prSet presAssocID="{96F52D17-C89A-4D45-B6F6-8333BDBD40FA}" presName="connectorText" presStyleLbl="sibTrans2D1" presStyleIdx="2" presStyleCnt="3"/>
+      <dgm:spPr/>
+      <dgm:t>
+        <a:bodyPr/>
+        <a:lstStyle/>
+        <a:p>
+          <a:endParaRPr lang="en-US"/>
+        </a:p>
+      </dgm:t>
+    </dgm:pt>
+    <dgm:pt modelId="{40E2E155-CB0B-48BC-8111-00B0B3FEBA0E}" type="pres">
+      <dgm:prSet presAssocID="{96F52D17-C89A-4D45-B6F6-8333BDBD40FA}" presName="lastNode" presStyleLbl="node1" presStyleIdx="3" presStyleCnt="4" custScaleX="168239" custScaleY="168239" custLinFactX="14028" custLinFactNeighborX="100000" custLinFactNeighborY="-38854">
+        <dgm:presLayoutVars>
+          <dgm:bulletEnabled val="1"/>
+        </dgm:presLayoutVars>
+      </dgm:prSet>
+      <dgm:spPr/>
+      <dgm:t>
+        <a:bodyPr/>
+        <a:lstStyle/>
+        <a:p>
+          <a:endParaRPr lang="en-US"/>
+        </a:p>
+      </dgm:t>
+    </dgm:pt>
+  </dgm:ptLst>
+  <dgm:cxnLst>
+    <dgm:cxn modelId="{443EF97F-8171-43AA-B2A7-0A0875DCC1F9}" srcId="{96F52D17-C89A-4D45-B6F6-8333BDBD40FA}" destId="{56EED3BA-025F-4048-9561-952881CB8F9E}" srcOrd="3" destOrd="0" parTransId="{BD2DA580-A868-40AB-A889-06D3E988D3FC}" sibTransId="{C5F974B9-BD3F-4DFF-AB61-1B8ADE86907E}"/>
+    <dgm:cxn modelId="{18D15E44-9AE5-4808-AF6F-CEE336F98BCE}" srcId="{96F52D17-C89A-4D45-B6F6-8333BDBD40FA}" destId="{1C23360A-8060-44C1-8685-C8BFD07AE3E8}" srcOrd="0" destOrd="0" parTransId="{F5D5CAB6-D040-4704-92C8-62D6070F9CB4}" sibTransId="{7E09360A-0109-4556-ABBF-2F8710B5F41F}"/>
+    <dgm:cxn modelId="{4A268223-E174-45E8-9DB5-7F2CD2F01465}" type="presOf" srcId="{1C23360A-8060-44C1-8685-C8BFD07AE3E8}" destId="{49AE4FB7-DE33-441D-98DF-87A073531280}" srcOrd="0" destOrd="0" presId="urn:microsoft.com/office/officeart/2005/8/layout/equation2"/>
+    <dgm:cxn modelId="{268580E6-5848-4D6C-9BED-B1AC598C6D9F}" type="presOf" srcId="{96F52D17-C89A-4D45-B6F6-8333BDBD40FA}" destId="{D8F7DB6D-AE93-46FE-B19F-70775B96783C}" srcOrd="0" destOrd="0" presId="urn:microsoft.com/office/officeart/2005/8/layout/equation2"/>
+    <dgm:cxn modelId="{197980A2-F6C7-4436-86D0-A555692B4D62}" type="presOf" srcId="{7E09360A-0109-4556-ABBF-2F8710B5F41F}" destId="{304946E5-8BED-4B93-84BE-58F9FAA59C58}" srcOrd="0" destOrd="0" presId="urn:microsoft.com/office/officeart/2005/8/layout/equation2"/>
+    <dgm:cxn modelId="{10957531-AB25-4F05-B184-02AA10877F27}" type="presOf" srcId="{78ECF61E-CBFF-4E50-BFF2-F222D05BE009}" destId="{F4BD5001-98BC-4CAF-A4B4-FE38A3578189}" srcOrd="0" destOrd="0" presId="urn:microsoft.com/office/officeart/2005/8/layout/equation2"/>
+    <dgm:cxn modelId="{437A5A22-C988-43AA-B9A1-E6F9F242D529}" type="presOf" srcId="{581CEC73-21E6-4AB5-B834-EA2D52C29905}" destId="{03D53D0F-AAE4-48D7-91CE-E77947BCC36C}" srcOrd="0" destOrd="0" presId="urn:microsoft.com/office/officeart/2005/8/layout/equation2"/>
+    <dgm:cxn modelId="{F530B6AD-F734-4E73-A164-AEC08AF75352}" type="presOf" srcId="{C0CF3166-ED11-4259-921B-A4610FD18BF4}" destId="{02501D2C-622B-4345-9CB5-7188C1A5B2AF}" srcOrd="1" destOrd="0" presId="urn:microsoft.com/office/officeart/2005/8/layout/equation2"/>
+    <dgm:cxn modelId="{7054B064-C515-4DF4-B969-C1B362A1B895}" srcId="{96F52D17-C89A-4D45-B6F6-8333BDBD40FA}" destId="{20CDA44D-C0C4-4723-B1DC-10A474BAF97E}" srcOrd="2" destOrd="0" parTransId="{60767CD1-0A42-472D-AA77-275399564B6A}" sibTransId="{C0CF3166-ED11-4259-921B-A4610FD18BF4}"/>
+    <dgm:cxn modelId="{FA43E27F-52F8-4E88-9409-A19C90D4B86F}" type="presOf" srcId="{56EED3BA-025F-4048-9561-952881CB8F9E}" destId="{40E2E155-CB0B-48BC-8111-00B0B3FEBA0E}" srcOrd="0" destOrd="0" presId="urn:microsoft.com/office/officeart/2005/8/layout/equation2"/>
+    <dgm:cxn modelId="{B9E4C260-0816-4753-A4C2-4314846D4018}" srcId="{96F52D17-C89A-4D45-B6F6-8333BDBD40FA}" destId="{78ECF61E-CBFF-4E50-BFF2-F222D05BE009}" srcOrd="1" destOrd="0" parTransId="{CAC25EDC-63C0-47ED-BC98-477FDCB1E189}" sibTransId="{581CEC73-21E6-4AB5-B834-EA2D52C29905}"/>
+    <dgm:cxn modelId="{5519AEC8-4ED5-4B86-9910-C0B8711D13BC}" type="presOf" srcId="{C0CF3166-ED11-4259-921B-A4610FD18BF4}" destId="{556515D3-80A7-4A95-AE4C-7BCC53831641}" srcOrd="0" destOrd="0" presId="urn:microsoft.com/office/officeart/2005/8/layout/equation2"/>
+    <dgm:cxn modelId="{5AFDC22E-AD0F-4F5A-B3D4-19F4C398422E}" type="presOf" srcId="{20CDA44D-C0C4-4723-B1DC-10A474BAF97E}" destId="{28ED2C84-C598-48FF-B846-8BE54247FCC0}" srcOrd="0" destOrd="0" presId="urn:microsoft.com/office/officeart/2005/8/layout/equation2"/>
+    <dgm:cxn modelId="{A1BCC08C-5902-4391-A7D0-5881E284AB80}" type="presParOf" srcId="{D8F7DB6D-AE93-46FE-B19F-70775B96783C}" destId="{689F2C73-C735-49F7-AFDE-0D51A40BB8D3}" srcOrd="0" destOrd="0" presId="urn:microsoft.com/office/officeart/2005/8/layout/equation2"/>
+    <dgm:cxn modelId="{E5D6EEFD-14EA-48C9-96DC-E16F76700A7A}" type="presParOf" srcId="{689F2C73-C735-49F7-AFDE-0D51A40BB8D3}" destId="{49AE4FB7-DE33-441D-98DF-87A073531280}" srcOrd="0" destOrd="0" presId="urn:microsoft.com/office/officeart/2005/8/layout/equation2"/>
+    <dgm:cxn modelId="{1F9AC87A-7AEA-46FF-B853-458078DC11B3}" type="presParOf" srcId="{689F2C73-C735-49F7-AFDE-0D51A40BB8D3}" destId="{E73BFC8B-D7F7-4E30-919D-89ADE7F7AF8A}" srcOrd="1" destOrd="0" presId="urn:microsoft.com/office/officeart/2005/8/layout/equation2"/>
+    <dgm:cxn modelId="{4F3D71F3-E8B0-4415-A5F1-87D9B29A7BB0}" type="presParOf" srcId="{689F2C73-C735-49F7-AFDE-0D51A40BB8D3}" destId="{304946E5-8BED-4B93-84BE-58F9FAA59C58}" srcOrd="2" destOrd="0" presId="urn:microsoft.com/office/officeart/2005/8/layout/equation2"/>
+    <dgm:cxn modelId="{37D03DE6-F641-4085-AAB5-208717424473}" type="presParOf" srcId="{689F2C73-C735-49F7-AFDE-0D51A40BB8D3}" destId="{51B0C90B-7B3B-444C-9FEE-CE8E92B661F7}" srcOrd="3" destOrd="0" presId="urn:microsoft.com/office/officeart/2005/8/layout/equation2"/>
+    <dgm:cxn modelId="{B2FB042D-F8BE-4161-B919-2049DDA8517C}" type="presParOf" srcId="{689F2C73-C735-49F7-AFDE-0D51A40BB8D3}" destId="{F4BD5001-98BC-4CAF-A4B4-FE38A3578189}" srcOrd="4" destOrd="0" presId="urn:microsoft.com/office/officeart/2005/8/layout/equation2"/>
+    <dgm:cxn modelId="{F19F893F-E6F6-49C8-9CF6-959B431DAC52}" type="presParOf" srcId="{689F2C73-C735-49F7-AFDE-0D51A40BB8D3}" destId="{8EED3F09-6917-4248-A008-80CE97AFC401}" srcOrd="5" destOrd="0" presId="urn:microsoft.com/office/officeart/2005/8/layout/equation2"/>
+    <dgm:cxn modelId="{09E5FEAF-C7E8-412C-8B07-DC8E3663CA1B}" type="presParOf" srcId="{689F2C73-C735-49F7-AFDE-0D51A40BB8D3}" destId="{03D53D0F-AAE4-48D7-91CE-E77947BCC36C}" srcOrd="6" destOrd="0" presId="urn:microsoft.com/office/officeart/2005/8/layout/equation2"/>
+    <dgm:cxn modelId="{565F64B2-8BB6-4A19-B7CD-87F35D892F21}" type="presParOf" srcId="{689F2C73-C735-49F7-AFDE-0D51A40BB8D3}" destId="{117B23CB-228C-47CE-93BD-4C79E3772A9B}" srcOrd="7" destOrd="0" presId="urn:microsoft.com/office/officeart/2005/8/layout/equation2"/>
+    <dgm:cxn modelId="{F2397918-4193-440D-81F1-1568EF22B215}" type="presParOf" srcId="{689F2C73-C735-49F7-AFDE-0D51A40BB8D3}" destId="{28ED2C84-C598-48FF-B846-8BE54247FCC0}" srcOrd="8" destOrd="0" presId="urn:microsoft.com/office/officeart/2005/8/layout/equation2"/>
+    <dgm:cxn modelId="{95FFBCF8-3606-44D0-B1F9-260046CA94D0}" type="presParOf" srcId="{D8F7DB6D-AE93-46FE-B19F-70775B96783C}" destId="{556515D3-80A7-4A95-AE4C-7BCC53831641}" srcOrd="1" destOrd="0" presId="urn:microsoft.com/office/officeart/2005/8/layout/equation2"/>
+    <dgm:cxn modelId="{08EB8F12-562B-43B8-BF9B-B1BDB110E33D}" type="presParOf" srcId="{556515D3-80A7-4A95-AE4C-7BCC53831641}" destId="{02501D2C-622B-4345-9CB5-7188C1A5B2AF}" srcOrd="0" destOrd="0" presId="urn:microsoft.com/office/officeart/2005/8/layout/equation2"/>
+    <dgm:cxn modelId="{6A25723A-BDE4-4C56-900D-6318161D7605}" type="presParOf" srcId="{D8F7DB6D-AE93-46FE-B19F-70775B96783C}" destId="{40E2E155-CB0B-48BC-8111-00B0B3FEBA0E}" srcOrd="2" destOrd="0" presId="urn:microsoft.com/office/officeart/2005/8/layout/equation2"/>
+  </dgm:cxnLst>
+  <dgm:bg/>
+  <dgm:whole/>
+  <dgm:extLst>
+    <a:ext uri="http://schemas.microsoft.com/office/drawing/2008/diagram">
+      <dsp:dataModelExt xmlns:dsp="http://schemas.microsoft.com/office/drawing/2008/diagram" xmlns="" relId="rId6" minVer="http://schemas.openxmlformats.org/drawingml/2006/diagram"/>
+    </a:ext>
+  </dgm:extLst>
+</dgm:dataModel>
+</file>
+
+<file path=ppt/diagrams/data2.xml><?xml version="1.0" encoding="utf-8"?>
 <dgm:dataModel xmlns:dgm="http://schemas.openxmlformats.org/drawingml/2006/diagram" xmlns:a="http://schemas.openxmlformats.org/drawingml/2006/main">
   <dgm:ptLst>
     <dgm:pt modelId="{1565F46A-33E8-4FDB-836B-D3F88AA217D6}" type="doc">
@@ -3046,379 +3417,523 @@
 </dgm:dataModel>
 </file>
 
-<file path=ppt/diagrams/data2.xml><?xml version="1.0" encoding="utf-8"?>
-<dgm:dataModel xmlns:dgm="http://schemas.openxmlformats.org/drawingml/2006/diagram" xmlns:a="http://schemas.openxmlformats.org/drawingml/2006/main">
-  <dgm:ptLst>
-    <dgm:pt modelId="{96F52D17-C89A-4D45-B6F6-8333BDBD40FA}" type="doc">
-      <dgm:prSet loTypeId="urn:microsoft.com/office/officeart/2005/8/layout/equation2" loCatId="process" qsTypeId="urn:microsoft.com/office/officeart/2005/8/quickstyle/simple1" qsCatId="simple" csTypeId="urn:microsoft.com/office/officeart/2005/8/colors/accent1_2" csCatId="accent1" phldr="1"/>
-      <dgm:spPr/>
-      <dgm:t>
-        <a:bodyPr/>
-        <a:lstStyle/>
-        <a:p>
-          <a:endParaRPr lang="en-US"/>
-        </a:p>
-      </dgm:t>
-    </dgm:pt>
-    <dgm:pt modelId="{1C23360A-8060-44C1-8685-C8BFD07AE3E8}">
-      <dgm:prSet phldrT="[Text]" custT="1"/>
-      <dgm:spPr>
+<file path=ppt/diagrams/drawing1.xml><?xml version="1.0" encoding="utf-8"?>
+<dsp:drawing xmlns:dgm="http://schemas.openxmlformats.org/drawingml/2006/diagram" xmlns:a="http://schemas.openxmlformats.org/drawingml/2006/main" xmlns:dsp="http://schemas.microsoft.com/office/drawing/2008/diagram">
+  <dsp:spTree>
+    <dsp:nvGrpSpPr>
+      <dsp:cNvPr id="0" name=""/>
+      <dsp:cNvGrpSpPr/>
+    </dsp:nvGrpSpPr>
+    <dsp:grpSpPr/>
+    <dsp:sp modelId="{49AE4FB7-DE33-441D-98DF-87A073531280}">
+      <dsp:nvSpPr>
+        <dsp:cNvPr id="0" name=""/>
+        <dsp:cNvSpPr/>
+      </dsp:nvSpPr>
+      <dsp:spPr>
+        <a:xfrm>
+          <a:off x="136355" y="224123"/>
+          <a:ext cx="2095980" cy="2095980"/>
+        </a:xfrm>
+        <a:prstGeom prst="ellipse">
+          <a:avLst/>
+        </a:prstGeom>
         <a:solidFill>
           <a:srgbClr val="1B325F"/>
         </a:solidFill>
-      </dgm:spPr>
-      <dgm:t>
-        <a:bodyPr/>
+        <a:ln w="25400" cap="flat" cmpd="sng" algn="ctr">
+          <a:solidFill>
+            <a:schemeClr val="lt1">
+              <a:hueOff val="0"/>
+              <a:satOff val="0"/>
+              <a:lumOff val="0"/>
+              <a:alphaOff val="0"/>
+            </a:schemeClr>
+          </a:solidFill>
+          <a:prstDash val="solid"/>
+        </a:ln>
+        <a:effectLst/>
+      </dsp:spPr>
+      <dsp:style>
+        <a:lnRef idx="2">
+          <a:scrgbClr r="0" g="0" b="0"/>
+        </a:lnRef>
+        <a:fillRef idx="1">
+          <a:scrgbClr r="0" g="0" b="0"/>
+        </a:fillRef>
+        <a:effectRef idx="0">
+          <a:scrgbClr r="0" g="0" b="0"/>
+        </a:effectRef>
+        <a:fontRef idx="minor">
+          <a:schemeClr val="lt1"/>
+        </a:fontRef>
+      </dsp:style>
+      <dsp:txBody>
+        <a:bodyPr spcFirstLastPara="0" vert="horz" wrap="square" lIns="31750" tIns="31750" rIns="31750" bIns="31750" numCol="1" spcCol="1270" anchor="ctr" anchorCtr="0">
+          <a:noAutofit/>
+        </a:bodyPr>
         <a:lstStyle/>
         <a:p>
+          <a:pPr lvl="0" algn="ctr" defTabSz="1111250">
+            <a:lnSpc>
+              <a:spcPct val="90000"/>
+            </a:lnSpc>
+            <a:spcBef>
+              <a:spcPct val="0"/>
+            </a:spcBef>
+            <a:spcAft>
+              <a:spcPct val="35000"/>
+            </a:spcAft>
+          </a:pPr>
           <a:r>
-            <a:rPr lang="bg-BG" sz="2500" dirty="0" smtClean="0"/>
+            <a:rPr lang="bg-BG" sz="2500" kern="1200" dirty="0" smtClean="0"/>
             <a:t>граматика</a:t>
           </a:r>
         </a:p>
-      </dgm:t>
-    </dgm:pt>
-    <dgm:pt modelId="{F5D5CAB6-D040-4704-92C8-62D6070F9CB4}" type="parTrans" cxnId="{18D15E44-9AE5-4808-AF6F-CEE336F98BCE}">
-      <dgm:prSet/>
-      <dgm:spPr/>
-      <dgm:t>
-        <a:bodyPr/>
+      </dsp:txBody>
+      <dsp:txXfrm>
+        <a:off x="136355" y="224123"/>
+        <a:ext cx="2095980" cy="2095980"/>
+      </dsp:txXfrm>
+    </dsp:sp>
+    <dsp:sp modelId="{304946E5-8BED-4B93-84BE-58F9FAA59C58}">
+      <dsp:nvSpPr>
+        <dsp:cNvPr id="0" name=""/>
+        <dsp:cNvSpPr/>
+      </dsp:nvSpPr>
+      <dsp:spPr>
+        <a:xfrm>
+          <a:off x="1101788" y="2435892"/>
+          <a:ext cx="644165" cy="644165"/>
+        </a:xfrm>
+        <a:prstGeom prst="mathPlus">
+          <a:avLst/>
+        </a:prstGeom>
+        <a:solidFill>
+          <a:schemeClr val="accent1">
+            <a:tint val="60000"/>
+            <a:hueOff val="0"/>
+            <a:satOff val="0"/>
+            <a:lumOff val="0"/>
+            <a:alphaOff val="0"/>
+          </a:schemeClr>
+        </a:solidFill>
+        <a:ln>
+          <a:noFill/>
+        </a:ln>
+        <a:effectLst/>
+      </dsp:spPr>
+      <dsp:style>
+        <a:lnRef idx="0">
+          <a:scrgbClr r="0" g="0" b="0"/>
+        </a:lnRef>
+        <a:fillRef idx="1">
+          <a:scrgbClr r="0" g="0" b="0"/>
+        </a:fillRef>
+        <a:effectRef idx="0">
+          <a:scrgbClr r="0" g="0" b="0"/>
+        </a:effectRef>
+        <a:fontRef idx="minor">
+          <a:schemeClr val="lt1"/>
+        </a:fontRef>
+      </dsp:style>
+      <dsp:txBody>
+        <a:bodyPr spcFirstLastPara="0" vert="horz" wrap="square" lIns="0" tIns="0" rIns="0" bIns="0" numCol="1" spcCol="1270" anchor="ctr" anchorCtr="0">
+          <a:noAutofit/>
+        </a:bodyPr>
         <a:lstStyle/>
         <a:p>
-          <a:endParaRPr lang="en-US"/>
+          <a:pPr lvl="0" algn="ctr" defTabSz="444500">
+            <a:lnSpc>
+              <a:spcPct val="90000"/>
+            </a:lnSpc>
+            <a:spcBef>
+              <a:spcPct val="0"/>
+            </a:spcBef>
+            <a:spcAft>
+              <a:spcPct val="35000"/>
+            </a:spcAft>
+          </a:pPr>
+          <a:endParaRPr lang="en-US" sz="1000" kern="1200"/>
         </a:p>
-      </dgm:t>
-    </dgm:pt>
-    <dgm:pt modelId="{7E09360A-0109-4556-ABBF-2F8710B5F41F}" type="sibTrans" cxnId="{18D15E44-9AE5-4808-AF6F-CEE336F98BCE}">
-      <dgm:prSet/>
-      <dgm:spPr/>
-      <dgm:t>
-        <a:bodyPr/>
-        <a:lstStyle/>
-        <a:p>
-          <a:endParaRPr lang="en-US"/>
-        </a:p>
-      </dgm:t>
-    </dgm:pt>
-    <dgm:pt modelId="{78ECF61E-CBFF-4E50-BFF2-F222D05BE009}">
-      <dgm:prSet phldrT="[Text]"/>
-      <dgm:spPr>
+      </dsp:txBody>
+      <dsp:txXfrm>
+        <a:off x="1101788" y="2435892"/>
+        <a:ext cx="644165" cy="644165"/>
+      </dsp:txXfrm>
+    </dsp:sp>
+    <dsp:sp modelId="{F4BD5001-98BC-4CAF-A4B4-FE38A3578189}">
+      <dsp:nvSpPr>
+        <dsp:cNvPr id="0" name=""/>
+        <dsp:cNvSpPr/>
+      </dsp:nvSpPr>
+      <dsp:spPr>
+        <a:xfrm>
+          <a:off x="1345492" y="3129742"/>
+          <a:ext cx="749375" cy="749375"/>
+        </a:xfrm>
+        <a:prstGeom prst="ellipse">
+          <a:avLst/>
+        </a:prstGeom>
         <a:solidFill>
           <a:srgbClr val="3A89C9"/>
         </a:solidFill>
-      </dgm:spPr>
-      <dgm:t>
-        <a:bodyPr/>
+        <a:ln w="25400" cap="flat" cmpd="sng" algn="ctr">
+          <a:solidFill>
+            <a:schemeClr val="lt1">
+              <a:hueOff val="0"/>
+              <a:satOff val="0"/>
+              <a:lumOff val="0"/>
+              <a:alphaOff val="0"/>
+            </a:schemeClr>
+          </a:solidFill>
+          <a:prstDash val="solid"/>
+        </a:ln>
+        <a:effectLst/>
+      </dsp:spPr>
+      <dsp:style>
+        <a:lnRef idx="2">
+          <a:scrgbClr r="0" g="0" b="0"/>
+        </a:lnRef>
+        <a:fillRef idx="1">
+          <a:scrgbClr r="0" g="0" b="0"/>
+        </a:fillRef>
+        <a:effectRef idx="0">
+          <a:scrgbClr r="0" g="0" b="0"/>
+        </a:effectRef>
+        <a:fontRef idx="minor">
+          <a:schemeClr val="lt1"/>
+        </a:fontRef>
+      </dsp:style>
+      <dsp:txBody>
+        <a:bodyPr spcFirstLastPara="0" vert="horz" wrap="square" lIns="17780" tIns="17780" rIns="17780" bIns="17780" numCol="1" spcCol="1270" anchor="ctr" anchorCtr="0">
+          <a:noAutofit/>
+        </a:bodyPr>
         <a:lstStyle/>
         <a:p>
+          <a:pPr lvl="0" algn="ctr" defTabSz="622300">
+            <a:lnSpc>
+              <a:spcPct val="90000"/>
+            </a:lnSpc>
+            <a:spcBef>
+              <a:spcPct val="0"/>
+            </a:spcBef>
+            <a:spcAft>
+              <a:spcPct val="35000"/>
+            </a:spcAft>
+          </a:pPr>
           <a:r>
-            <a:rPr lang="bg-BG" dirty="0" smtClean="0"/>
+            <a:rPr lang="bg-BG" sz="1400" kern="1200" dirty="0" smtClean="0"/>
             <a:t>екшън</a:t>
           </a:r>
-          <a:endParaRPr lang="en-US" dirty="0"/>
+          <a:endParaRPr lang="en-US" sz="1400" kern="1200" dirty="0"/>
         </a:p>
-      </dgm:t>
-    </dgm:pt>
-    <dgm:pt modelId="{CAC25EDC-63C0-47ED-BC98-477FDCB1E189}" type="parTrans" cxnId="{B9E4C260-0816-4753-A4C2-4314846D4018}">
-      <dgm:prSet/>
-      <dgm:spPr/>
-      <dgm:t>
-        <a:bodyPr/>
+      </dsp:txBody>
+      <dsp:txXfrm>
+        <a:off x="1345492" y="3129742"/>
+        <a:ext cx="749375" cy="749375"/>
+      </dsp:txXfrm>
+    </dsp:sp>
+    <dsp:sp modelId="{03D53D0F-AAE4-48D7-91CE-E77947BCC36C}">
+      <dsp:nvSpPr>
+        <dsp:cNvPr id="0" name=""/>
+        <dsp:cNvSpPr/>
+      </dsp:nvSpPr>
+      <dsp:spPr>
+        <a:xfrm>
+          <a:off x="2111028" y="3777728"/>
+          <a:ext cx="644165" cy="644165"/>
+        </a:xfrm>
+        <a:prstGeom prst="mathPlus">
+          <a:avLst/>
+        </a:prstGeom>
+        <a:solidFill>
+          <a:schemeClr val="accent1">
+            <a:tint val="60000"/>
+            <a:hueOff val="0"/>
+            <a:satOff val="0"/>
+            <a:lumOff val="0"/>
+            <a:alphaOff val="0"/>
+          </a:schemeClr>
+        </a:solidFill>
+        <a:ln>
+          <a:noFill/>
+        </a:ln>
+        <a:effectLst/>
+      </dsp:spPr>
+      <dsp:style>
+        <a:lnRef idx="0">
+          <a:scrgbClr r="0" g="0" b="0"/>
+        </a:lnRef>
+        <a:fillRef idx="1">
+          <a:scrgbClr r="0" g="0" b="0"/>
+        </a:fillRef>
+        <a:effectRef idx="0">
+          <a:scrgbClr r="0" g="0" b="0"/>
+        </a:effectRef>
+        <a:fontRef idx="minor">
+          <a:schemeClr val="lt1"/>
+        </a:fontRef>
+      </dsp:style>
+      <dsp:txBody>
+        <a:bodyPr spcFirstLastPara="0" vert="horz" wrap="square" lIns="0" tIns="0" rIns="0" bIns="0" numCol="1" spcCol="1270" anchor="ctr" anchorCtr="0">
+          <a:noAutofit/>
+        </a:bodyPr>
         <a:lstStyle/>
         <a:p>
-          <a:endParaRPr lang="en-US"/>
+          <a:pPr lvl="0" algn="ctr" defTabSz="444500">
+            <a:lnSpc>
+              <a:spcPct val="90000"/>
+            </a:lnSpc>
+            <a:spcBef>
+              <a:spcPct val="0"/>
+            </a:spcBef>
+            <a:spcAft>
+              <a:spcPct val="35000"/>
+            </a:spcAft>
+          </a:pPr>
+          <a:endParaRPr lang="en-US" sz="1000" kern="1200"/>
         </a:p>
-      </dgm:t>
-    </dgm:pt>
-    <dgm:pt modelId="{581CEC73-21E6-4AB5-B834-EA2D52C29905}" type="sibTrans" cxnId="{B9E4C260-0816-4753-A4C2-4314846D4018}">
-      <dgm:prSet/>
-      <dgm:spPr/>
-      <dgm:t>
-        <a:bodyPr/>
-        <a:lstStyle/>
-        <a:p>
-          <a:endParaRPr lang="en-US"/>
-        </a:p>
-      </dgm:t>
-    </dgm:pt>
-    <dgm:pt modelId="{20CDA44D-C0C4-4723-B1DC-10A474BAF97E}">
-      <dgm:prSet phldrT="[Text]" custT="1"/>
-      <dgm:spPr>
+      </dsp:txBody>
+      <dsp:txXfrm>
+        <a:off x="2111028" y="3777728"/>
+        <a:ext cx="644165" cy="644165"/>
+      </dsp:txXfrm>
+    </dsp:sp>
+    <dsp:sp modelId="{28ED2C84-C598-48FF-B846-8BE54247FCC0}">
+      <dsp:nvSpPr>
+        <dsp:cNvPr id="0" name=""/>
+        <dsp:cNvSpPr/>
+      </dsp:nvSpPr>
+      <dsp:spPr>
+        <a:xfrm>
+          <a:off x="2156802" y="4345426"/>
+          <a:ext cx="1523695" cy="1523695"/>
+        </a:xfrm>
+        <a:prstGeom prst="ellipse">
+          <a:avLst/>
+        </a:prstGeom>
         <a:solidFill>
           <a:srgbClr val="9CC4E4"/>
         </a:solidFill>
-      </dgm:spPr>
-      <dgm:t>
-        <a:bodyPr/>
+        <a:ln w="25400" cap="flat" cmpd="sng" algn="ctr">
+          <a:solidFill>
+            <a:schemeClr val="lt1">
+              <a:hueOff val="0"/>
+              <a:satOff val="0"/>
+              <a:lumOff val="0"/>
+              <a:alphaOff val="0"/>
+            </a:schemeClr>
+          </a:solidFill>
+          <a:prstDash val="solid"/>
+        </a:ln>
+        <a:effectLst/>
+      </dsp:spPr>
+      <dsp:style>
+        <a:lnRef idx="2">
+          <a:scrgbClr r="0" g="0" b="0"/>
+        </a:lnRef>
+        <a:fillRef idx="1">
+          <a:scrgbClr r="0" g="0" b="0"/>
+        </a:fillRef>
+        <a:effectRef idx="0">
+          <a:scrgbClr r="0" g="0" b="0"/>
+        </a:effectRef>
+        <a:fontRef idx="minor">
+          <a:schemeClr val="lt1"/>
+        </a:fontRef>
+      </dsp:style>
+      <dsp:txBody>
+        <a:bodyPr spcFirstLastPara="0" vert="horz" wrap="square" lIns="31750" tIns="31750" rIns="31750" bIns="31750" numCol="1" spcCol="1270" anchor="ctr" anchorCtr="0">
+          <a:noAutofit/>
+        </a:bodyPr>
         <a:lstStyle/>
         <a:p>
+          <a:pPr lvl="0" algn="ctr" defTabSz="1111250">
+            <a:lnSpc>
+              <a:spcPct val="90000"/>
+            </a:lnSpc>
+            <a:spcBef>
+              <a:spcPct val="0"/>
+            </a:spcBef>
+            <a:spcAft>
+              <a:spcPct val="35000"/>
+            </a:spcAft>
+          </a:pPr>
           <a:r>
-            <a:rPr lang="bg-BG" sz="2500" dirty="0" smtClean="0">
+            <a:rPr lang="bg-BG" sz="2500" kern="1200" dirty="0" smtClean="0">
               <a:solidFill>
                 <a:srgbClr val="1B325F"/>
               </a:solidFill>
             </a:rPr>
             <a:t>код</a:t>
           </a:r>
-          <a:endParaRPr lang="en-US" sz="2500" dirty="0">
+          <a:endParaRPr lang="en-US" sz="2500" kern="1200" dirty="0">
             <a:solidFill>
               <a:srgbClr val="1B325F"/>
             </a:solidFill>
           </a:endParaRPr>
         </a:p>
-      </dgm:t>
-    </dgm:pt>
-    <dgm:pt modelId="{60767CD1-0A42-472D-AA77-275399564B6A}" type="parTrans" cxnId="{7054B064-C515-4DF4-B969-C1B362A1B895}">
-      <dgm:prSet/>
-      <dgm:spPr/>
-      <dgm:t>
-        <a:bodyPr/>
+      </dsp:txBody>
+      <dsp:txXfrm>
+        <a:off x="2156802" y="4345426"/>
+        <a:ext cx="1523695" cy="1523695"/>
+      </dsp:txXfrm>
+    </dsp:sp>
+    <dsp:sp modelId="{556515D3-80A7-4A95-AE4C-7BCC53831641}">
+      <dsp:nvSpPr>
+        <dsp:cNvPr id="0" name=""/>
+        <dsp:cNvSpPr/>
+      </dsp:nvSpPr>
+      <dsp:spPr>
+        <a:xfrm rot="18792803">
+          <a:off x="3719022" y="3968090"/>
+          <a:ext cx="1210803" cy="413154"/>
+        </a:xfrm>
+        <a:prstGeom prst="rightArrow">
+          <a:avLst>
+            <a:gd name="adj1" fmla="val 60000"/>
+            <a:gd name="adj2" fmla="val 50000"/>
+          </a:avLst>
+        </a:prstGeom>
+        <a:solidFill>
+          <a:schemeClr val="accent1">
+            <a:tint val="60000"/>
+            <a:hueOff val="0"/>
+            <a:satOff val="0"/>
+            <a:lumOff val="0"/>
+            <a:alphaOff val="0"/>
+          </a:schemeClr>
+        </a:solidFill>
+        <a:ln>
+          <a:noFill/>
+        </a:ln>
+        <a:effectLst/>
+      </dsp:spPr>
+      <dsp:style>
+        <a:lnRef idx="0">
+          <a:scrgbClr r="0" g="0" b="0"/>
+        </a:lnRef>
+        <a:fillRef idx="1">
+          <a:scrgbClr r="0" g="0" b="0"/>
+        </a:fillRef>
+        <a:effectRef idx="0">
+          <a:scrgbClr r="0" g="0" b="0"/>
+        </a:effectRef>
+        <a:fontRef idx="minor">
+          <a:schemeClr val="lt1"/>
+        </a:fontRef>
+      </dsp:style>
+      <dsp:txBody>
+        <a:bodyPr spcFirstLastPara="0" vert="horz" wrap="square" lIns="0" tIns="0" rIns="0" bIns="0" numCol="1" spcCol="1270" anchor="ctr" anchorCtr="0">
+          <a:noAutofit/>
+        </a:bodyPr>
         <a:lstStyle/>
         <a:p>
-          <a:endParaRPr lang="en-US"/>
+          <a:pPr lvl="0" algn="ctr" defTabSz="488950">
+            <a:lnSpc>
+              <a:spcPct val="90000"/>
+            </a:lnSpc>
+            <a:spcBef>
+              <a:spcPct val="0"/>
+            </a:spcBef>
+            <a:spcAft>
+              <a:spcPct val="35000"/>
+            </a:spcAft>
+          </a:pPr>
+          <a:endParaRPr lang="en-US" sz="1100" kern="1200"/>
         </a:p>
-      </dgm:t>
-    </dgm:pt>
-    <dgm:pt modelId="{C0CF3166-ED11-4259-921B-A4610FD18BF4}" type="sibTrans" cxnId="{7054B064-C515-4DF4-B969-C1B362A1B895}">
-      <dgm:prSet/>
-      <dgm:spPr/>
-      <dgm:t>
-        <a:bodyPr/>
-        <a:lstStyle/>
-        <a:p>
-          <a:endParaRPr lang="en-US"/>
-        </a:p>
-      </dgm:t>
-    </dgm:pt>
-    <dgm:pt modelId="{56EED3BA-025F-4048-9561-952881CB8F9E}">
-      <dgm:prSet phldrT="[Text]"/>
-      <dgm:spPr>
+      </dsp:txBody>
+      <dsp:txXfrm rot="18792803">
+        <a:off x="3719022" y="3968090"/>
+        <a:ext cx="1210803" cy="413154"/>
+      </dsp:txXfrm>
+    </dsp:sp>
+    <dsp:sp modelId="{40E2E155-CB0B-48BC-8111-00B0B3FEBA0E}">
+      <dsp:nvSpPr>
+        <dsp:cNvPr id="0" name=""/>
+        <dsp:cNvSpPr/>
+      </dsp:nvSpPr>
+      <dsp:spPr>
+        <a:xfrm>
+          <a:off x="4712971" y="278339"/>
+          <a:ext cx="3737025" cy="3737025"/>
+        </a:xfrm>
+        <a:prstGeom prst="ellipse">
+          <a:avLst/>
+        </a:prstGeom>
         <a:solidFill>
           <a:srgbClr val="F26C4F"/>
         </a:solidFill>
-      </dgm:spPr>
-      <dgm:t>
-        <a:bodyPr/>
+        <a:ln w="25400" cap="flat" cmpd="sng" algn="ctr">
+          <a:solidFill>
+            <a:schemeClr val="lt1">
+              <a:hueOff val="0"/>
+              <a:satOff val="0"/>
+              <a:lumOff val="0"/>
+              <a:alphaOff val="0"/>
+            </a:schemeClr>
+          </a:solidFill>
+          <a:prstDash val="solid"/>
+        </a:ln>
+        <a:effectLst/>
+      </dsp:spPr>
+      <dsp:style>
+        <a:lnRef idx="2">
+          <a:scrgbClr r="0" g="0" b="0"/>
+        </a:lnRef>
+        <a:fillRef idx="1">
+          <a:scrgbClr r="0" g="0" b="0"/>
+        </a:fillRef>
+        <a:effectRef idx="0">
+          <a:scrgbClr r="0" g="0" b="0"/>
+        </a:effectRef>
+        <a:fontRef idx="minor">
+          <a:schemeClr val="lt1"/>
+        </a:fontRef>
+      </dsp:style>
+      <dsp:txBody>
+        <a:bodyPr spcFirstLastPara="0" vert="horz" wrap="square" lIns="71120" tIns="71120" rIns="71120" bIns="71120" numCol="1" spcCol="1270" anchor="ctr" anchorCtr="0">
+          <a:noAutofit/>
+        </a:bodyPr>
         <a:lstStyle/>
         <a:p>
+          <a:pPr lvl="0" algn="ctr" defTabSz="2489200">
+            <a:lnSpc>
+              <a:spcPct val="90000"/>
+            </a:lnSpc>
+            <a:spcBef>
+              <a:spcPct val="0"/>
+            </a:spcBef>
+            <a:spcAft>
+              <a:spcPct val="35000"/>
+            </a:spcAft>
+          </a:pPr>
           <a:r>
-            <a:rPr lang="bg-BG" dirty="0" smtClean="0">
+            <a:rPr lang="bg-BG" sz="5600" kern="1200" dirty="0" smtClean="0">
               <a:solidFill>
                 <a:srgbClr val="E9F2F9"/>
               </a:solidFill>
             </a:rPr>
             <a:t>добавка</a:t>
           </a:r>
-          <a:endParaRPr lang="en-US" dirty="0">
+          <a:endParaRPr lang="en-US" sz="5600" kern="1200" dirty="0">
             <a:solidFill>
               <a:srgbClr val="E9F2F9"/>
             </a:solidFill>
           </a:endParaRPr>
         </a:p>
-      </dgm:t>
-    </dgm:pt>
-    <dgm:pt modelId="{BD2DA580-A868-40AB-A889-06D3E988D3FC}" type="parTrans" cxnId="{443EF97F-8171-43AA-B2A7-0A0875DCC1F9}">
-      <dgm:prSet/>
-      <dgm:spPr/>
-      <dgm:t>
-        <a:bodyPr/>
-        <a:lstStyle/>
-        <a:p>
-          <a:endParaRPr lang="en-US"/>
-        </a:p>
-      </dgm:t>
-    </dgm:pt>
-    <dgm:pt modelId="{C5F974B9-BD3F-4DFF-AB61-1B8ADE86907E}" type="sibTrans" cxnId="{443EF97F-8171-43AA-B2A7-0A0875DCC1F9}">
-      <dgm:prSet/>
-      <dgm:spPr/>
-      <dgm:t>
-        <a:bodyPr/>
-        <a:lstStyle/>
-        <a:p>
-          <a:endParaRPr lang="en-US"/>
-        </a:p>
-      </dgm:t>
-    </dgm:pt>
-    <dgm:pt modelId="{D8F7DB6D-AE93-46FE-B19F-70775B96783C}" type="pres">
-      <dgm:prSet presAssocID="{96F52D17-C89A-4D45-B6F6-8333BDBD40FA}" presName="Name0" presStyleCnt="0">
-        <dgm:presLayoutVars>
-          <dgm:dir/>
-          <dgm:resizeHandles val="exact"/>
-        </dgm:presLayoutVars>
-      </dgm:prSet>
-      <dgm:spPr/>
-      <dgm:t>
-        <a:bodyPr/>
-        <a:lstStyle/>
-        <a:p>
-          <a:endParaRPr lang="en-US"/>
-        </a:p>
-      </dgm:t>
-    </dgm:pt>
-    <dgm:pt modelId="{689F2C73-C735-49F7-AFDE-0D51A40BB8D3}" type="pres">
-      <dgm:prSet presAssocID="{96F52D17-C89A-4D45-B6F6-8333BDBD40FA}" presName="vNodes" presStyleCnt="0"/>
-      <dgm:spPr/>
-    </dgm:pt>
-    <dgm:pt modelId="{49AE4FB7-DE33-441D-98DF-87A073531280}" type="pres">
-      <dgm:prSet presAssocID="{1C23360A-8060-44C1-8685-C8BFD07AE3E8}" presName="node" presStyleLbl="node1" presStyleIdx="0" presStyleCnt="4" custScaleX="188720" custScaleY="188720" custLinFactX="-6782" custLinFactY="11984" custLinFactNeighborX="-100000" custLinFactNeighborY="100000">
-        <dgm:presLayoutVars>
-          <dgm:bulletEnabled val="1"/>
-        </dgm:presLayoutVars>
-      </dgm:prSet>
-      <dgm:spPr/>
-      <dgm:t>
-        <a:bodyPr/>
-        <a:lstStyle/>
-        <a:p>
-          <a:endParaRPr lang="en-US"/>
-        </a:p>
-      </dgm:t>
-    </dgm:pt>
-    <dgm:pt modelId="{E73BFC8B-D7F7-4E30-919D-89ADE7F7AF8A}" type="pres">
-      <dgm:prSet presAssocID="{7E09360A-0109-4556-ABBF-2F8710B5F41F}" presName="spacerT" presStyleCnt="0"/>
-      <dgm:spPr/>
-    </dgm:pt>
-    <dgm:pt modelId="{304946E5-8BED-4B93-84BE-58F9FAA59C58}" type="pres">
-      <dgm:prSet presAssocID="{7E09360A-0109-4556-ABBF-2F8710B5F41F}" presName="sibTrans" presStyleLbl="sibTrans2D1" presStyleIdx="0" presStyleCnt="3" custLinFactX="-46923" custLinFactY="24637" custLinFactNeighborX="-100000" custLinFactNeighborY="100000"/>
-      <dgm:spPr/>
-      <dgm:t>
-        <a:bodyPr/>
-        <a:lstStyle/>
-        <a:p>
-          <a:endParaRPr lang="en-US"/>
-        </a:p>
-      </dgm:t>
-    </dgm:pt>
-    <dgm:pt modelId="{51B0C90B-7B3B-444C-9FEE-CE8E92B661F7}" type="pres">
-      <dgm:prSet presAssocID="{7E09360A-0109-4556-ABBF-2F8710B5F41F}" presName="spacerB" presStyleCnt="0"/>
-      <dgm:spPr/>
-    </dgm:pt>
-    <dgm:pt modelId="{F4BD5001-98BC-4CAF-A4B4-FE38A3578189}" type="pres">
-      <dgm:prSet presAssocID="{78ECF61E-CBFF-4E50-BFF2-F222D05BE009}" presName="node" presStyleLbl="node1" presStyleIdx="1" presStyleCnt="4" custScaleX="67473" custScaleY="67473" custLinFactY="10643" custLinFactNeighborX="-58536" custLinFactNeighborY="100000">
-        <dgm:presLayoutVars>
-          <dgm:bulletEnabled val="1"/>
-        </dgm:presLayoutVars>
-      </dgm:prSet>
-      <dgm:spPr/>
-      <dgm:t>
-        <a:bodyPr/>
-        <a:lstStyle/>
-        <a:p>
-          <a:endParaRPr lang="en-US"/>
-        </a:p>
-      </dgm:t>
-    </dgm:pt>
-    <dgm:pt modelId="{8EED3F09-6917-4248-A008-80CE97AFC401}" type="pres">
-      <dgm:prSet presAssocID="{581CEC73-21E6-4AB5-B834-EA2D52C29905}" presName="spacerT" presStyleCnt="0"/>
-      <dgm:spPr/>
-    </dgm:pt>
-    <dgm:pt modelId="{03D53D0F-AAE4-48D7-91CE-E77947BCC36C}" type="pres">
-      <dgm:prSet presAssocID="{581CEC73-21E6-4AB5-B834-EA2D52C29905}" presName="sibTrans" presStyleLbl="sibTrans2D1" presStyleIdx="1" presStyleCnt="3" custLinFactNeighborX="9751" custLinFactNeighborY="18645"/>
-      <dgm:spPr/>
-      <dgm:t>
-        <a:bodyPr/>
-        <a:lstStyle/>
-        <a:p>
-          <a:endParaRPr lang="en-US"/>
-        </a:p>
-      </dgm:t>
-    </dgm:pt>
-    <dgm:pt modelId="{117B23CB-228C-47CE-93BD-4C79E3772A9B}" type="pres">
-      <dgm:prSet presAssocID="{581CEC73-21E6-4AB5-B834-EA2D52C29905}" presName="spacerB" presStyleCnt="0"/>
-      <dgm:spPr/>
-    </dgm:pt>
-    <dgm:pt modelId="{28ED2C84-C598-48FF-B846-8BE54247FCC0}" type="pres">
-      <dgm:prSet presAssocID="{20CDA44D-C0C4-4723-B1DC-10A474BAF97E}" presName="node" presStyleLbl="node1" presStyleIdx="2" presStyleCnt="4" custScaleX="137192" custScaleY="137192" custLinFactY="-5371" custLinFactNeighborX="49373" custLinFactNeighborY="-100000">
-        <dgm:presLayoutVars>
-          <dgm:bulletEnabled val="1"/>
-        </dgm:presLayoutVars>
-      </dgm:prSet>
-      <dgm:spPr/>
-      <dgm:t>
-        <a:bodyPr/>
-        <a:lstStyle/>
-        <a:p>
-          <a:endParaRPr lang="en-US"/>
-        </a:p>
-      </dgm:t>
-    </dgm:pt>
-    <dgm:pt modelId="{556515D3-80A7-4A95-AE4C-7BCC53831641}" type="pres">
-      <dgm:prSet presAssocID="{96F52D17-C89A-4D45-B6F6-8333BDBD40FA}" presName="sibTransLast" presStyleLbl="sibTrans2D1" presStyleIdx="2" presStyleCnt="3" custAng="19446719" custScaleX="210409" custLinFactY="181206" custLinFactNeighborX="16482" custLinFactNeighborY="200000"/>
-      <dgm:spPr/>
-      <dgm:t>
-        <a:bodyPr/>
-        <a:lstStyle/>
-        <a:p>
-          <a:endParaRPr lang="en-US"/>
-        </a:p>
-      </dgm:t>
-    </dgm:pt>
-    <dgm:pt modelId="{02501D2C-622B-4345-9CB5-7188C1A5B2AF}" type="pres">
-      <dgm:prSet presAssocID="{96F52D17-C89A-4D45-B6F6-8333BDBD40FA}" presName="connectorText" presStyleLbl="sibTrans2D1" presStyleIdx="2" presStyleCnt="3"/>
-      <dgm:spPr/>
-      <dgm:t>
-        <a:bodyPr/>
-        <a:lstStyle/>
-        <a:p>
-          <a:endParaRPr lang="en-US"/>
-        </a:p>
-      </dgm:t>
-    </dgm:pt>
-    <dgm:pt modelId="{40E2E155-CB0B-48BC-8111-00B0B3FEBA0E}" type="pres">
-      <dgm:prSet presAssocID="{96F52D17-C89A-4D45-B6F6-8333BDBD40FA}" presName="lastNode" presStyleLbl="node1" presStyleIdx="3" presStyleCnt="4" custScaleX="168239" custScaleY="168239" custLinFactX="14028" custLinFactNeighborX="100000" custLinFactNeighborY="-38854">
-        <dgm:presLayoutVars>
-          <dgm:bulletEnabled val="1"/>
-        </dgm:presLayoutVars>
-      </dgm:prSet>
-      <dgm:spPr/>
-      <dgm:t>
-        <a:bodyPr/>
-        <a:lstStyle/>
-        <a:p>
-          <a:endParaRPr lang="en-US"/>
-        </a:p>
-      </dgm:t>
-    </dgm:pt>
-  </dgm:ptLst>
-  <dgm:cxnLst>
-    <dgm:cxn modelId="{443EF97F-8171-43AA-B2A7-0A0875DCC1F9}" srcId="{96F52D17-C89A-4D45-B6F6-8333BDBD40FA}" destId="{56EED3BA-025F-4048-9561-952881CB8F9E}" srcOrd="3" destOrd="0" parTransId="{BD2DA580-A868-40AB-A889-06D3E988D3FC}" sibTransId="{C5F974B9-BD3F-4DFF-AB61-1B8ADE86907E}"/>
-    <dgm:cxn modelId="{18D15E44-9AE5-4808-AF6F-CEE336F98BCE}" srcId="{96F52D17-C89A-4D45-B6F6-8333BDBD40FA}" destId="{1C23360A-8060-44C1-8685-C8BFD07AE3E8}" srcOrd="0" destOrd="0" parTransId="{F5D5CAB6-D040-4704-92C8-62D6070F9CB4}" sibTransId="{7E09360A-0109-4556-ABBF-2F8710B5F41F}"/>
-    <dgm:cxn modelId="{4A268223-E174-45E8-9DB5-7F2CD2F01465}" type="presOf" srcId="{1C23360A-8060-44C1-8685-C8BFD07AE3E8}" destId="{49AE4FB7-DE33-441D-98DF-87A073531280}" srcOrd="0" destOrd="0" presId="urn:microsoft.com/office/officeart/2005/8/layout/equation2"/>
-    <dgm:cxn modelId="{268580E6-5848-4D6C-9BED-B1AC598C6D9F}" type="presOf" srcId="{96F52D17-C89A-4D45-B6F6-8333BDBD40FA}" destId="{D8F7DB6D-AE93-46FE-B19F-70775B96783C}" srcOrd="0" destOrd="0" presId="urn:microsoft.com/office/officeart/2005/8/layout/equation2"/>
-    <dgm:cxn modelId="{197980A2-F6C7-4436-86D0-A555692B4D62}" type="presOf" srcId="{7E09360A-0109-4556-ABBF-2F8710B5F41F}" destId="{304946E5-8BED-4B93-84BE-58F9FAA59C58}" srcOrd="0" destOrd="0" presId="urn:microsoft.com/office/officeart/2005/8/layout/equation2"/>
-    <dgm:cxn modelId="{10957531-AB25-4F05-B184-02AA10877F27}" type="presOf" srcId="{78ECF61E-CBFF-4E50-BFF2-F222D05BE009}" destId="{F4BD5001-98BC-4CAF-A4B4-FE38A3578189}" srcOrd="0" destOrd="0" presId="urn:microsoft.com/office/officeart/2005/8/layout/equation2"/>
-    <dgm:cxn modelId="{437A5A22-C988-43AA-B9A1-E6F9F242D529}" type="presOf" srcId="{581CEC73-21E6-4AB5-B834-EA2D52C29905}" destId="{03D53D0F-AAE4-48D7-91CE-E77947BCC36C}" srcOrd="0" destOrd="0" presId="urn:microsoft.com/office/officeart/2005/8/layout/equation2"/>
-    <dgm:cxn modelId="{F530B6AD-F734-4E73-A164-AEC08AF75352}" type="presOf" srcId="{C0CF3166-ED11-4259-921B-A4610FD18BF4}" destId="{02501D2C-622B-4345-9CB5-7188C1A5B2AF}" srcOrd="1" destOrd="0" presId="urn:microsoft.com/office/officeart/2005/8/layout/equation2"/>
-    <dgm:cxn modelId="{7054B064-C515-4DF4-B969-C1B362A1B895}" srcId="{96F52D17-C89A-4D45-B6F6-8333BDBD40FA}" destId="{20CDA44D-C0C4-4723-B1DC-10A474BAF97E}" srcOrd="2" destOrd="0" parTransId="{60767CD1-0A42-472D-AA77-275399564B6A}" sibTransId="{C0CF3166-ED11-4259-921B-A4610FD18BF4}"/>
-    <dgm:cxn modelId="{FA43E27F-52F8-4E88-9409-A19C90D4B86F}" type="presOf" srcId="{56EED3BA-025F-4048-9561-952881CB8F9E}" destId="{40E2E155-CB0B-48BC-8111-00B0B3FEBA0E}" srcOrd="0" destOrd="0" presId="urn:microsoft.com/office/officeart/2005/8/layout/equation2"/>
-    <dgm:cxn modelId="{B9E4C260-0816-4753-A4C2-4314846D4018}" srcId="{96F52D17-C89A-4D45-B6F6-8333BDBD40FA}" destId="{78ECF61E-CBFF-4E50-BFF2-F222D05BE009}" srcOrd="1" destOrd="0" parTransId="{CAC25EDC-63C0-47ED-BC98-477FDCB1E189}" sibTransId="{581CEC73-21E6-4AB5-B834-EA2D52C29905}"/>
-    <dgm:cxn modelId="{5519AEC8-4ED5-4B86-9910-C0B8711D13BC}" type="presOf" srcId="{C0CF3166-ED11-4259-921B-A4610FD18BF4}" destId="{556515D3-80A7-4A95-AE4C-7BCC53831641}" srcOrd="0" destOrd="0" presId="urn:microsoft.com/office/officeart/2005/8/layout/equation2"/>
-    <dgm:cxn modelId="{5AFDC22E-AD0F-4F5A-B3D4-19F4C398422E}" type="presOf" srcId="{20CDA44D-C0C4-4723-B1DC-10A474BAF97E}" destId="{28ED2C84-C598-48FF-B846-8BE54247FCC0}" srcOrd="0" destOrd="0" presId="urn:microsoft.com/office/officeart/2005/8/layout/equation2"/>
-    <dgm:cxn modelId="{A1BCC08C-5902-4391-A7D0-5881E284AB80}" type="presParOf" srcId="{D8F7DB6D-AE93-46FE-B19F-70775B96783C}" destId="{689F2C73-C735-49F7-AFDE-0D51A40BB8D3}" srcOrd="0" destOrd="0" presId="urn:microsoft.com/office/officeart/2005/8/layout/equation2"/>
-    <dgm:cxn modelId="{E5D6EEFD-14EA-48C9-96DC-E16F76700A7A}" type="presParOf" srcId="{689F2C73-C735-49F7-AFDE-0D51A40BB8D3}" destId="{49AE4FB7-DE33-441D-98DF-87A073531280}" srcOrd="0" destOrd="0" presId="urn:microsoft.com/office/officeart/2005/8/layout/equation2"/>
-    <dgm:cxn modelId="{1F9AC87A-7AEA-46FF-B853-458078DC11B3}" type="presParOf" srcId="{689F2C73-C735-49F7-AFDE-0D51A40BB8D3}" destId="{E73BFC8B-D7F7-4E30-919D-89ADE7F7AF8A}" srcOrd="1" destOrd="0" presId="urn:microsoft.com/office/officeart/2005/8/layout/equation2"/>
-    <dgm:cxn modelId="{4F3D71F3-E8B0-4415-A5F1-87D9B29A7BB0}" type="presParOf" srcId="{689F2C73-C735-49F7-AFDE-0D51A40BB8D3}" destId="{304946E5-8BED-4B93-84BE-58F9FAA59C58}" srcOrd="2" destOrd="0" presId="urn:microsoft.com/office/officeart/2005/8/layout/equation2"/>
-    <dgm:cxn modelId="{37D03DE6-F641-4085-AAB5-208717424473}" type="presParOf" srcId="{689F2C73-C735-49F7-AFDE-0D51A40BB8D3}" destId="{51B0C90B-7B3B-444C-9FEE-CE8E92B661F7}" srcOrd="3" destOrd="0" presId="urn:microsoft.com/office/officeart/2005/8/layout/equation2"/>
-    <dgm:cxn modelId="{B2FB042D-F8BE-4161-B919-2049DDA8517C}" type="presParOf" srcId="{689F2C73-C735-49F7-AFDE-0D51A40BB8D3}" destId="{F4BD5001-98BC-4CAF-A4B4-FE38A3578189}" srcOrd="4" destOrd="0" presId="urn:microsoft.com/office/officeart/2005/8/layout/equation2"/>
-    <dgm:cxn modelId="{F19F893F-E6F6-49C8-9CF6-959B431DAC52}" type="presParOf" srcId="{689F2C73-C735-49F7-AFDE-0D51A40BB8D3}" destId="{8EED3F09-6917-4248-A008-80CE97AFC401}" srcOrd="5" destOrd="0" presId="urn:microsoft.com/office/officeart/2005/8/layout/equation2"/>
-    <dgm:cxn modelId="{09E5FEAF-C7E8-412C-8B07-DC8E3663CA1B}" type="presParOf" srcId="{689F2C73-C735-49F7-AFDE-0D51A40BB8D3}" destId="{03D53D0F-AAE4-48D7-91CE-E77947BCC36C}" srcOrd="6" destOrd="0" presId="urn:microsoft.com/office/officeart/2005/8/layout/equation2"/>
-    <dgm:cxn modelId="{565F64B2-8BB6-4A19-B7CD-87F35D892F21}" type="presParOf" srcId="{689F2C73-C735-49F7-AFDE-0D51A40BB8D3}" destId="{117B23CB-228C-47CE-93BD-4C79E3772A9B}" srcOrd="7" destOrd="0" presId="urn:microsoft.com/office/officeart/2005/8/layout/equation2"/>
-    <dgm:cxn modelId="{F2397918-4193-440D-81F1-1568EF22B215}" type="presParOf" srcId="{689F2C73-C735-49F7-AFDE-0D51A40BB8D3}" destId="{28ED2C84-C598-48FF-B846-8BE54247FCC0}" srcOrd="8" destOrd="0" presId="urn:microsoft.com/office/officeart/2005/8/layout/equation2"/>
-    <dgm:cxn modelId="{95FFBCF8-3606-44D0-B1F9-260046CA94D0}" type="presParOf" srcId="{D8F7DB6D-AE93-46FE-B19F-70775B96783C}" destId="{556515D3-80A7-4A95-AE4C-7BCC53831641}" srcOrd="1" destOrd="0" presId="urn:microsoft.com/office/officeart/2005/8/layout/equation2"/>
-    <dgm:cxn modelId="{08EB8F12-562B-43B8-BF9B-B1BDB110E33D}" type="presParOf" srcId="{556515D3-80A7-4A95-AE4C-7BCC53831641}" destId="{02501D2C-622B-4345-9CB5-7188C1A5B2AF}" srcOrd="0" destOrd="0" presId="urn:microsoft.com/office/officeart/2005/8/layout/equation2"/>
-    <dgm:cxn modelId="{6A25723A-BDE4-4C56-900D-6318161D7605}" type="presParOf" srcId="{D8F7DB6D-AE93-46FE-B19F-70775B96783C}" destId="{40E2E155-CB0B-48BC-8111-00B0B3FEBA0E}" srcOrd="2" destOrd="0" presId="urn:microsoft.com/office/officeart/2005/8/layout/equation2"/>
-  </dgm:cxnLst>
-  <dgm:bg/>
-  <dgm:whole/>
-  <dgm:extLst>
-    <a:ext uri="http://schemas.microsoft.com/office/drawing/2008/diagram">
-      <dsp:dataModelExt xmlns:dsp="http://schemas.microsoft.com/office/drawing/2008/diagram" xmlns="" relId="rId6" minVer="http://schemas.openxmlformats.org/drawingml/2006/diagram"/>
-    </a:ext>
-  </dgm:extLst>
-</dgm:dataModel>
+      </dsp:txBody>
+      <dsp:txXfrm>
+        <a:off x="4712971" y="278339"/>
+        <a:ext cx="3737025" cy="3737025"/>
+      </dsp:txXfrm>
+    </dsp:sp>
+  </dsp:spTree>
+</dsp:drawing>
 </file>
 
-<file path=ppt/diagrams/drawing1.xml><?xml version="1.0" encoding="utf-8"?>
+<file path=ppt/diagrams/drawing2.xml><?xml version="1.0" encoding="utf-8"?>
 <dsp:drawing xmlns:dgm="http://schemas.openxmlformats.org/drawingml/2006/diagram" xmlns:a="http://schemas.openxmlformats.org/drawingml/2006/main" xmlns:dsp="http://schemas.microsoft.com/office/drawing/2008/diagram">
   <dsp:spTree>
     <dsp:nvGrpSpPr>
@@ -5806,523 +6321,272 @@
 </dsp:drawing>
 </file>
 
-<file path=ppt/diagrams/drawing2.xml><?xml version="1.0" encoding="utf-8"?>
-<dsp:drawing xmlns:dgm="http://schemas.openxmlformats.org/drawingml/2006/diagram" xmlns:a="http://schemas.openxmlformats.org/drawingml/2006/main" xmlns:dsp="http://schemas.microsoft.com/office/drawing/2008/diagram">
-  <dsp:spTree>
-    <dsp:nvGrpSpPr>
-      <dsp:cNvPr id="0" name=""/>
-      <dsp:cNvGrpSpPr/>
-    </dsp:nvGrpSpPr>
-    <dsp:grpSpPr/>
-    <dsp:sp modelId="{49AE4FB7-DE33-441D-98DF-87A073531280}">
-      <dsp:nvSpPr>
-        <dsp:cNvPr id="0" name=""/>
-        <dsp:cNvSpPr/>
-      </dsp:nvSpPr>
-      <dsp:spPr>
-        <a:xfrm>
-          <a:off x="136355" y="224123"/>
-          <a:ext cx="2095980" cy="2095980"/>
-        </a:xfrm>
-        <a:prstGeom prst="ellipse">
-          <a:avLst/>
-        </a:prstGeom>
-        <a:solidFill>
-          <a:srgbClr val="1B325F"/>
-        </a:solidFill>
-        <a:ln w="25400" cap="flat" cmpd="sng" algn="ctr">
-          <a:solidFill>
-            <a:schemeClr val="lt1">
-              <a:hueOff val="0"/>
-              <a:satOff val="0"/>
-              <a:lumOff val="0"/>
-              <a:alphaOff val="0"/>
-            </a:schemeClr>
-          </a:solidFill>
-          <a:prstDash val="solid"/>
-        </a:ln>
-        <a:effectLst/>
-      </dsp:spPr>
-      <dsp:style>
-        <a:lnRef idx="2">
-          <a:scrgbClr r="0" g="0" b="0"/>
-        </a:lnRef>
-        <a:fillRef idx="1">
-          <a:scrgbClr r="0" g="0" b="0"/>
-        </a:fillRef>
-        <a:effectRef idx="0">
-          <a:scrgbClr r="0" g="0" b="0"/>
-        </a:effectRef>
-        <a:fontRef idx="minor">
-          <a:schemeClr val="lt1"/>
-        </a:fontRef>
-      </dsp:style>
-      <dsp:txBody>
-        <a:bodyPr spcFirstLastPara="0" vert="horz" wrap="square" lIns="31750" tIns="31750" rIns="31750" bIns="31750" numCol="1" spcCol="1270" anchor="ctr" anchorCtr="0">
-          <a:noAutofit/>
-        </a:bodyPr>
-        <a:lstStyle/>
-        <a:p>
-          <a:pPr lvl="0" algn="ctr" defTabSz="1111250">
-            <a:lnSpc>
-              <a:spcPct val="90000"/>
-            </a:lnSpc>
-            <a:spcBef>
-              <a:spcPct val="0"/>
-            </a:spcBef>
-            <a:spcAft>
-              <a:spcPct val="35000"/>
-            </a:spcAft>
-          </a:pPr>
-          <a:r>
-            <a:rPr lang="bg-BG" sz="2500" kern="1200" dirty="0" smtClean="0"/>
-            <a:t>граматика</a:t>
-          </a:r>
-        </a:p>
-      </dsp:txBody>
-      <dsp:txXfrm>
-        <a:off x="136355" y="224123"/>
-        <a:ext cx="2095980" cy="2095980"/>
-      </dsp:txXfrm>
-    </dsp:sp>
-    <dsp:sp modelId="{304946E5-8BED-4B93-84BE-58F9FAA59C58}">
-      <dsp:nvSpPr>
-        <dsp:cNvPr id="0" name=""/>
-        <dsp:cNvSpPr/>
-      </dsp:nvSpPr>
-      <dsp:spPr>
-        <a:xfrm>
-          <a:off x="1101788" y="2435892"/>
-          <a:ext cx="644165" cy="644165"/>
-        </a:xfrm>
-        <a:prstGeom prst="mathPlus">
-          <a:avLst/>
-        </a:prstGeom>
-        <a:solidFill>
-          <a:schemeClr val="accent1">
-            <a:tint val="60000"/>
-            <a:hueOff val="0"/>
-            <a:satOff val="0"/>
-            <a:lumOff val="0"/>
-            <a:alphaOff val="0"/>
-          </a:schemeClr>
-        </a:solidFill>
-        <a:ln>
-          <a:noFill/>
-        </a:ln>
-        <a:effectLst/>
-      </dsp:spPr>
-      <dsp:style>
-        <a:lnRef idx="0">
-          <a:scrgbClr r="0" g="0" b="0"/>
-        </a:lnRef>
-        <a:fillRef idx="1">
-          <a:scrgbClr r="0" g="0" b="0"/>
-        </a:fillRef>
-        <a:effectRef idx="0">
-          <a:scrgbClr r="0" g="0" b="0"/>
-        </a:effectRef>
-        <a:fontRef idx="minor">
-          <a:schemeClr val="lt1"/>
-        </a:fontRef>
-      </dsp:style>
-      <dsp:txBody>
-        <a:bodyPr spcFirstLastPara="0" vert="horz" wrap="square" lIns="0" tIns="0" rIns="0" bIns="0" numCol="1" spcCol="1270" anchor="ctr" anchorCtr="0">
-          <a:noAutofit/>
-        </a:bodyPr>
-        <a:lstStyle/>
-        <a:p>
-          <a:pPr lvl="0" algn="ctr" defTabSz="444500">
-            <a:lnSpc>
-              <a:spcPct val="90000"/>
-            </a:lnSpc>
-            <a:spcBef>
-              <a:spcPct val="0"/>
-            </a:spcBef>
-            <a:spcAft>
-              <a:spcPct val="35000"/>
-            </a:spcAft>
-          </a:pPr>
-          <a:endParaRPr lang="en-US" sz="1000" kern="1200"/>
-        </a:p>
-      </dsp:txBody>
-      <dsp:txXfrm>
-        <a:off x="1101788" y="2435892"/>
-        <a:ext cx="644165" cy="644165"/>
-      </dsp:txXfrm>
-    </dsp:sp>
-    <dsp:sp modelId="{F4BD5001-98BC-4CAF-A4B4-FE38A3578189}">
-      <dsp:nvSpPr>
-        <dsp:cNvPr id="0" name=""/>
-        <dsp:cNvSpPr/>
-      </dsp:nvSpPr>
-      <dsp:spPr>
-        <a:xfrm>
-          <a:off x="1345492" y="3129742"/>
-          <a:ext cx="749375" cy="749375"/>
-        </a:xfrm>
-        <a:prstGeom prst="ellipse">
-          <a:avLst/>
-        </a:prstGeom>
-        <a:solidFill>
-          <a:srgbClr val="3A89C9"/>
-        </a:solidFill>
-        <a:ln w="25400" cap="flat" cmpd="sng" algn="ctr">
-          <a:solidFill>
-            <a:schemeClr val="lt1">
-              <a:hueOff val="0"/>
-              <a:satOff val="0"/>
-              <a:lumOff val="0"/>
-              <a:alphaOff val="0"/>
-            </a:schemeClr>
-          </a:solidFill>
-          <a:prstDash val="solid"/>
-        </a:ln>
-        <a:effectLst/>
-      </dsp:spPr>
-      <dsp:style>
-        <a:lnRef idx="2">
-          <a:scrgbClr r="0" g="0" b="0"/>
-        </a:lnRef>
-        <a:fillRef idx="1">
-          <a:scrgbClr r="0" g="0" b="0"/>
-        </a:fillRef>
-        <a:effectRef idx="0">
-          <a:scrgbClr r="0" g="0" b="0"/>
-        </a:effectRef>
-        <a:fontRef idx="minor">
-          <a:schemeClr val="lt1"/>
-        </a:fontRef>
-      </dsp:style>
-      <dsp:txBody>
-        <a:bodyPr spcFirstLastPara="0" vert="horz" wrap="square" lIns="17780" tIns="17780" rIns="17780" bIns="17780" numCol="1" spcCol="1270" anchor="ctr" anchorCtr="0">
-          <a:noAutofit/>
-        </a:bodyPr>
-        <a:lstStyle/>
-        <a:p>
-          <a:pPr lvl="0" algn="ctr" defTabSz="622300">
-            <a:lnSpc>
-              <a:spcPct val="90000"/>
-            </a:lnSpc>
-            <a:spcBef>
-              <a:spcPct val="0"/>
-            </a:spcBef>
-            <a:spcAft>
-              <a:spcPct val="35000"/>
-            </a:spcAft>
-          </a:pPr>
-          <a:r>
-            <a:rPr lang="bg-BG" sz="1400" kern="1200" dirty="0" smtClean="0"/>
-            <a:t>екшън</a:t>
-          </a:r>
-          <a:endParaRPr lang="en-US" sz="1400" kern="1200" dirty="0"/>
-        </a:p>
-      </dsp:txBody>
-      <dsp:txXfrm>
-        <a:off x="1345492" y="3129742"/>
-        <a:ext cx="749375" cy="749375"/>
-      </dsp:txXfrm>
-    </dsp:sp>
-    <dsp:sp modelId="{03D53D0F-AAE4-48D7-91CE-E77947BCC36C}">
-      <dsp:nvSpPr>
-        <dsp:cNvPr id="0" name=""/>
-        <dsp:cNvSpPr/>
-      </dsp:nvSpPr>
-      <dsp:spPr>
-        <a:xfrm>
-          <a:off x="2111028" y="3777728"/>
-          <a:ext cx="644165" cy="644165"/>
-        </a:xfrm>
-        <a:prstGeom prst="mathPlus">
-          <a:avLst/>
-        </a:prstGeom>
-        <a:solidFill>
-          <a:schemeClr val="accent1">
-            <a:tint val="60000"/>
-            <a:hueOff val="0"/>
-            <a:satOff val="0"/>
-            <a:lumOff val="0"/>
-            <a:alphaOff val="0"/>
-          </a:schemeClr>
-        </a:solidFill>
-        <a:ln>
-          <a:noFill/>
-        </a:ln>
-        <a:effectLst/>
-      </dsp:spPr>
-      <dsp:style>
-        <a:lnRef idx="0">
-          <a:scrgbClr r="0" g="0" b="0"/>
-        </a:lnRef>
-        <a:fillRef idx="1">
-          <a:scrgbClr r="0" g="0" b="0"/>
-        </a:fillRef>
-        <a:effectRef idx="0">
-          <a:scrgbClr r="0" g="0" b="0"/>
-        </a:effectRef>
-        <a:fontRef idx="minor">
-          <a:schemeClr val="lt1"/>
-        </a:fontRef>
-      </dsp:style>
-      <dsp:txBody>
-        <a:bodyPr spcFirstLastPara="0" vert="horz" wrap="square" lIns="0" tIns="0" rIns="0" bIns="0" numCol="1" spcCol="1270" anchor="ctr" anchorCtr="0">
-          <a:noAutofit/>
-        </a:bodyPr>
-        <a:lstStyle/>
-        <a:p>
-          <a:pPr lvl="0" algn="ctr" defTabSz="444500">
-            <a:lnSpc>
-              <a:spcPct val="90000"/>
-            </a:lnSpc>
-            <a:spcBef>
-              <a:spcPct val="0"/>
-            </a:spcBef>
-            <a:spcAft>
-              <a:spcPct val="35000"/>
-            </a:spcAft>
-          </a:pPr>
-          <a:endParaRPr lang="en-US" sz="1000" kern="1200"/>
-        </a:p>
-      </dsp:txBody>
-      <dsp:txXfrm>
-        <a:off x="2111028" y="3777728"/>
-        <a:ext cx="644165" cy="644165"/>
-      </dsp:txXfrm>
-    </dsp:sp>
-    <dsp:sp modelId="{28ED2C84-C598-48FF-B846-8BE54247FCC0}">
-      <dsp:nvSpPr>
-        <dsp:cNvPr id="0" name=""/>
-        <dsp:cNvSpPr/>
-      </dsp:nvSpPr>
-      <dsp:spPr>
-        <a:xfrm>
-          <a:off x="2156802" y="4345426"/>
-          <a:ext cx="1523695" cy="1523695"/>
-        </a:xfrm>
-        <a:prstGeom prst="ellipse">
-          <a:avLst/>
-        </a:prstGeom>
-        <a:solidFill>
-          <a:srgbClr val="9CC4E4"/>
-        </a:solidFill>
-        <a:ln w="25400" cap="flat" cmpd="sng" algn="ctr">
-          <a:solidFill>
-            <a:schemeClr val="lt1">
-              <a:hueOff val="0"/>
-              <a:satOff val="0"/>
-              <a:lumOff val="0"/>
-              <a:alphaOff val="0"/>
-            </a:schemeClr>
-          </a:solidFill>
-          <a:prstDash val="solid"/>
-        </a:ln>
-        <a:effectLst/>
-      </dsp:spPr>
-      <dsp:style>
-        <a:lnRef idx="2">
-          <a:scrgbClr r="0" g="0" b="0"/>
-        </a:lnRef>
-        <a:fillRef idx="1">
-          <a:scrgbClr r="0" g="0" b="0"/>
-        </a:fillRef>
-        <a:effectRef idx="0">
-          <a:scrgbClr r="0" g="0" b="0"/>
-        </a:effectRef>
-        <a:fontRef idx="minor">
-          <a:schemeClr val="lt1"/>
-        </a:fontRef>
-      </dsp:style>
-      <dsp:txBody>
-        <a:bodyPr spcFirstLastPara="0" vert="horz" wrap="square" lIns="31750" tIns="31750" rIns="31750" bIns="31750" numCol="1" spcCol="1270" anchor="ctr" anchorCtr="0">
-          <a:noAutofit/>
-        </a:bodyPr>
-        <a:lstStyle/>
-        <a:p>
-          <a:pPr lvl="0" algn="ctr" defTabSz="1111250">
-            <a:lnSpc>
-              <a:spcPct val="90000"/>
-            </a:lnSpc>
-            <a:spcBef>
-              <a:spcPct val="0"/>
-            </a:spcBef>
-            <a:spcAft>
-              <a:spcPct val="35000"/>
-            </a:spcAft>
-          </a:pPr>
-          <a:r>
-            <a:rPr lang="bg-BG" sz="2500" kern="1200" dirty="0" smtClean="0">
-              <a:solidFill>
-                <a:srgbClr val="1B325F"/>
-              </a:solidFill>
-            </a:rPr>
-            <a:t>код</a:t>
-          </a:r>
-          <a:endParaRPr lang="en-US" sz="2500" kern="1200" dirty="0">
-            <a:solidFill>
-              <a:srgbClr val="1B325F"/>
-            </a:solidFill>
-          </a:endParaRPr>
-        </a:p>
-      </dsp:txBody>
-      <dsp:txXfrm>
-        <a:off x="2156802" y="4345426"/>
-        <a:ext cx="1523695" cy="1523695"/>
-      </dsp:txXfrm>
-    </dsp:sp>
-    <dsp:sp modelId="{556515D3-80A7-4A95-AE4C-7BCC53831641}">
-      <dsp:nvSpPr>
-        <dsp:cNvPr id="0" name=""/>
-        <dsp:cNvSpPr/>
-      </dsp:nvSpPr>
-      <dsp:spPr>
-        <a:xfrm rot="18792803">
-          <a:off x="3719022" y="3968090"/>
-          <a:ext cx="1210803" cy="413154"/>
-        </a:xfrm>
-        <a:prstGeom prst="rightArrow">
-          <a:avLst>
-            <a:gd name="adj1" fmla="val 60000"/>
-            <a:gd name="adj2" fmla="val 50000"/>
-          </a:avLst>
-        </a:prstGeom>
-        <a:solidFill>
-          <a:schemeClr val="accent1">
-            <a:tint val="60000"/>
-            <a:hueOff val="0"/>
-            <a:satOff val="0"/>
-            <a:lumOff val="0"/>
-            <a:alphaOff val="0"/>
-          </a:schemeClr>
-        </a:solidFill>
-        <a:ln>
-          <a:noFill/>
-        </a:ln>
-        <a:effectLst/>
-      </dsp:spPr>
-      <dsp:style>
-        <a:lnRef idx="0">
-          <a:scrgbClr r="0" g="0" b="0"/>
-        </a:lnRef>
-        <a:fillRef idx="1">
-          <a:scrgbClr r="0" g="0" b="0"/>
-        </a:fillRef>
-        <a:effectRef idx="0">
-          <a:scrgbClr r="0" g="0" b="0"/>
-        </a:effectRef>
-        <a:fontRef idx="minor">
-          <a:schemeClr val="lt1"/>
-        </a:fontRef>
-      </dsp:style>
-      <dsp:txBody>
-        <a:bodyPr spcFirstLastPara="0" vert="horz" wrap="square" lIns="0" tIns="0" rIns="0" bIns="0" numCol="1" spcCol="1270" anchor="ctr" anchorCtr="0">
-          <a:noAutofit/>
-        </a:bodyPr>
-        <a:lstStyle/>
-        <a:p>
-          <a:pPr lvl="0" algn="ctr" defTabSz="488950">
-            <a:lnSpc>
-              <a:spcPct val="90000"/>
-            </a:lnSpc>
-            <a:spcBef>
-              <a:spcPct val="0"/>
-            </a:spcBef>
-            <a:spcAft>
-              <a:spcPct val="35000"/>
-            </a:spcAft>
-          </a:pPr>
-          <a:endParaRPr lang="en-US" sz="1100" kern="1200"/>
-        </a:p>
-      </dsp:txBody>
-      <dsp:txXfrm rot="18792803">
-        <a:off x="3719022" y="3968090"/>
-        <a:ext cx="1210803" cy="413154"/>
-      </dsp:txXfrm>
-    </dsp:sp>
-    <dsp:sp modelId="{40E2E155-CB0B-48BC-8111-00B0B3FEBA0E}">
-      <dsp:nvSpPr>
-        <dsp:cNvPr id="0" name=""/>
-        <dsp:cNvSpPr/>
-      </dsp:nvSpPr>
-      <dsp:spPr>
-        <a:xfrm>
-          <a:off x="4712971" y="278339"/>
-          <a:ext cx="3737025" cy="3737025"/>
-        </a:xfrm>
-        <a:prstGeom prst="ellipse">
-          <a:avLst/>
-        </a:prstGeom>
-        <a:solidFill>
-          <a:srgbClr val="F26C4F"/>
-        </a:solidFill>
-        <a:ln w="25400" cap="flat" cmpd="sng" algn="ctr">
-          <a:solidFill>
-            <a:schemeClr val="lt1">
-              <a:hueOff val="0"/>
-              <a:satOff val="0"/>
-              <a:lumOff val="0"/>
-              <a:alphaOff val="0"/>
-            </a:schemeClr>
-          </a:solidFill>
-          <a:prstDash val="solid"/>
-        </a:ln>
-        <a:effectLst/>
-      </dsp:spPr>
-      <dsp:style>
-        <a:lnRef idx="2">
-          <a:scrgbClr r="0" g="0" b="0"/>
-        </a:lnRef>
-        <a:fillRef idx="1">
-          <a:scrgbClr r="0" g="0" b="0"/>
-        </a:fillRef>
-        <a:effectRef idx="0">
-          <a:scrgbClr r="0" g="0" b="0"/>
-        </a:effectRef>
-        <a:fontRef idx="minor">
-          <a:schemeClr val="lt1"/>
-        </a:fontRef>
-      </dsp:style>
-      <dsp:txBody>
-        <a:bodyPr spcFirstLastPara="0" vert="horz" wrap="square" lIns="71120" tIns="71120" rIns="71120" bIns="71120" numCol="1" spcCol="1270" anchor="ctr" anchorCtr="0">
-          <a:noAutofit/>
-        </a:bodyPr>
-        <a:lstStyle/>
-        <a:p>
-          <a:pPr lvl="0" algn="ctr" defTabSz="2489200">
-            <a:lnSpc>
-              <a:spcPct val="90000"/>
-            </a:lnSpc>
-            <a:spcBef>
-              <a:spcPct val="0"/>
-            </a:spcBef>
-            <a:spcAft>
-              <a:spcPct val="35000"/>
-            </a:spcAft>
-          </a:pPr>
-          <a:r>
-            <a:rPr lang="bg-BG" sz="5600" kern="1200" dirty="0" smtClean="0">
-              <a:solidFill>
-                <a:srgbClr val="E9F2F9"/>
-              </a:solidFill>
-            </a:rPr>
-            <a:t>добавка</a:t>
-          </a:r>
-          <a:endParaRPr lang="en-US" sz="5600" kern="1200" dirty="0">
-            <a:solidFill>
-              <a:srgbClr val="E9F2F9"/>
-            </a:solidFill>
-          </a:endParaRPr>
-        </a:p>
-      </dsp:txBody>
-      <dsp:txXfrm>
-        <a:off x="4712971" y="278339"/>
-        <a:ext cx="3737025" cy="3737025"/>
-      </dsp:txXfrm>
-    </dsp:sp>
-  </dsp:spTree>
-</dsp:drawing>
+<file path=ppt/diagrams/layout1.xml><?xml version="1.0" encoding="utf-8"?>
+<dgm:layoutDef xmlns:dgm="http://schemas.openxmlformats.org/drawingml/2006/diagram" xmlns:a="http://schemas.openxmlformats.org/drawingml/2006/main" uniqueId="urn:microsoft.com/office/officeart/2005/8/layout/equation2">
+  <dgm:title val=""/>
+  <dgm:desc val=""/>
+  <dgm:catLst>
+    <dgm:cat type="relationship" pri="18000"/>
+    <dgm:cat type="process" pri="26000"/>
+  </dgm:catLst>
+  <dgm:sampData useDef="1">
+    <dgm:dataModel>
+      <dgm:ptLst/>
+      <dgm:bg/>
+      <dgm:whole/>
+    </dgm:dataModel>
+  </dgm:sampData>
+  <dgm:styleData>
+    <dgm:dataModel>
+      <dgm:ptLst>
+        <dgm:pt modelId="0" type="doc"/>
+        <dgm:pt modelId="1"/>
+        <dgm:pt modelId="2"/>
+      </dgm:ptLst>
+      <dgm:cxnLst>
+        <dgm:cxn modelId="3" srcId="0" destId="1" srcOrd="0" destOrd="0"/>
+        <dgm:cxn modelId="4" srcId="0" destId="2" srcOrd="1" destOrd="0"/>
+      </dgm:cxnLst>
+      <dgm:bg/>
+      <dgm:whole/>
+    </dgm:dataModel>
+  </dgm:styleData>
+  <dgm:clrData>
+    <dgm:dataModel>
+      <dgm:ptLst>
+        <dgm:pt modelId="0" type="doc"/>
+        <dgm:pt modelId="1"/>
+        <dgm:pt modelId="2"/>
+        <dgm:pt modelId="3"/>
+        <dgm:pt modelId="4"/>
+      </dgm:ptLst>
+      <dgm:cxnLst>
+        <dgm:cxn modelId="5" srcId="0" destId="1" srcOrd="0" destOrd="0"/>
+        <dgm:cxn modelId="6" srcId="0" destId="2" srcOrd="1" destOrd="0"/>
+        <dgm:cxn modelId="7" srcId="0" destId="3" srcOrd="2" destOrd="0"/>
+        <dgm:cxn modelId="8" srcId="0" destId="4" srcOrd="3" destOrd="0"/>
+      </dgm:cxnLst>
+      <dgm:bg/>
+      <dgm:whole/>
+    </dgm:dataModel>
+  </dgm:clrData>
+  <dgm:layoutNode name="Name0">
+    <dgm:varLst>
+      <dgm:dir/>
+      <dgm:resizeHandles val="exact"/>
+    </dgm:varLst>
+    <dgm:choose name="Name1">
+      <dgm:if name="Name2" func="var" arg="dir" op="equ" val="norm">
+        <dgm:alg type="lin">
+          <dgm:param type="linDir" val="fromL"/>
+          <dgm:param type="fallback" val="2D"/>
+        </dgm:alg>
+      </dgm:if>
+      <dgm:else name="Name3">
+        <dgm:alg type="lin">
+          <dgm:param type="linDir" val="fromR"/>
+          <dgm:param type="fallback" val="2D"/>
+        </dgm:alg>
+      </dgm:else>
+    </dgm:choose>
+    <dgm:shape xmlns:r="http://schemas.openxmlformats.org/officeDocument/2006/relationships" r:blip="">
+      <dgm:adjLst/>
+    </dgm:shape>
+    <dgm:presOf/>
+    <dgm:choose name="Name4">
+      <dgm:if name="Name5" axis="ch" ptType="node" func="cnt" op="gte" val="3">
+        <dgm:constrLst>
+          <dgm:constr type="h" for="des" forName="node" refType="w" fact="0.5"/>
+          <dgm:constr type="w" for="ch" forName="lastNode" refType="w"/>
+          <dgm:constr type="w" for="des" forName="node" refType="h" refFor="des" refForName="node"/>
+          <dgm:constr type="w" for="ch" forName="sibTransLast" refType="h" refFor="des" refForName="node" fact="0.6"/>
+          <dgm:constr type="h" for="des" forName="sibTrans" refType="h" refFor="des" refForName="node" op="equ" fact="0.58"/>
+          <dgm:constr type="w" for="des" forName="sibTrans" refType="h" refFor="des" refForName="sibTrans" op="equ"/>
+          <dgm:constr type="primFontSz" for="ch" forName="lastNode" op="equ" val="65"/>
+          <dgm:constr type="primFontSz" for="des" forName="node" op="equ" val="65"/>
+          <dgm:constr type="primFontSz" for="des" forName="sibTrans" val="55"/>
+          <dgm:constr type="primFontSz" for="des" forName="sibTrans" refType="primFontSz" refFor="des" refForName="node" op="lte" fact="0.8"/>
+          <dgm:constr type="primFontSz" for="des" forName="connectorText" refType="primFontSz" refFor="des" refForName="node" op="lte" fact="0.8"/>
+          <dgm:constr type="primFontSz" for="des" forName="connectorText" refType="primFontSz" refFor="des" refForName="sibTrans" op="equ"/>
+          <dgm:constr type="h" for="des" forName="spacerT" refType="h" refFor="des" refForName="sibTrans" fact="0.14"/>
+          <dgm:constr type="h" for="des" forName="spacerB" refType="h" refFor="des" refForName="sibTrans" fact="0.14"/>
+        </dgm:constrLst>
+      </dgm:if>
+      <dgm:else name="Name6">
+        <dgm:constrLst>
+          <dgm:constr type="h" for="des" forName="node" refType="w"/>
+          <dgm:constr type="w" for="ch" forName="lastNode" refType="w"/>
+          <dgm:constr type="w" for="des" forName="node" refType="h" refFor="des" refForName="node"/>
+          <dgm:constr type="w" for="ch" forName="sibTransLast" refType="h" refFor="des" refForName="node" fact="0.6"/>
+          <dgm:constr type="h" for="des" forName="sibTrans" refType="h" refFor="des" refForName="node" op="equ" fact="0.58"/>
+          <dgm:constr type="w" for="des" forName="sibTrans" refType="h" refFor="des" refForName="sibTrans" op="equ"/>
+          <dgm:constr type="primFontSz" for="des" forName="node" val="65"/>
+          <dgm:constr type="primFontSz" for="ch" forName="lastNode" refType="primFontSz" refFor="des" refForName="node" op="equ"/>
+          <dgm:constr type="primFontSz" for="des" forName="sibTrans" val="55"/>
+          <dgm:constr type="primFontSz" for="des" forName="connectorText" refType="primFontSz" refFor="des" refForName="node" op="lte" fact="0.8"/>
+          <dgm:constr type="primFontSz" for="des" forName="connectorText" refType="primFontSz" refFor="des" refForName="sibTrans" op="equ"/>
+          <dgm:constr type="h" for="des" forName="spacerT" refType="h" refFor="des" refForName="sibTrans" fact="0.14"/>
+          <dgm:constr type="h" for="des" forName="spacerB" refType="h" refFor="des" refForName="sibTrans" fact="0.14"/>
+        </dgm:constrLst>
+      </dgm:else>
+    </dgm:choose>
+    <dgm:ruleLst/>
+    <dgm:choose name="Name7">
+      <dgm:if name="Name8" axis="ch" ptType="node" func="cnt" op="gte" val="1">
+        <dgm:layoutNode name="vNodes">
+          <dgm:alg type="lin">
+            <dgm:param type="linDir" val="fromT"/>
+            <dgm:param type="fallback" val="2D"/>
+          </dgm:alg>
+          <dgm:shape xmlns:r="http://schemas.openxmlformats.org/officeDocument/2006/relationships" r:blip="">
+            <dgm:adjLst/>
+          </dgm:shape>
+          <dgm:presOf/>
+          <dgm:constrLst/>
+          <dgm:ruleLst/>
+          <dgm:forEach name="Name9" axis="ch" ptType="node">
+            <dgm:choose name="Name10">
+              <dgm:if name="Name11" axis="self" func="revPos" op="neq" val="1">
+                <dgm:layoutNode name="node">
+                  <dgm:varLst>
+                    <dgm:bulletEnabled val="1"/>
+                  </dgm:varLst>
+                  <dgm:alg type="tx">
+                    <dgm:param type="txAnchorVertCh" val="mid"/>
+                  </dgm:alg>
+                  <dgm:shape xmlns:r="http://schemas.openxmlformats.org/officeDocument/2006/relationships" type="ellipse" r:blip="">
+                    <dgm:adjLst/>
+                  </dgm:shape>
+                  <dgm:presOf axis="desOrSelf" ptType="node"/>
+                  <dgm:constrLst>
+                    <dgm:constr type="tMarg" refType="primFontSz" fact="0.1"/>
+                    <dgm:constr type="bMarg" refType="primFontSz" fact="0.1"/>
+                    <dgm:constr type="lMarg" refType="primFontSz" fact="0.1"/>
+                    <dgm:constr type="rMarg" refType="primFontSz" fact="0.1"/>
+                  </dgm:constrLst>
+                  <dgm:ruleLst>
+                    <dgm:rule type="primFontSz" val="5" fact="NaN" max="NaN"/>
+                  </dgm:ruleLst>
+                </dgm:layoutNode>
+                <dgm:choose name="Name12">
+                  <dgm:if name="Name13" axis="self" ptType="node" func="revPos" op="gt" val="2">
+                    <dgm:forEach name="sibTransForEach" axis="followSib" ptType="sibTrans" cnt="1">
+                      <dgm:layoutNode name="spacerT">
+                        <dgm:alg type="sp"/>
+                        <dgm:shape xmlns:r="http://schemas.openxmlformats.org/officeDocument/2006/relationships" r:blip="">
+                          <dgm:adjLst/>
+                        </dgm:shape>
+                        <dgm:presOf axis="self"/>
+                        <dgm:constrLst/>
+                        <dgm:ruleLst/>
+                      </dgm:layoutNode>
+                      <dgm:layoutNode name="sibTrans">
+                        <dgm:alg type="tx"/>
+                        <dgm:shape xmlns:r="http://schemas.openxmlformats.org/officeDocument/2006/relationships" type="mathPlus" r:blip="">
+                          <dgm:adjLst/>
+                        </dgm:shape>
+                        <dgm:presOf axis="self"/>
+                        <dgm:constrLst>
+                          <dgm:constr type="h" refType="w"/>
+                          <dgm:constr type="lMarg"/>
+                          <dgm:constr type="rMarg"/>
+                          <dgm:constr type="tMarg"/>
+                          <dgm:constr type="bMarg"/>
+                        </dgm:constrLst>
+                        <dgm:ruleLst>
+                          <dgm:rule type="primFontSz" val="5" fact="NaN" max="NaN"/>
+                        </dgm:ruleLst>
+                      </dgm:layoutNode>
+                      <dgm:layoutNode name="spacerB">
+                        <dgm:alg type="sp"/>
+                        <dgm:shape xmlns:r="http://schemas.openxmlformats.org/officeDocument/2006/relationships" r:blip="">
+                          <dgm:adjLst/>
+                        </dgm:shape>
+                        <dgm:presOf axis="self"/>
+                        <dgm:constrLst/>
+                        <dgm:ruleLst/>
+                      </dgm:layoutNode>
+                    </dgm:forEach>
+                  </dgm:if>
+                  <dgm:else name="Name14"/>
+                </dgm:choose>
+              </dgm:if>
+              <dgm:else name="Name15"/>
+            </dgm:choose>
+          </dgm:forEach>
+        </dgm:layoutNode>
+        <dgm:choose name="Name16">
+          <dgm:if name="Name17" axis="ch" ptType="node" func="cnt" op="gt" val="1">
+            <dgm:layoutNode name="sibTransLast">
+              <dgm:alg type="conn">
+                <dgm:param type="begPts" val="auto"/>
+                <dgm:param type="endPts" val="auto"/>
+                <dgm:param type="srcNode" val="vNodes"/>
+                <dgm:param type="dstNode" val="lastNode"/>
+              </dgm:alg>
+              <dgm:shape xmlns:r="http://schemas.openxmlformats.org/officeDocument/2006/relationships" type="conn" r:blip="">
+                <dgm:adjLst/>
+              </dgm:shape>
+              <dgm:presOf axis="ch" ptType="sibTrans" st="-1" cnt="1"/>
+              <dgm:constrLst>
+                <dgm:constr type="h" refType="w" fact="0.62"/>
+                <dgm:constr type="connDist"/>
+                <dgm:constr type="begPad" refType="connDist" fact="0.25"/>
+                <dgm:constr type="endPad" refType="connDist" fact="0.22"/>
+              </dgm:constrLst>
+              <dgm:ruleLst/>
+              <dgm:layoutNode name="connectorText">
+                <dgm:alg type="tx">
+                  <dgm:param type="autoTxRot" val="grav"/>
+                </dgm:alg>
+                <dgm:shape xmlns:r="http://schemas.openxmlformats.org/officeDocument/2006/relationships" type="conn" r:blip="" hideGeom="1">
+                  <dgm:adjLst/>
+                </dgm:shape>
+                <dgm:presOf axis="ch desOrSelf" ptType="sibTrans sibTrans" st="-1 1" cnt="1 0"/>
+                <dgm:constrLst>
+                  <dgm:constr type="lMarg"/>
+                  <dgm:constr type="rMarg"/>
+                  <dgm:constr type="tMarg"/>
+                  <dgm:constr type="bMarg"/>
+                </dgm:constrLst>
+                <dgm:ruleLst>
+                  <dgm:rule type="primFontSz" val="5" fact="NaN" max="NaN"/>
+                </dgm:ruleLst>
+              </dgm:layoutNode>
+            </dgm:layoutNode>
+          </dgm:if>
+          <dgm:else name="Name18"/>
+        </dgm:choose>
+        <dgm:layoutNode name="lastNode">
+          <dgm:varLst>
+            <dgm:bulletEnabled val="1"/>
+          </dgm:varLst>
+          <dgm:alg type="tx">
+            <dgm:param type="txAnchorVertCh" val="mid"/>
+          </dgm:alg>
+          <dgm:shape xmlns:r="http://schemas.openxmlformats.org/officeDocument/2006/relationships" type="ellipse" r:blip="">
+            <dgm:adjLst/>
+          </dgm:shape>
+          <dgm:presOf axis="ch desOrSelf" ptType="node node" st="-1 1" cnt="1 0"/>
+          <dgm:constrLst>
+            <dgm:constr type="h" refType="w"/>
+            <dgm:constr type="tMarg" refType="primFontSz" fact="0.1"/>
+            <dgm:constr type="bMarg" refType="primFontSz" fact="0.1"/>
+            <dgm:constr type="lMarg" refType="primFontSz" fact="0.1"/>
+            <dgm:constr type="rMarg" refType="primFontSz" fact="0.1"/>
+          </dgm:constrLst>
+          <dgm:ruleLst>
+            <dgm:rule type="primFontSz" val="5" fact="NaN" max="NaN"/>
+          </dgm:ruleLst>
+        </dgm:layoutNode>
+      </dgm:if>
+      <dgm:else name="Name19"/>
+    </dgm:choose>
+  </dgm:layoutNode>
+</dgm:layoutDef>
 </file>
 
-<file path=ppt/diagrams/layout1.xml><?xml version="1.0" encoding="utf-8"?>
+<file path=ppt/diagrams/layout2.xml><?xml version="1.0" encoding="utf-8"?>
 <dgm:layoutDef xmlns:dgm="http://schemas.openxmlformats.org/drawingml/2006/diagram" xmlns:a="http://schemas.openxmlformats.org/drawingml/2006/main" uniqueId="urn:microsoft.com/office/officeart/2005/8/layout/hierarchy6">
   <dgm:title val=""/>
   <dgm:desc val=""/>
@@ -6833,271 +7097,6 @@
 </dgm:layoutDef>
 </file>
 
-<file path=ppt/diagrams/layout2.xml><?xml version="1.0" encoding="utf-8"?>
-<dgm:layoutDef xmlns:dgm="http://schemas.openxmlformats.org/drawingml/2006/diagram" xmlns:a="http://schemas.openxmlformats.org/drawingml/2006/main" uniqueId="urn:microsoft.com/office/officeart/2005/8/layout/equation2">
-  <dgm:title val=""/>
-  <dgm:desc val=""/>
-  <dgm:catLst>
-    <dgm:cat type="relationship" pri="18000"/>
-    <dgm:cat type="process" pri="26000"/>
-  </dgm:catLst>
-  <dgm:sampData useDef="1">
-    <dgm:dataModel>
-      <dgm:ptLst/>
-      <dgm:bg/>
-      <dgm:whole/>
-    </dgm:dataModel>
-  </dgm:sampData>
-  <dgm:styleData>
-    <dgm:dataModel>
-      <dgm:ptLst>
-        <dgm:pt modelId="0" type="doc"/>
-        <dgm:pt modelId="1"/>
-        <dgm:pt modelId="2"/>
-      </dgm:ptLst>
-      <dgm:cxnLst>
-        <dgm:cxn modelId="3" srcId="0" destId="1" srcOrd="0" destOrd="0"/>
-        <dgm:cxn modelId="4" srcId="0" destId="2" srcOrd="1" destOrd="0"/>
-      </dgm:cxnLst>
-      <dgm:bg/>
-      <dgm:whole/>
-    </dgm:dataModel>
-  </dgm:styleData>
-  <dgm:clrData>
-    <dgm:dataModel>
-      <dgm:ptLst>
-        <dgm:pt modelId="0" type="doc"/>
-        <dgm:pt modelId="1"/>
-        <dgm:pt modelId="2"/>
-        <dgm:pt modelId="3"/>
-        <dgm:pt modelId="4"/>
-      </dgm:ptLst>
-      <dgm:cxnLst>
-        <dgm:cxn modelId="5" srcId="0" destId="1" srcOrd="0" destOrd="0"/>
-        <dgm:cxn modelId="6" srcId="0" destId="2" srcOrd="1" destOrd="0"/>
-        <dgm:cxn modelId="7" srcId="0" destId="3" srcOrd="2" destOrd="0"/>
-        <dgm:cxn modelId="8" srcId="0" destId="4" srcOrd="3" destOrd="0"/>
-      </dgm:cxnLst>
-      <dgm:bg/>
-      <dgm:whole/>
-    </dgm:dataModel>
-  </dgm:clrData>
-  <dgm:layoutNode name="Name0">
-    <dgm:varLst>
-      <dgm:dir/>
-      <dgm:resizeHandles val="exact"/>
-    </dgm:varLst>
-    <dgm:choose name="Name1">
-      <dgm:if name="Name2" func="var" arg="dir" op="equ" val="norm">
-        <dgm:alg type="lin">
-          <dgm:param type="linDir" val="fromL"/>
-          <dgm:param type="fallback" val="2D"/>
-        </dgm:alg>
-      </dgm:if>
-      <dgm:else name="Name3">
-        <dgm:alg type="lin">
-          <dgm:param type="linDir" val="fromR"/>
-          <dgm:param type="fallback" val="2D"/>
-        </dgm:alg>
-      </dgm:else>
-    </dgm:choose>
-    <dgm:shape xmlns:r="http://schemas.openxmlformats.org/officeDocument/2006/relationships" r:blip="">
-      <dgm:adjLst/>
-    </dgm:shape>
-    <dgm:presOf/>
-    <dgm:choose name="Name4">
-      <dgm:if name="Name5" axis="ch" ptType="node" func="cnt" op="gte" val="3">
-        <dgm:constrLst>
-          <dgm:constr type="h" for="des" forName="node" refType="w" fact="0.5"/>
-          <dgm:constr type="w" for="ch" forName="lastNode" refType="w"/>
-          <dgm:constr type="w" for="des" forName="node" refType="h" refFor="des" refForName="node"/>
-          <dgm:constr type="w" for="ch" forName="sibTransLast" refType="h" refFor="des" refForName="node" fact="0.6"/>
-          <dgm:constr type="h" for="des" forName="sibTrans" refType="h" refFor="des" refForName="node" op="equ" fact="0.58"/>
-          <dgm:constr type="w" for="des" forName="sibTrans" refType="h" refFor="des" refForName="sibTrans" op="equ"/>
-          <dgm:constr type="primFontSz" for="ch" forName="lastNode" op="equ" val="65"/>
-          <dgm:constr type="primFontSz" for="des" forName="node" op="equ" val="65"/>
-          <dgm:constr type="primFontSz" for="des" forName="sibTrans" val="55"/>
-          <dgm:constr type="primFontSz" for="des" forName="sibTrans" refType="primFontSz" refFor="des" refForName="node" op="lte" fact="0.8"/>
-          <dgm:constr type="primFontSz" for="des" forName="connectorText" refType="primFontSz" refFor="des" refForName="node" op="lte" fact="0.8"/>
-          <dgm:constr type="primFontSz" for="des" forName="connectorText" refType="primFontSz" refFor="des" refForName="sibTrans" op="equ"/>
-          <dgm:constr type="h" for="des" forName="spacerT" refType="h" refFor="des" refForName="sibTrans" fact="0.14"/>
-          <dgm:constr type="h" for="des" forName="spacerB" refType="h" refFor="des" refForName="sibTrans" fact="0.14"/>
-        </dgm:constrLst>
-      </dgm:if>
-      <dgm:else name="Name6">
-        <dgm:constrLst>
-          <dgm:constr type="h" for="des" forName="node" refType="w"/>
-          <dgm:constr type="w" for="ch" forName="lastNode" refType="w"/>
-          <dgm:constr type="w" for="des" forName="node" refType="h" refFor="des" refForName="node"/>
-          <dgm:constr type="w" for="ch" forName="sibTransLast" refType="h" refFor="des" refForName="node" fact="0.6"/>
-          <dgm:constr type="h" for="des" forName="sibTrans" refType="h" refFor="des" refForName="node" op="equ" fact="0.58"/>
-          <dgm:constr type="w" for="des" forName="sibTrans" refType="h" refFor="des" refForName="sibTrans" op="equ"/>
-          <dgm:constr type="primFontSz" for="des" forName="node" val="65"/>
-          <dgm:constr type="primFontSz" for="ch" forName="lastNode" refType="primFontSz" refFor="des" refForName="node" op="equ"/>
-          <dgm:constr type="primFontSz" for="des" forName="sibTrans" val="55"/>
-          <dgm:constr type="primFontSz" for="des" forName="connectorText" refType="primFontSz" refFor="des" refForName="node" op="lte" fact="0.8"/>
-          <dgm:constr type="primFontSz" for="des" forName="connectorText" refType="primFontSz" refFor="des" refForName="sibTrans" op="equ"/>
-          <dgm:constr type="h" for="des" forName="spacerT" refType="h" refFor="des" refForName="sibTrans" fact="0.14"/>
-          <dgm:constr type="h" for="des" forName="spacerB" refType="h" refFor="des" refForName="sibTrans" fact="0.14"/>
-        </dgm:constrLst>
-      </dgm:else>
-    </dgm:choose>
-    <dgm:ruleLst/>
-    <dgm:choose name="Name7">
-      <dgm:if name="Name8" axis="ch" ptType="node" func="cnt" op="gte" val="1">
-        <dgm:layoutNode name="vNodes">
-          <dgm:alg type="lin">
-            <dgm:param type="linDir" val="fromT"/>
-            <dgm:param type="fallback" val="2D"/>
-          </dgm:alg>
-          <dgm:shape xmlns:r="http://schemas.openxmlformats.org/officeDocument/2006/relationships" r:blip="">
-            <dgm:adjLst/>
-          </dgm:shape>
-          <dgm:presOf/>
-          <dgm:constrLst/>
-          <dgm:ruleLst/>
-          <dgm:forEach name="Name9" axis="ch" ptType="node">
-            <dgm:choose name="Name10">
-              <dgm:if name="Name11" axis="self" func="revPos" op="neq" val="1">
-                <dgm:layoutNode name="node">
-                  <dgm:varLst>
-                    <dgm:bulletEnabled val="1"/>
-                  </dgm:varLst>
-                  <dgm:alg type="tx">
-                    <dgm:param type="txAnchorVertCh" val="mid"/>
-                  </dgm:alg>
-                  <dgm:shape xmlns:r="http://schemas.openxmlformats.org/officeDocument/2006/relationships" type="ellipse" r:blip="">
-                    <dgm:adjLst/>
-                  </dgm:shape>
-                  <dgm:presOf axis="desOrSelf" ptType="node"/>
-                  <dgm:constrLst>
-                    <dgm:constr type="tMarg" refType="primFontSz" fact="0.1"/>
-                    <dgm:constr type="bMarg" refType="primFontSz" fact="0.1"/>
-                    <dgm:constr type="lMarg" refType="primFontSz" fact="0.1"/>
-                    <dgm:constr type="rMarg" refType="primFontSz" fact="0.1"/>
-                  </dgm:constrLst>
-                  <dgm:ruleLst>
-                    <dgm:rule type="primFontSz" val="5" fact="NaN" max="NaN"/>
-                  </dgm:ruleLst>
-                </dgm:layoutNode>
-                <dgm:choose name="Name12">
-                  <dgm:if name="Name13" axis="self" ptType="node" func="revPos" op="gt" val="2">
-                    <dgm:forEach name="sibTransForEach" axis="followSib" ptType="sibTrans" cnt="1">
-                      <dgm:layoutNode name="spacerT">
-                        <dgm:alg type="sp"/>
-                        <dgm:shape xmlns:r="http://schemas.openxmlformats.org/officeDocument/2006/relationships" r:blip="">
-                          <dgm:adjLst/>
-                        </dgm:shape>
-                        <dgm:presOf axis="self"/>
-                        <dgm:constrLst/>
-                        <dgm:ruleLst/>
-                      </dgm:layoutNode>
-                      <dgm:layoutNode name="sibTrans">
-                        <dgm:alg type="tx"/>
-                        <dgm:shape xmlns:r="http://schemas.openxmlformats.org/officeDocument/2006/relationships" type="mathPlus" r:blip="">
-                          <dgm:adjLst/>
-                        </dgm:shape>
-                        <dgm:presOf axis="self"/>
-                        <dgm:constrLst>
-                          <dgm:constr type="h" refType="w"/>
-                          <dgm:constr type="lMarg"/>
-                          <dgm:constr type="rMarg"/>
-                          <dgm:constr type="tMarg"/>
-                          <dgm:constr type="bMarg"/>
-                        </dgm:constrLst>
-                        <dgm:ruleLst>
-                          <dgm:rule type="primFontSz" val="5" fact="NaN" max="NaN"/>
-                        </dgm:ruleLst>
-                      </dgm:layoutNode>
-                      <dgm:layoutNode name="spacerB">
-                        <dgm:alg type="sp"/>
-                        <dgm:shape xmlns:r="http://schemas.openxmlformats.org/officeDocument/2006/relationships" r:blip="">
-                          <dgm:adjLst/>
-                        </dgm:shape>
-                        <dgm:presOf axis="self"/>
-                        <dgm:constrLst/>
-                        <dgm:ruleLst/>
-                      </dgm:layoutNode>
-                    </dgm:forEach>
-                  </dgm:if>
-                  <dgm:else name="Name14"/>
-                </dgm:choose>
-              </dgm:if>
-              <dgm:else name="Name15"/>
-            </dgm:choose>
-          </dgm:forEach>
-        </dgm:layoutNode>
-        <dgm:choose name="Name16">
-          <dgm:if name="Name17" axis="ch" ptType="node" func="cnt" op="gt" val="1">
-            <dgm:layoutNode name="sibTransLast">
-              <dgm:alg type="conn">
-                <dgm:param type="begPts" val="auto"/>
-                <dgm:param type="endPts" val="auto"/>
-                <dgm:param type="srcNode" val="vNodes"/>
-                <dgm:param type="dstNode" val="lastNode"/>
-              </dgm:alg>
-              <dgm:shape xmlns:r="http://schemas.openxmlformats.org/officeDocument/2006/relationships" type="conn" r:blip="">
-                <dgm:adjLst/>
-              </dgm:shape>
-              <dgm:presOf axis="ch" ptType="sibTrans" st="-1" cnt="1"/>
-              <dgm:constrLst>
-                <dgm:constr type="h" refType="w" fact="0.62"/>
-                <dgm:constr type="connDist"/>
-                <dgm:constr type="begPad" refType="connDist" fact="0.25"/>
-                <dgm:constr type="endPad" refType="connDist" fact="0.22"/>
-              </dgm:constrLst>
-              <dgm:ruleLst/>
-              <dgm:layoutNode name="connectorText">
-                <dgm:alg type="tx">
-                  <dgm:param type="autoTxRot" val="grav"/>
-                </dgm:alg>
-                <dgm:shape xmlns:r="http://schemas.openxmlformats.org/officeDocument/2006/relationships" type="conn" r:blip="" hideGeom="1">
-                  <dgm:adjLst/>
-                </dgm:shape>
-                <dgm:presOf axis="ch desOrSelf" ptType="sibTrans sibTrans" st="-1 1" cnt="1 0"/>
-                <dgm:constrLst>
-                  <dgm:constr type="lMarg"/>
-                  <dgm:constr type="rMarg"/>
-                  <dgm:constr type="tMarg"/>
-                  <dgm:constr type="bMarg"/>
-                </dgm:constrLst>
-                <dgm:ruleLst>
-                  <dgm:rule type="primFontSz" val="5" fact="NaN" max="NaN"/>
-                </dgm:ruleLst>
-              </dgm:layoutNode>
-            </dgm:layoutNode>
-          </dgm:if>
-          <dgm:else name="Name18"/>
-        </dgm:choose>
-        <dgm:layoutNode name="lastNode">
-          <dgm:varLst>
-            <dgm:bulletEnabled val="1"/>
-          </dgm:varLst>
-          <dgm:alg type="tx">
-            <dgm:param type="txAnchorVertCh" val="mid"/>
-          </dgm:alg>
-          <dgm:shape xmlns:r="http://schemas.openxmlformats.org/officeDocument/2006/relationships" type="ellipse" r:blip="">
-            <dgm:adjLst/>
-          </dgm:shape>
-          <dgm:presOf axis="ch desOrSelf" ptType="node node" st="-1 1" cnt="1 0"/>
-          <dgm:constrLst>
-            <dgm:constr type="h" refType="w"/>
-            <dgm:constr type="tMarg" refType="primFontSz" fact="0.1"/>
-            <dgm:constr type="bMarg" refType="primFontSz" fact="0.1"/>
-            <dgm:constr type="lMarg" refType="primFontSz" fact="0.1"/>
-            <dgm:constr type="rMarg" refType="primFontSz" fact="0.1"/>
-          </dgm:constrLst>
-          <dgm:ruleLst>
-            <dgm:rule type="primFontSz" val="5" fact="NaN" max="NaN"/>
-          </dgm:ruleLst>
-        </dgm:layoutNode>
-      </dgm:if>
-      <dgm:else name="Name19"/>
-    </dgm:choose>
-  </dgm:layoutNode>
-</dgm:layoutDef>
-</file>
-
 <file path=ppt/diagrams/quickStyle1.xml><?xml version="1.0" encoding="utf-8"?>
 <dgm:styleDef xmlns:dgm="http://schemas.openxmlformats.org/drawingml/2006/diagram" xmlns:a="http://schemas.openxmlformats.org/drawingml/2006/main" uniqueId="urn:microsoft.com/office/officeart/2005/8/quickstyle/simple1">
   <dgm:title val=""/>
@@ -9249,7 +9248,7 @@
             <a:fld id="{0E0FD8BF-4915-47C0-982D-E1A4592E6198}" type="datetimeFigureOut">
               <a:rPr lang="en-US" smtClean="0"/>
               <a:pPr/>
-              <a:t>5/3/2012</a:t>
+              <a:t>5/10/2012</a:t>
             </a:fld>
             <a:endParaRPr lang="en-US"/>
           </a:p>
@@ -9420,7 +9419,7 @@
     </p:spTree>
     <p:extLst>
       <p:ext uri="{BB962C8B-B14F-4D97-AF65-F5344CB8AC3E}">
-        <p14:creationId xmlns="" xmlns:p14="http://schemas.microsoft.com/office/powerpoint/2010/main" val="1288045321"/>
+        <p14:creationId xmlns:p14="http://schemas.microsoft.com/office/powerpoint/2010/main" xmlns="" val="1288045321"/>
       </p:ext>
     </p:extLst>
   </p:cSld>
@@ -9588,89 +9587,7 @@
             <a:fld id="{A7DB1122-458A-4FFA-AE6C-1CB8E92A3C76}" type="slidenum">
               <a:rPr lang="en-US" smtClean="0"/>
               <a:pPr/>
-              <a:t>13</a:t>
-            </a:fld>
-            <a:endParaRPr lang="en-US"/>
-          </a:p>
-        </p:txBody>
-      </p:sp>
-    </p:spTree>
-  </p:cSld>
-  <p:clrMapOvr>
-    <a:masterClrMapping/>
-  </p:clrMapOvr>
-</p:notes>
-</file>
-
-<file path=ppt/notesSlides/notesSlide2.xml><?xml version="1.0" encoding="utf-8"?>
-<p:notes xmlns:a="http://schemas.openxmlformats.org/drawingml/2006/main" xmlns:r="http://schemas.openxmlformats.org/officeDocument/2006/relationships" xmlns:p="http://schemas.openxmlformats.org/presentationml/2006/main">
-  <p:cSld>
-    <p:spTree>
-      <p:nvGrpSpPr>
-        <p:cNvPr id="1" name=""/>
-        <p:cNvGrpSpPr/>
-        <p:nvPr/>
-      </p:nvGrpSpPr>
-      <p:grpSpPr>
-        <a:xfrm>
-          <a:off x="0" y="0"/>
-          <a:ext cx="0" cy="0"/>
-          <a:chOff x="0" y="0"/>
-          <a:chExt cx="0" cy="0"/>
-        </a:xfrm>
-      </p:grpSpPr>
-      <p:sp>
-        <p:nvSpPr>
-          <p:cNvPr id="2" name="Slide Image Placeholder 1"/>
-          <p:cNvSpPr>
-            <a:spLocks noGrp="1" noRot="1" noChangeAspect="1"/>
-          </p:cNvSpPr>
-          <p:nvPr>
-            <p:ph type="sldImg"/>
-          </p:nvPr>
-        </p:nvSpPr>
-        <p:spPr/>
-      </p:sp>
-      <p:sp>
-        <p:nvSpPr>
-          <p:cNvPr id="3" name="Notes Placeholder 2"/>
-          <p:cNvSpPr>
-            <a:spLocks noGrp="1"/>
-          </p:cNvSpPr>
-          <p:nvPr>
-            <p:ph type="body" idx="1"/>
-          </p:nvPr>
-        </p:nvSpPr>
-        <p:spPr/>
-        <p:txBody>
-          <a:bodyPr>
-            <a:normAutofit/>
-          </a:bodyPr>
-          <a:lstStyle/>
-          <a:p>
-            <a:endParaRPr lang="en-US" dirty="0"/>
-          </a:p>
-        </p:txBody>
-      </p:sp>
-      <p:sp>
-        <p:nvSpPr>
-          <p:cNvPr id="4" name="Slide Number Placeholder 3"/>
-          <p:cNvSpPr>
-            <a:spLocks noGrp="1"/>
-          </p:cNvSpPr>
-          <p:nvPr>
-            <p:ph type="sldNum" sz="quarter" idx="10"/>
-          </p:nvPr>
-        </p:nvSpPr>
-        <p:spPr/>
-        <p:txBody>
-          <a:bodyPr/>
-          <a:lstStyle/>
-          <a:p>
-            <a:fld id="{A7DB1122-458A-4FFA-AE6C-1CB8E92A3C76}" type="slidenum">
-              <a:rPr lang="en-US" smtClean="0"/>
-              <a:pPr/>
-              <a:t>14</a:t>
+              <a:t>15</a:t>
             </a:fld>
             <a:endParaRPr lang="en-US"/>
           </a:p>
@@ -9866,7 +9783,7 @@
             <a:fld id="{3A0C61A8-A647-4A83-B149-729257AFD983}" type="datetimeFigureOut">
               <a:rPr lang="en-US" smtClean="0"/>
               <a:pPr/>
-              <a:t>5/3/2012</a:t>
+              <a:t>5/10/2012</a:t>
             </a:fld>
             <a:endParaRPr lang="en-US"/>
           </a:p>
@@ -10033,7 +9950,7 @@
             <a:fld id="{3A0C61A8-A647-4A83-B149-729257AFD983}" type="datetimeFigureOut">
               <a:rPr lang="en-US" smtClean="0"/>
               <a:pPr/>
-              <a:t>5/3/2012</a:t>
+              <a:t>5/10/2012</a:t>
             </a:fld>
             <a:endParaRPr lang="en-US"/>
           </a:p>
@@ -10210,7 +10127,7 @@
             <a:fld id="{3A0C61A8-A647-4A83-B149-729257AFD983}" type="datetimeFigureOut">
               <a:rPr lang="en-US" smtClean="0"/>
               <a:pPr/>
-              <a:t>5/3/2012</a:t>
+              <a:t>5/10/2012</a:t>
             </a:fld>
             <a:endParaRPr lang="en-US"/>
           </a:p>
@@ -10377,7 +10294,7 @@
             <a:fld id="{3A0C61A8-A647-4A83-B149-729257AFD983}" type="datetimeFigureOut">
               <a:rPr lang="en-US" smtClean="0"/>
               <a:pPr/>
-              <a:t>5/3/2012</a:t>
+              <a:t>5/10/2012</a:t>
             </a:fld>
             <a:endParaRPr lang="en-US"/>
           </a:p>
@@ -10620,7 +10537,7 @@
             <a:fld id="{3A0C61A8-A647-4A83-B149-729257AFD983}" type="datetimeFigureOut">
               <a:rPr lang="en-US" smtClean="0"/>
               <a:pPr/>
-              <a:t>5/3/2012</a:t>
+              <a:t>5/10/2012</a:t>
             </a:fld>
             <a:endParaRPr lang="en-US"/>
           </a:p>
@@ -10905,7 +10822,7 @@
             <a:fld id="{3A0C61A8-A647-4A83-B149-729257AFD983}" type="datetimeFigureOut">
               <a:rPr lang="en-US" smtClean="0"/>
               <a:pPr/>
-              <a:t>5/3/2012</a:t>
+              <a:t>5/10/2012</a:t>
             </a:fld>
             <a:endParaRPr lang="en-US"/>
           </a:p>
@@ -11324,7 +11241,7 @@
             <a:fld id="{3A0C61A8-A647-4A83-B149-729257AFD983}" type="datetimeFigureOut">
               <a:rPr lang="en-US" smtClean="0"/>
               <a:pPr/>
-              <a:t>5/3/2012</a:t>
+              <a:t>5/10/2012</a:t>
             </a:fld>
             <a:endParaRPr lang="en-US"/>
           </a:p>
@@ -11439,7 +11356,7 @@
             <a:fld id="{3A0C61A8-A647-4A83-B149-729257AFD983}" type="datetimeFigureOut">
               <a:rPr lang="en-US" smtClean="0"/>
               <a:pPr/>
-              <a:t>5/3/2012</a:t>
+              <a:t>5/10/2012</a:t>
             </a:fld>
             <a:endParaRPr lang="en-US"/>
           </a:p>
@@ -11531,7 +11448,7 @@
             <a:fld id="{3A0C61A8-A647-4A83-B149-729257AFD983}" type="datetimeFigureOut">
               <a:rPr lang="en-US" smtClean="0"/>
               <a:pPr/>
-              <a:t>5/3/2012</a:t>
+              <a:t>5/10/2012</a:t>
             </a:fld>
             <a:endParaRPr lang="en-US"/>
           </a:p>
@@ -11805,7 +11722,7 @@
             <a:fld id="{3A0C61A8-A647-4A83-B149-729257AFD983}" type="datetimeFigureOut">
               <a:rPr lang="en-US" smtClean="0"/>
               <a:pPr/>
-              <a:t>5/3/2012</a:t>
+              <a:t>5/10/2012</a:t>
             </a:fld>
             <a:endParaRPr lang="en-US"/>
           </a:p>
@@ -12055,7 +11972,7 @@
             <a:fld id="{3A0C61A8-A647-4A83-B149-729257AFD983}" type="datetimeFigureOut">
               <a:rPr lang="en-US" smtClean="0"/>
               <a:pPr/>
-              <a:t>5/3/2012</a:t>
+              <a:t>5/10/2012</a:t>
             </a:fld>
             <a:endParaRPr lang="en-US"/>
           </a:p>
@@ -12265,7 +12182,7 @@
             <a:fld id="{3A0C61A8-A647-4A83-B149-729257AFD983}" type="datetimeFigureOut">
               <a:rPr lang="en-US" smtClean="0"/>
               <a:pPr/>
-              <a:t>5/3/2012</a:t>
+              <a:t>5/10/2012</a:t>
             </a:fld>
             <a:endParaRPr lang="en-US"/>
           </a:p>
@@ -12775,6 +12692,486 @@
 </file>
 
 <file path=ppt/slides/slide10.xml><?xml version="1.0" encoding="utf-8"?>
+<p:sld xmlns:a="http://schemas.openxmlformats.org/drawingml/2006/main" xmlns:r="http://schemas.openxmlformats.org/officeDocument/2006/relationships" xmlns:p="http://schemas.openxmlformats.org/presentationml/2006/main">
+  <p:cSld>
+    <p:bg>
+      <p:bgPr>
+        <a:solidFill>
+          <a:srgbClr val="1B325F"/>
+        </a:solidFill>
+        <a:effectLst/>
+      </p:bgPr>
+    </p:bg>
+    <p:spTree>
+      <p:nvGrpSpPr>
+        <p:cNvPr id="1" name=""/>
+        <p:cNvGrpSpPr/>
+        <p:nvPr/>
+      </p:nvGrpSpPr>
+      <p:grpSpPr>
+        <a:xfrm>
+          <a:off x="0" y="0"/>
+          <a:ext cx="0" cy="0"/>
+          <a:chOff x="0" y="0"/>
+          <a:chExt cx="0" cy="0"/>
+        </a:xfrm>
+      </p:grpSpPr>
+      <p:pic>
+        <p:nvPicPr>
+          <p:cNvPr id="1026" name="Picture 2" descr="E:\Projects\ModernSteward\Presentation\images\256px.png"/>
+          <p:cNvPicPr>
+            <a:picLocks noChangeAspect="1" noChangeArrowheads="1"/>
+          </p:cNvPicPr>
+          <p:nvPr/>
+        </p:nvPicPr>
+        <p:blipFill>
+          <a:blip r:embed="rId2" cstate="print"/>
+          <a:srcRect/>
+          <a:stretch>
+            <a:fillRect/>
+          </a:stretch>
+        </p:blipFill>
+        <p:spPr bwMode="auto">
+          <a:xfrm>
+            <a:off x="2971800" y="2438400"/>
+            <a:ext cx="3251200" cy="3251200"/>
+          </a:xfrm>
+          <a:prstGeom prst="rect">
+            <a:avLst/>
+          </a:prstGeom>
+          <a:noFill/>
+        </p:spPr>
+      </p:pic>
+      <p:sp>
+        <p:nvSpPr>
+          <p:cNvPr id="4" name="Rectangle 3"/>
+          <p:cNvSpPr/>
+          <p:nvPr/>
+        </p:nvSpPr>
+        <p:spPr>
+          <a:xfrm>
+            <a:off x="623808" y="1896070"/>
+            <a:ext cx="8032968" cy="923330"/>
+          </a:xfrm>
+          <a:prstGeom prst="rect">
+            <a:avLst/>
+          </a:prstGeom>
+          <a:noFill/>
+          <a:ln>
+            <a:noFill/>
+          </a:ln>
+        </p:spPr>
+        <p:txBody>
+          <a:bodyPr wrap="none" lIns="91440" tIns="45720" rIns="91440" bIns="45720">
+            <a:spAutoFit/>
+          </a:bodyPr>
+          <a:lstStyle/>
+          <a:p>
+            <a:r>
+              <a:rPr lang="ru-RU" sz="5400" b="1" dirty="0" smtClean="0">
+                <a:ln w="12700">
+                  <a:solidFill>
+                    <a:schemeClr val="tx1">
+                      <a:lumMod val="95000"/>
+                      <a:lumOff val="5000"/>
+                    </a:schemeClr>
+                  </a:solidFill>
+                  <a:prstDash val="solid"/>
+                </a:ln>
+                <a:solidFill>
+                  <a:srgbClr val="9CC4E4"/>
+                </a:solidFill>
+                <a:effectLst>
+                  <a:outerShdw blurRad="41275" dist="20320" dir="1800000" algn="tl" rotWithShape="0">
+                    <a:srgbClr val="000000">
+                      <a:alpha val="40000"/>
+                    </a:srgbClr>
+                  </a:outerShdw>
+                </a:effectLst>
+              </a:rPr>
+              <a:t>И на вас ли ви се пие чай?</a:t>
+            </a:r>
+          </a:p>
+        </p:txBody>
+      </p:sp>
+    </p:spTree>
+  </p:cSld>
+  <p:clrMapOvr>
+    <a:masterClrMapping/>
+  </p:clrMapOvr>
+  <p:timing>
+    <p:tnLst>
+      <p:par>
+        <p:cTn id="1" dur="indefinite" restart="never" nodeType="tmRoot"/>
+      </p:par>
+    </p:tnLst>
+  </p:timing>
+</p:sld>
+</file>
+
+<file path=ppt/slides/slide11.xml><?xml version="1.0" encoding="utf-8"?>
+<p:sld xmlns:a="http://schemas.openxmlformats.org/drawingml/2006/main" xmlns:r="http://schemas.openxmlformats.org/officeDocument/2006/relationships" xmlns:p="http://schemas.openxmlformats.org/presentationml/2006/main">
+  <p:cSld>
+    <p:bg>
+      <p:bgPr>
+        <a:solidFill>
+          <a:srgbClr val="1B325F"/>
+        </a:solidFill>
+        <a:effectLst/>
+      </p:bgPr>
+    </p:bg>
+    <p:spTree>
+      <p:nvGrpSpPr>
+        <p:cNvPr id="1" name=""/>
+        <p:cNvGrpSpPr/>
+        <p:nvPr/>
+      </p:nvGrpSpPr>
+      <p:grpSpPr>
+        <a:xfrm>
+          <a:off x="0" y="0"/>
+          <a:ext cx="0" cy="0"/>
+          <a:chOff x="0" y="0"/>
+          <a:chExt cx="0" cy="0"/>
+        </a:xfrm>
+      </p:grpSpPr>
+      <p:sp>
+        <p:nvSpPr>
+          <p:cNvPr id="2" name="Rectangle 1"/>
+          <p:cNvSpPr/>
+          <p:nvPr/>
+        </p:nvSpPr>
+        <p:spPr>
+          <a:xfrm>
+            <a:off x="304800" y="228600"/>
+            <a:ext cx="5243038" cy="738664"/>
+          </a:xfrm>
+          <a:prstGeom prst="rect">
+            <a:avLst/>
+          </a:prstGeom>
+          <a:noFill/>
+          <a:ln>
+            <a:noFill/>
+          </a:ln>
+        </p:spPr>
+        <p:txBody>
+          <a:bodyPr wrap="none" lIns="91440" tIns="45720" rIns="91440" bIns="45720">
+            <a:spAutoFit/>
+          </a:bodyPr>
+          <a:lstStyle/>
+          <a:p>
+            <a:r>
+              <a:rPr lang="bg-BG" sz="4200" b="1" dirty="0" smtClean="0">
+                <a:ln w="12700">
+                  <a:solidFill>
+                    <a:schemeClr val="tx1">
+                      <a:lumMod val="95000"/>
+                      <a:lumOff val="5000"/>
+                    </a:schemeClr>
+                  </a:solidFill>
+                  <a:prstDash val="solid"/>
+                </a:ln>
+                <a:solidFill>
+                  <a:srgbClr val="9CC4E4"/>
+                </a:solidFill>
+                <a:effectLst>
+                  <a:outerShdw blurRad="41275" dist="20320" dir="1800000" algn="tl" rotWithShape="0">
+                    <a:srgbClr val="000000">
+                      <a:alpha val="40000"/>
+                    </a:srgbClr>
+                  </a:outerShdw>
+                </a:effectLst>
+              </a:rPr>
+              <a:t>Какво е граматиката?</a:t>
+            </a:r>
+          </a:p>
+        </p:txBody>
+      </p:sp>
+      <p:graphicFrame>
+        <p:nvGraphicFramePr>
+          <p:cNvPr id="4" name="Diagram 3"/>
+          <p:cNvGraphicFramePr/>
+          <p:nvPr/>
+        </p:nvGraphicFramePr>
+        <p:xfrm>
+          <a:off x="92439" y="914400"/>
+          <a:ext cx="8915400" cy="5867400"/>
+        </p:xfrm>
+        <a:graphic>
+          <a:graphicData uri="http://schemas.openxmlformats.org/drawingml/2006/diagram">
+            <dgm:relIds xmlns:dgm="http://schemas.openxmlformats.org/drawingml/2006/diagram" xmlns:r="http://schemas.openxmlformats.org/officeDocument/2006/relationships" r:dm="rId2" r:lo="rId3" r:qs="rId4" r:cs="rId5"/>
+          </a:graphicData>
+        </a:graphic>
+      </p:graphicFrame>
+      <p:sp>
+        <p:nvSpPr>
+          <p:cNvPr id="5" name="Rectangle 4"/>
+          <p:cNvSpPr/>
+          <p:nvPr/>
+        </p:nvSpPr>
+        <p:spPr>
+          <a:xfrm>
+            <a:off x="7010400" y="914400"/>
+            <a:ext cx="1600200" cy="304800"/>
+          </a:xfrm>
+          <a:prstGeom prst="rect">
+            <a:avLst/>
+          </a:prstGeom>
+          <a:ln>
+            <a:solidFill>
+              <a:schemeClr val="bg1"/>
+            </a:solidFill>
+          </a:ln>
+        </p:spPr>
+        <p:style>
+          <a:lnRef idx="2">
+            <a:schemeClr val="accent1">
+              <a:shade val="50000"/>
+            </a:schemeClr>
+          </a:lnRef>
+          <a:fillRef idx="1">
+            <a:schemeClr val="accent1"/>
+          </a:fillRef>
+          <a:effectRef idx="0">
+            <a:schemeClr val="accent1"/>
+          </a:effectRef>
+          <a:fontRef idx="minor">
+            <a:schemeClr val="lt1"/>
+          </a:fontRef>
+        </p:style>
+        <p:txBody>
+          <a:bodyPr rtlCol="0" anchor="ctr"/>
+          <a:lstStyle/>
+          <a:p>
+            <a:pPr algn="ctr"/>
+            <a:r>
+              <a:rPr lang="bg-BG" sz="1100" dirty="0" smtClean="0"/>
+              <a:t>Задължителен елемент</a:t>
+            </a:r>
+          </a:p>
+        </p:txBody>
+      </p:sp>
+      <p:sp>
+        <p:nvSpPr>
+          <p:cNvPr id="6" name="Rectangle 5"/>
+          <p:cNvSpPr/>
+          <p:nvPr/>
+        </p:nvSpPr>
+        <p:spPr>
+          <a:xfrm>
+            <a:off x="7010400" y="1295400"/>
+            <a:ext cx="1600200" cy="304800"/>
+          </a:xfrm>
+          <a:prstGeom prst="rect">
+            <a:avLst/>
+          </a:prstGeom>
+          <a:solidFill>
+            <a:srgbClr val="9CC4E4"/>
+          </a:solidFill>
+          <a:ln>
+            <a:solidFill>
+              <a:schemeClr val="bg1"/>
+            </a:solidFill>
+          </a:ln>
+        </p:spPr>
+        <p:style>
+          <a:lnRef idx="2">
+            <a:schemeClr val="accent1">
+              <a:shade val="50000"/>
+            </a:schemeClr>
+          </a:lnRef>
+          <a:fillRef idx="1">
+            <a:schemeClr val="accent1"/>
+          </a:fillRef>
+          <a:effectRef idx="0">
+            <a:schemeClr val="accent1"/>
+          </a:effectRef>
+          <a:fontRef idx="minor">
+            <a:schemeClr val="lt1"/>
+          </a:fontRef>
+        </p:style>
+        <p:txBody>
+          <a:bodyPr rtlCol="0" anchor="ctr"/>
+          <a:lstStyle/>
+          <a:p>
+            <a:pPr algn="ctr"/>
+            <a:r>
+              <a:rPr lang="bg-BG" sz="1100" dirty="0" smtClean="0"/>
+              <a:t>Избираем елемент</a:t>
+            </a:r>
+          </a:p>
+        </p:txBody>
+      </p:sp>
+      <p:sp>
+        <p:nvSpPr>
+          <p:cNvPr id="7" name="Rectangle 6"/>
+          <p:cNvSpPr/>
+          <p:nvPr/>
+        </p:nvSpPr>
+        <p:spPr>
+          <a:xfrm>
+            <a:off x="7010400" y="1676400"/>
+            <a:ext cx="1600200" cy="304800"/>
+          </a:xfrm>
+          <a:prstGeom prst="rect">
+            <a:avLst/>
+          </a:prstGeom>
+          <a:solidFill>
+            <a:srgbClr val="1B325F"/>
+          </a:solidFill>
+          <a:ln>
+            <a:solidFill>
+              <a:schemeClr val="bg1"/>
+            </a:solidFill>
+          </a:ln>
+        </p:spPr>
+        <p:style>
+          <a:lnRef idx="2">
+            <a:schemeClr val="accent1">
+              <a:shade val="50000"/>
+            </a:schemeClr>
+          </a:lnRef>
+          <a:fillRef idx="1">
+            <a:schemeClr val="accent1"/>
+          </a:fillRef>
+          <a:effectRef idx="0">
+            <a:schemeClr val="accent1"/>
+          </a:effectRef>
+          <a:fontRef idx="minor">
+            <a:schemeClr val="lt1"/>
+          </a:fontRef>
+        </p:style>
+        <p:txBody>
+          <a:bodyPr rtlCol="0" anchor="ctr"/>
+          <a:lstStyle/>
+          <a:p>
+            <a:pPr algn="ctr"/>
+            <a:r>
+              <a:rPr lang="bg-BG" sz="1100" dirty="0" smtClean="0"/>
+              <a:t>Диктуваем елемент</a:t>
+            </a:r>
+          </a:p>
+        </p:txBody>
+      </p:sp>
+      <p:sp>
+        <p:nvSpPr>
+          <p:cNvPr id="10" name="TextBox 9"/>
+          <p:cNvSpPr txBox="1"/>
+          <p:nvPr/>
+        </p:nvSpPr>
+        <p:spPr>
+          <a:xfrm>
+            <a:off x="7696200" y="3429000"/>
+            <a:ext cx="184731" cy="369332"/>
+          </a:xfrm>
+          <a:prstGeom prst="rect">
+            <a:avLst/>
+          </a:prstGeom>
+          <a:noFill/>
+        </p:spPr>
+        <p:txBody>
+          <a:bodyPr wrap="none" rtlCol="0">
+            <a:spAutoFit/>
+          </a:bodyPr>
+          <a:lstStyle/>
+          <a:p>
+            <a:endParaRPr lang="en-US" dirty="0"/>
+          </a:p>
+        </p:txBody>
+      </p:sp>
+      <p:sp>
+        <p:nvSpPr>
+          <p:cNvPr id="11" name="TextBox 10"/>
+          <p:cNvSpPr txBox="1"/>
+          <p:nvPr/>
+        </p:nvSpPr>
+        <p:spPr>
+          <a:xfrm>
+            <a:off x="7696200" y="3429000"/>
+            <a:ext cx="184731" cy="369332"/>
+          </a:xfrm>
+          <a:prstGeom prst="rect">
+            <a:avLst/>
+          </a:prstGeom>
+          <a:noFill/>
+        </p:spPr>
+        <p:txBody>
+          <a:bodyPr wrap="none" rtlCol="0">
+            <a:spAutoFit/>
+          </a:bodyPr>
+          <a:lstStyle/>
+          <a:p>
+            <a:endParaRPr lang="en-US" dirty="0"/>
+          </a:p>
+        </p:txBody>
+      </p:sp>
+      <p:sp>
+        <p:nvSpPr>
+          <p:cNvPr id="12" name="TextBox 11"/>
+          <p:cNvSpPr txBox="1"/>
+          <p:nvPr/>
+        </p:nvSpPr>
+        <p:spPr>
+          <a:xfrm>
+            <a:off x="7696200" y="3429000"/>
+            <a:ext cx="184731" cy="369332"/>
+          </a:xfrm>
+          <a:prstGeom prst="rect">
+            <a:avLst/>
+          </a:prstGeom>
+          <a:noFill/>
+        </p:spPr>
+        <p:txBody>
+          <a:bodyPr wrap="none" rtlCol="0">
+            <a:spAutoFit/>
+          </a:bodyPr>
+          <a:lstStyle/>
+          <a:p>
+            <a:endParaRPr lang="en-US" dirty="0"/>
+          </a:p>
+        </p:txBody>
+      </p:sp>
+      <p:sp>
+        <p:nvSpPr>
+          <p:cNvPr id="13" name="TextBox 12"/>
+          <p:cNvSpPr txBox="1"/>
+          <p:nvPr/>
+        </p:nvSpPr>
+        <p:spPr>
+          <a:xfrm>
+            <a:off x="7696200" y="3429000"/>
+            <a:ext cx="184731" cy="369332"/>
+          </a:xfrm>
+          <a:prstGeom prst="rect">
+            <a:avLst/>
+          </a:prstGeom>
+          <a:noFill/>
+        </p:spPr>
+        <p:txBody>
+          <a:bodyPr wrap="none" rtlCol="0">
+            <a:spAutoFit/>
+          </a:bodyPr>
+          <a:lstStyle/>
+          <a:p>
+            <a:endParaRPr lang="en-US" dirty="0"/>
+          </a:p>
+        </p:txBody>
+      </p:sp>
+    </p:spTree>
+  </p:cSld>
+  <p:clrMapOvr>
+    <a:masterClrMapping/>
+  </p:clrMapOvr>
+  <p:timing>
+    <p:tnLst>
+      <p:par>
+        <p:cTn id="1" dur="indefinite" restart="never" nodeType="tmRoot"/>
+      </p:par>
+    </p:tnLst>
+  </p:timing>
+</p:sld>
+</file>
+
+<file path=ppt/slides/slide12.xml><?xml version="1.0" encoding="utf-8"?>
 <p:sld xmlns:a="http://schemas.openxmlformats.org/drawingml/2006/main" xmlns:r="http://schemas.openxmlformats.org/officeDocument/2006/relationships" xmlns:p="http://schemas.openxmlformats.org/presentationml/2006/main">
   <p:cSld>
     <p:bg>
@@ -13408,7 +13805,7 @@
 </p:sld>
 </file>
 
-<file path=ppt/slides/slide11.xml><?xml version="1.0" encoding="utf-8"?>
+<file path=ppt/slides/slide13.xml><?xml version="1.0" encoding="utf-8"?>
 <p:sld xmlns:a="http://schemas.openxmlformats.org/drawingml/2006/main" xmlns:r="http://schemas.openxmlformats.org/officeDocument/2006/relationships" xmlns:p="http://schemas.openxmlformats.org/presentationml/2006/main">
   <p:cSld>
     <p:bg>
@@ -13486,7 +13883,7 @@
 </p:sld>
 </file>
 
-<file path=ppt/slides/slide12.xml><?xml version="1.0" encoding="utf-8"?>
+<file path=ppt/slides/slide14.xml><?xml version="1.0" encoding="utf-8"?>
 <p:sld xmlns:a="http://schemas.openxmlformats.org/drawingml/2006/main" xmlns:r="http://schemas.openxmlformats.org/officeDocument/2006/relationships" xmlns:p="http://schemas.openxmlformats.org/presentationml/2006/main">
   <p:cSld>
     <p:bg>
@@ -13549,7 +13946,7 @@
 </p:sld>
 </file>
 
-<file path=ppt/slides/slide13.xml><?xml version="1.0" encoding="utf-8"?>
+<file path=ppt/slides/slide15.xml><?xml version="1.0" encoding="utf-8"?>
 <p:sld xmlns:a="http://schemas.openxmlformats.org/drawingml/2006/main" xmlns:r="http://schemas.openxmlformats.org/officeDocument/2006/relationships" xmlns:p="http://schemas.openxmlformats.org/presentationml/2006/main">
   <p:cSld>
     <p:bg>
@@ -13652,237 +14049,6 @@
           </a:p>
         </p:txBody>
       </p:sp>
-      <p:pic>
-        <p:nvPicPr>
-          <p:cNvPr id="7" name="suitingUp.avi">
-            <a:hlinkClick r:id="" action="ppaction://media"/>
-          </p:cNvPr>
-          <p:cNvPicPr>
-            <a:picLocks noRot="1" noChangeAspect="1"/>
-          </p:cNvPicPr>
-          <p:nvPr>
-            <a:videoFile r:link="rId1"/>
-          </p:nvPr>
-        </p:nvPicPr>
-        <p:blipFill>
-          <a:blip r:embed="rId4" cstate="print"/>
-          <a:stretch>
-            <a:fillRect/>
-          </a:stretch>
-        </p:blipFill>
-        <p:spPr>
-          <a:xfrm>
-            <a:off x="2133600" y="1828800"/>
-            <a:ext cx="4991100" cy="4572000"/>
-          </a:xfrm>
-          <a:prstGeom prst="rect">
-            <a:avLst/>
-          </a:prstGeom>
-        </p:spPr>
-      </p:pic>
-    </p:spTree>
-  </p:cSld>
-  <p:clrMapOvr>
-    <a:masterClrMapping/>
-  </p:clrMapOvr>
-  <p:timing>
-    <p:tnLst>
-      <p:par>
-        <p:cTn id="1" dur="indefinite" restart="never" nodeType="tmRoot">
-          <p:childTnLst>
-            <p:seq concurrent="1" nextAc="seek">
-              <p:cTn id="2" restart="whenNotActive" fill="hold" evtFilter="cancelBubble" nodeType="interactiveSeq">
-                <p:stCondLst>
-                  <p:cond evt="onClick" delay="0">
-                    <p:tgtEl>
-                      <p:spTgt spid="7"/>
-                    </p:tgtEl>
-                  </p:cond>
-                </p:stCondLst>
-                <p:endSync evt="end" delay="0">
-                  <p:rtn val="all"/>
-                </p:endSync>
-                <p:childTnLst>
-                  <p:par>
-                    <p:cTn id="3" fill="hold">
-                      <p:stCondLst>
-                        <p:cond delay="0"/>
-                      </p:stCondLst>
-                      <p:childTnLst>
-                        <p:par>
-                          <p:cTn id="4" fill="hold">
-                            <p:stCondLst>
-                              <p:cond delay="0"/>
-                            </p:stCondLst>
-                            <p:childTnLst>
-                              <p:par>
-                                <p:cTn id="5" presetID="2" presetClass="mediacall" presetSubtype="0" fill="hold" nodeType="clickEffect">
-                                  <p:stCondLst>
-                                    <p:cond delay="0"/>
-                                  </p:stCondLst>
-                                  <p:childTnLst>
-                                    <p:cmd type="call" cmd="togglePause">
-                                      <p:cBhvr>
-                                        <p:cTn id="6" dur="1" fill="hold"/>
-                                        <p:tgtEl>
-                                          <p:spTgt spid="7"/>
-                                        </p:tgtEl>
-                                      </p:cBhvr>
-                                    </p:cmd>
-                                  </p:childTnLst>
-                                </p:cTn>
-                              </p:par>
-                            </p:childTnLst>
-                          </p:cTn>
-                        </p:par>
-                      </p:childTnLst>
-                    </p:cTn>
-                  </p:par>
-                </p:childTnLst>
-              </p:cTn>
-              <p:nextCondLst>
-                <p:cond evt="onClick" delay="0">
-                  <p:tgtEl>
-                    <p:spTgt spid="7"/>
-                  </p:tgtEl>
-                </p:cond>
-              </p:nextCondLst>
-            </p:seq>
-            <p:video>
-              <p:cMediaNode>
-                <p:cTn id="7" fill="hold" display="0">
-                  <p:stCondLst>
-                    <p:cond delay="indefinite"/>
-                  </p:stCondLst>
-                  <p:endCondLst>
-                    <p:cond evt="onNext" delay="0">
-                      <p:tgtEl>
-                        <p:sldTgt/>
-                      </p:tgtEl>
-                    </p:cond>
-                    <p:cond evt="onPrev" delay="0">
-                      <p:tgtEl>
-                        <p:sldTgt/>
-                      </p:tgtEl>
-                    </p:cond>
-                  </p:endCondLst>
-                </p:cTn>
-                <p:tgtEl>
-                  <p:spTgt spid="7"/>
-                </p:tgtEl>
-              </p:cMediaNode>
-            </p:video>
-          </p:childTnLst>
-        </p:cTn>
-      </p:par>
-    </p:tnLst>
-  </p:timing>
-</p:sld>
-</file>
-
-<file path=ppt/slides/slide14.xml><?xml version="1.0" encoding="utf-8"?>
-<p:sld xmlns:a="http://schemas.openxmlformats.org/drawingml/2006/main" xmlns:r="http://schemas.openxmlformats.org/officeDocument/2006/relationships" xmlns:p="http://schemas.openxmlformats.org/presentationml/2006/main">
-  <p:cSld>
-    <p:bg>
-      <p:bgPr>
-        <a:solidFill>
-          <a:srgbClr val="1B325F"/>
-        </a:solidFill>
-        <a:effectLst/>
-      </p:bgPr>
-    </p:bg>
-    <p:spTree>
-      <p:nvGrpSpPr>
-        <p:cNvPr id="1" name=""/>
-        <p:cNvGrpSpPr/>
-        <p:nvPr/>
-      </p:nvGrpSpPr>
-      <p:grpSpPr>
-        <a:xfrm>
-          <a:off x="0" y="0"/>
-          <a:ext cx="0" cy="0"/>
-          <a:chOff x="0" y="0"/>
-          <a:chExt cx="0" cy="0"/>
-        </a:xfrm>
-      </p:grpSpPr>
-      <p:sp>
-        <p:nvSpPr>
-          <p:cNvPr id="2" name="Rectangle 1"/>
-          <p:cNvSpPr/>
-          <p:nvPr/>
-        </p:nvSpPr>
-        <p:spPr>
-          <a:xfrm>
-            <a:off x="304800" y="228600"/>
-            <a:ext cx="5527603" cy="1384995"/>
-          </a:xfrm>
-          <a:prstGeom prst="rect">
-            <a:avLst/>
-          </a:prstGeom>
-          <a:noFill/>
-          <a:ln>
-            <a:noFill/>
-          </a:ln>
-        </p:spPr>
-        <p:txBody>
-          <a:bodyPr wrap="none" lIns="91440" tIns="45720" rIns="91440" bIns="45720">
-            <a:spAutoFit/>
-          </a:bodyPr>
-          <a:lstStyle/>
-          <a:p>
-            <a:r>
-              <a:rPr lang="bg-BG" sz="4200" b="1" dirty="0" smtClean="0">
-                <a:ln w="12700">
-                  <a:solidFill>
-                    <a:schemeClr val="tx1">
-                      <a:lumMod val="95000"/>
-                      <a:lumOff val="5000"/>
-                    </a:schemeClr>
-                  </a:solidFill>
-                  <a:prstDash val="solid"/>
-                </a:ln>
-                <a:solidFill>
-                  <a:srgbClr val="9CC4E4"/>
-                </a:solidFill>
-                <a:effectLst>
-                  <a:outerShdw blurRad="41275" dist="20320" dir="1800000" algn="tl" rotWithShape="0">
-                    <a:srgbClr val="000000">
-                      <a:alpha val="40000"/>
-                    </a:srgbClr>
-                  </a:outerShdw>
-                </a:effectLst>
-              </a:rPr>
-              <a:t>Къде е приложим </a:t>
-            </a:r>
-          </a:p>
-          <a:p>
-            <a:r>
-              <a:rPr lang="bg-BG" sz="4200" b="1" dirty="0" smtClean="0">
-                <a:ln w="12700">
-                  <a:solidFill>
-                    <a:schemeClr val="tx1">
-                      <a:lumMod val="95000"/>
-                      <a:lumOff val="5000"/>
-                    </a:schemeClr>
-                  </a:solidFill>
-                  <a:prstDash val="solid"/>
-                </a:ln>
-                <a:solidFill>
-                  <a:srgbClr val="9CC4E4"/>
-                </a:solidFill>
-                <a:effectLst>
-                  <a:outerShdw blurRad="41275" dist="20320" dir="1800000" algn="tl" rotWithShape="0">
-                    <a:srgbClr val="000000">
-                      <a:alpha val="40000"/>
-                    </a:srgbClr>
-                  </a:outerShdw>
-                </a:effectLst>
-              </a:rPr>
-              <a:t>“Модерният иконом”?</a:t>
-            </a:r>
-          </a:p>
-        </p:txBody>
-      </p:sp>
       <p:sp>
         <p:nvSpPr>
           <p:cNvPr id="6" name="TextBox 5"/>
@@ -13905,13 +14071,21 @@
           </a:bodyPr>
           <a:lstStyle/>
           <a:p>
+            <a:pPr>
+              <a:spcAft>
+                <a:spcPts val="200"/>
+              </a:spcAft>
+              <a:tabLst>
+                <a:tab pos="4632325" algn="l"/>
+              </a:tabLst>
+            </a:pPr>
             <a:r>
               <a:rPr lang="bg-BG" sz="3200" dirty="0" smtClean="0">
                 <a:solidFill>
                   <a:srgbClr val="F26C4F"/>
                 </a:solidFill>
               </a:rPr>
-              <a:t>Практически – навсякъде.</a:t>
+              <a:t>Практически – навсякъде</a:t>
             </a:r>
             <a:endParaRPr lang="bg-BG" sz="2400" dirty="0" smtClean="0">
               <a:solidFill>
@@ -13972,7 +14146,7 @@
                   <a:srgbClr val="E9F2F9"/>
                 </a:solidFill>
               </a:rPr>
-              <a:t> стартиране на програми</a:t>
+              <a:t> стартиране на програми и т.н.</a:t>
             </a:r>
           </a:p>
           <a:p>
@@ -14014,7 +14188,23 @@
                   <a:srgbClr val="E9F2F9"/>
                 </a:solidFill>
               </a:rPr>
-              <a:t> Управление на домашните уреди</a:t>
+              <a:t> Управление на домашните уреди </a:t>
+            </a:r>
+            <a:r>
+              <a:rPr lang="en-US" dirty="0" smtClean="0">
+                <a:solidFill>
+                  <a:srgbClr val="E9F2F9"/>
+                </a:solidFill>
+              </a:rPr>
+              <a:t>(TV, </a:t>
+            </a:r>
+            <a:r>
+              <a:rPr lang="bg-BG" dirty="0" smtClean="0">
+                <a:solidFill>
+                  <a:srgbClr val="E9F2F9"/>
+                </a:solidFill>
+              </a:rPr>
+              <a:t>климатик и т.н.)</a:t>
             </a:r>
           </a:p>
           <a:p>
@@ -14124,23 +14314,7 @@
                   <a:srgbClr val="E9F2F9"/>
                 </a:solidFill>
               </a:rPr>
-              <a:t>Винаги може да напишете </a:t>
-            </a:r>
-            <a:r>
-              <a:rPr lang="bg-BG" sz="3600" dirty="0" smtClean="0">
-                <a:solidFill>
-                  <a:srgbClr val="E9F2F9"/>
-                </a:solidFill>
-              </a:rPr>
-              <a:t>своя собствена добавка за </a:t>
-            </a:r>
-            <a:r>
-              <a:rPr lang="bg-BG" sz="3600" dirty="0" smtClean="0">
-                <a:solidFill>
-                  <a:srgbClr val="E9F2F9"/>
-                </a:solidFill>
-              </a:rPr>
-              <a:t>управление на каквото пожелаете!</a:t>
+              <a:t>Винаги може да напишете своя собствена добавка за управление на каквото пожелаете!</a:t>
             </a:r>
             <a:endParaRPr lang="en-US" sz="3600" dirty="0">
               <a:solidFill>
@@ -14150,159 +14324,6 @@
           </a:p>
         </p:txBody>
       </p:sp>
-    </p:spTree>
-  </p:cSld>
-  <p:clrMapOvr>
-    <a:masterClrMapping/>
-  </p:clrMapOvr>
-  <p:timing>
-    <p:tnLst>
-      <p:par>
-        <p:cTn id="1" dur="indefinite" restart="never" nodeType="tmRoot"/>
-      </p:par>
-    </p:tnLst>
-  </p:timing>
-</p:sld>
-</file>
-
-<file path=ppt/slides/slide15.xml><?xml version="1.0" encoding="utf-8"?>
-<p:sld xmlns:a="http://schemas.openxmlformats.org/drawingml/2006/main" xmlns:r="http://schemas.openxmlformats.org/officeDocument/2006/relationships" xmlns:p="http://schemas.openxmlformats.org/presentationml/2006/main">
-  <p:cSld>
-    <p:bg>
-      <p:bgPr>
-        <a:solidFill>
-          <a:srgbClr val="1B325F"/>
-        </a:solidFill>
-        <a:effectLst/>
-      </p:bgPr>
-    </p:bg>
-    <p:spTree>
-      <p:nvGrpSpPr>
-        <p:cNvPr id="1" name=""/>
-        <p:cNvGrpSpPr/>
-        <p:nvPr/>
-      </p:nvGrpSpPr>
-      <p:grpSpPr>
-        <a:xfrm>
-          <a:off x="0" y="0"/>
-          <a:ext cx="0" cy="0"/>
-          <a:chOff x="0" y="0"/>
-          <a:chExt cx="0" cy="0"/>
-        </a:xfrm>
-      </p:grpSpPr>
-      <p:sp>
-        <p:nvSpPr>
-          <p:cNvPr id="2" name="Rectangle 1"/>
-          <p:cNvSpPr/>
-          <p:nvPr/>
-        </p:nvSpPr>
-        <p:spPr>
-          <a:xfrm>
-            <a:off x="304800" y="228600"/>
-            <a:ext cx="5481950" cy="738664"/>
-          </a:xfrm>
-          <a:prstGeom prst="rect">
-            <a:avLst/>
-          </a:prstGeom>
-          <a:noFill/>
-          <a:ln>
-            <a:noFill/>
-          </a:ln>
-        </p:spPr>
-        <p:txBody>
-          <a:bodyPr wrap="none" lIns="91440" tIns="45720" rIns="91440" bIns="45720">
-            <a:spAutoFit/>
-          </a:bodyPr>
-          <a:lstStyle/>
-          <a:p>
-            <a:r>
-              <a:rPr lang="bg-BG" sz="4200" b="1" dirty="0" smtClean="0">
-                <a:ln w="12700">
-                  <a:solidFill>
-                    <a:schemeClr val="tx1">
-                      <a:lumMod val="95000"/>
-                      <a:lumOff val="5000"/>
-                    </a:schemeClr>
-                  </a:solidFill>
-                  <a:prstDash val="solid"/>
-                </a:ln>
-                <a:solidFill>
-                  <a:srgbClr val="9CC4E4"/>
-                </a:solidFill>
-                <a:effectLst>
-                  <a:outerShdw blurRad="41275" dist="20320" dir="1800000" algn="tl" rotWithShape="0">
-                    <a:srgbClr val="000000">
-                      <a:alpha val="40000"/>
-                    </a:srgbClr>
-                  </a:outerShdw>
-                </a:effectLst>
-              </a:rPr>
-              <a:t>Как се прави </a:t>
-            </a:r>
-            <a:r>
-              <a:rPr lang="bg-BG" sz="4200" b="1" dirty="0" smtClean="0">
-                <a:ln w="12700">
-                  <a:solidFill>
-                    <a:schemeClr val="tx1">
-                      <a:lumMod val="95000"/>
-                      <a:lumOff val="5000"/>
-                    </a:schemeClr>
-                  </a:solidFill>
-                  <a:prstDash val="solid"/>
-                </a:ln>
-                <a:solidFill>
-                  <a:srgbClr val="9CC4E4"/>
-                </a:solidFill>
-                <a:effectLst>
-                  <a:outerShdw blurRad="41275" dist="20320" dir="1800000" algn="tl" rotWithShape="0">
-                    <a:srgbClr val="000000">
-                      <a:alpha val="40000"/>
-                    </a:srgbClr>
-                  </a:outerShdw>
-                </a:effectLst>
-              </a:rPr>
-              <a:t>добавка?</a:t>
-            </a:r>
-            <a:endParaRPr lang="bg-BG" sz="4200" b="1" dirty="0" smtClean="0">
-              <a:ln w="12700">
-                <a:solidFill>
-                  <a:schemeClr val="tx1">
-                    <a:lumMod val="95000"/>
-                    <a:lumOff val="5000"/>
-                  </a:schemeClr>
-                </a:solidFill>
-                <a:prstDash val="solid"/>
-              </a:ln>
-              <a:solidFill>
-                <a:srgbClr val="9CC4E4"/>
-              </a:solidFill>
-              <a:effectLst>
-                <a:outerShdw blurRad="41275" dist="20320" dir="1800000" algn="tl" rotWithShape="0">
-                  <a:srgbClr val="000000">
-                    <a:alpha val="40000"/>
-                  </a:srgbClr>
-                </a:outerShdw>
-              </a:effectLst>
-            </a:endParaRPr>
-          </a:p>
-        </p:txBody>
-      </p:sp>
-      <p:graphicFrame>
-        <p:nvGraphicFramePr>
-          <p:cNvPr id="5" name="Diagram 4"/>
-          <p:cNvGraphicFramePr/>
-          <p:nvPr/>
-        </p:nvGraphicFramePr>
-        <p:xfrm>
-          <a:off x="0" y="838200"/>
-          <a:ext cx="9144000" cy="6019800"/>
-        </p:xfrm>
-        <a:graphic>
-          <a:graphicData uri="http://schemas.openxmlformats.org/drawingml/2006/diagram">
-            <dgm:relIds xmlns:dgm="http://schemas.openxmlformats.org/drawingml/2006/diagram" xmlns:r="http://schemas.openxmlformats.org/officeDocument/2006/relationships" r:dm="rId2" r:lo="rId3" r:qs="rId4" r:cs="rId5"/>
-          </a:graphicData>
-        </a:graphic>
-      </p:graphicFrame>
     </p:spTree>
   </p:cSld>
   <p:clrMapOvr>
@@ -14343,32 +14364,6 @@
           <a:chExt cx="0" cy="0"/>
         </a:xfrm>
       </p:grpSpPr>
-      <p:pic>
-        <p:nvPicPr>
-          <p:cNvPr id="1026" name="Picture 2" descr="E:\Projects\ModernSteward\Presentation\images\256px.png"/>
-          <p:cNvPicPr>
-            <a:picLocks noChangeAspect="1" noChangeArrowheads="1"/>
-          </p:cNvPicPr>
-          <p:nvPr/>
-        </p:nvPicPr>
-        <p:blipFill>
-          <a:blip r:embed="rId2" cstate="print"/>
-          <a:srcRect/>
-          <a:stretch>
-            <a:fillRect/>
-          </a:stretch>
-        </p:blipFill>
-        <p:spPr bwMode="auto">
-          <a:xfrm>
-            <a:off x="2971800" y="2438400"/>
-            <a:ext cx="3251200" cy="3251200"/>
-          </a:xfrm>
-          <a:prstGeom prst="rect">
-            <a:avLst/>
-          </a:prstGeom>
-          <a:noFill/>
-        </p:spPr>
-      </p:pic>
       <p:sp>
         <p:nvSpPr>
           <p:cNvPr id="4" name="Rectangle 3"/>
@@ -14377,8 +14372,8 @@
         </p:nvSpPr>
         <p:spPr>
           <a:xfrm>
-            <a:off x="623808" y="1896070"/>
-            <a:ext cx="8032968" cy="923330"/>
+            <a:off x="1417098" y="990600"/>
+            <a:ext cx="6309804" cy="1754326"/>
           </a:xfrm>
           <a:prstGeom prst="rect">
             <a:avLst/>
@@ -14394,8 +14389,9 @@
           </a:bodyPr>
           <a:lstStyle/>
           <a:p>
+            <a:pPr algn="ctr"/>
             <a:r>
-              <a:rPr lang="ru-RU" sz="5400" b="1" dirty="0" smtClean="0">
+              <a:rPr lang="de-DE" sz="5400" b="1" dirty="0" smtClean="0">
                 <a:ln w="12700">
                   <a:solidFill>
                     <a:schemeClr val="tx1">
@@ -14416,11 +14412,129 @@
                   </a:outerShdw>
                 </a:effectLst>
               </a:rPr>
-              <a:t>И на вас ли ви се пие чай?</a:t>
+              <a:t>A </a:t>
             </a:r>
+            <a:r>
+              <a:rPr lang="bg-BG" sz="5400" b="1" dirty="0" smtClean="0">
+                <a:ln w="12700">
+                  <a:solidFill>
+                    <a:schemeClr val="tx1">
+                      <a:lumMod val="95000"/>
+                      <a:lumOff val="5000"/>
+                    </a:schemeClr>
+                  </a:solidFill>
+                  <a:prstDash val="solid"/>
+                </a:ln>
+                <a:solidFill>
+                  <a:srgbClr val="9CC4E4"/>
+                </a:solidFill>
+                <a:effectLst>
+                  <a:outerShdw blurRad="41275" dist="20320" dir="1800000" algn="tl" rotWithShape="0">
+                    <a:srgbClr val="000000">
+                      <a:alpha val="40000"/>
+                    </a:srgbClr>
+                  </a:outerShdw>
+                </a:effectLst>
+              </a:rPr>
+              <a:t>какво ли дават по </a:t>
+            </a:r>
+            <a:br>
+              <a:rPr lang="bg-BG" sz="5400" b="1" dirty="0" smtClean="0">
+                <a:ln w="12700">
+                  <a:solidFill>
+                    <a:schemeClr val="tx1">
+                      <a:lumMod val="95000"/>
+                      <a:lumOff val="5000"/>
+                    </a:schemeClr>
+                  </a:solidFill>
+                  <a:prstDash val="solid"/>
+                </a:ln>
+                <a:solidFill>
+                  <a:srgbClr val="9CC4E4"/>
+                </a:solidFill>
+                <a:effectLst>
+                  <a:outerShdw blurRad="41275" dist="20320" dir="1800000" algn="tl" rotWithShape="0">
+                    <a:srgbClr val="000000">
+                      <a:alpha val="40000"/>
+                    </a:srgbClr>
+                  </a:outerShdw>
+                </a:effectLst>
+              </a:rPr>
+            </a:br>
+            <a:r>
+              <a:rPr lang="bg-BG" sz="5400" b="1" dirty="0" smtClean="0">
+                <a:ln w="12700">
+                  <a:solidFill>
+                    <a:schemeClr val="tx1">
+                      <a:lumMod val="95000"/>
+                      <a:lumOff val="5000"/>
+                    </a:schemeClr>
+                  </a:solidFill>
+                  <a:prstDash val="solid"/>
+                </a:ln>
+                <a:solidFill>
+                  <a:srgbClr val="9CC4E4"/>
+                </a:solidFill>
+                <a:effectLst>
+                  <a:outerShdw blurRad="41275" dist="20320" dir="1800000" algn="tl" rotWithShape="0">
+                    <a:srgbClr val="000000">
+                      <a:alpha val="40000"/>
+                    </a:srgbClr>
+                  </a:outerShdw>
+                </a:effectLst>
+              </a:rPr>
+              <a:t>телевизията?</a:t>
+            </a:r>
+            <a:endParaRPr lang="ru-RU" sz="5400" b="1" dirty="0" smtClean="0">
+              <a:ln w="12700">
+                <a:solidFill>
+                  <a:schemeClr val="tx1">
+                    <a:lumMod val="95000"/>
+                    <a:lumOff val="5000"/>
+                  </a:schemeClr>
+                </a:solidFill>
+                <a:prstDash val="solid"/>
+              </a:ln>
+              <a:solidFill>
+                <a:srgbClr val="9CC4E4"/>
+              </a:solidFill>
+              <a:effectLst>
+                <a:outerShdw blurRad="41275" dist="20320" dir="1800000" algn="tl" rotWithShape="0">
+                  <a:srgbClr val="000000">
+                    <a:alpha val="40000"/>
+                  </a:srgbClr>
+                </a:outerShdw>
+              </a:effectLst>
+            </a:endParaRPr>
           </a:p>
         </p:txBody>
       </p:sp>
+      <p:pic>
+        <p:nvPicPr>
+          <p:cNvPr id="2" name="Picture 2" descr="http://jesslong3.files.wordpress.com/2010/09/fuzzy-tv.jpg"/>
+          <p:cNvPicPr>
+            <a:picLocks noChangeAspect="1" noChangeArrowheads="1"/>
+          </p:cNvPicPr>
+          <p:nvPr/>
+        </p:nvPicPr>
+        <p:blipFill>
+          <a:blip r:embed="rId2" cstate="print"/>
+          <a:srcRect/>
+          <a:stretch>
+            <a:fillRect/>
+          </a:stretch>
+        </p:blipFill>
+        <p:spPr bwMode="auto">
+          <a:xfrm>
+            <a:off x="2781300" y="2895600"/>
+            <a:ext cx="3581400" cy="3129248"/>
+          </a:xfrm>
+          <a:prstGeom prst="rect">
+            <a:avLst/>
+          </a:prstGeom>
+          <a:noFill/>
+        </p:spPr>
+      </p:pic>
     </p:spTree>
   </p:cSld>
   <p:clrMapOvr>
@@ -15631,6 +15745,126 @@
           </a:prstGeom>
         </p:spPr>
       </p:pic>
+      <p:sp>
+        <p:nvSpPr>
+          <p:cNvPr id="4" name="TextBox 3"/>
+          <p:cNvSpPr txBox="1"/>
+          <p:nvPr/>
+        </p:nvSpPr>
+        <p:spPr>
+          <a:xfrm>
+            <a:off x="533400" y="3581400"/>
+            <a:ext cx="7924800" cy="2677656"/>
+          </a:xfrm>
+          <a:prstGeom prst="rect">
+            <a:avLst/>
+          </a:prstGeom>
+          <a:noFill/>
+        </p:spPr>
+        <p:txBody>
+          <a:bodyPr wrap="square" rtlCol="0">
+            <a:spAutoFit/>
+          </a:bodyPr>
+          <a:lstStyle/>
+          <a:p>
+            <a:pPr>
+              <a:buFont typeface="Arial" pitchFamily="34" charset="0"/>
+              <a:buChar char="•"/>
+            </a:pPr>
+            <a:r>
+              <a:rPr lang="en-US" sz="2400" dirty="0" smtClean="0">
+                <a:solidFill>
+                  <a:srgbClr val="F26C4F"/>
+                </a:solidFill>
+              </a:rPr>
+              <a:t> </a:t>
+            </a:r>
+            <a:r>
+              <a:rPr lang="bg-BG" sz="2400" dirty="0" smtClean="0">
+                <a:solidFill>
+                  <a:srgbClr val="F26C4F"/>
+                </a:solidFill>
+              </a:rPr>
+              <a:t>Гласови команди</a:t>
+            </a:r>
+          </a:p>
+          <a:p>
+            <a:pPr>
+              <a:buFont typeface="Arial" pitchFamily="34" charset="0"/>
+              <a:buChar char="•"/>
+            </a:pPr>
+            <a:r>
+              <a:rPr lang="bg-BG" sz="2400" dirty="0" smtClean="0">
+                <a:solidFill>
+                  <a:srgbClr val="F26C4F"/>
+                </a:solidFill>
+              </a:rPr>
+              <a:t> Отворен код</a:t>
+            </a:r>
+          </a:p>
+          <a:p>
+            <a:pPr>
+              <a:buFont typeface="Arial" pitchFamily="34" charset="0"/>
+              <a:buChar char="•"/>
+            </a:pPr>
+            <a:r>
+              <a:rPr lang="bg-BG" sz="2400" dirty="0" smtClean="0">
+                <a:solidFill>
+                  <a:srgbClr val="F26C4F"/>
+                </a:solidFill>
+              </a:rPr>
+              <a:t> Лесен за употреба</a:t>
+            </a:r>
+            <a:endParaRPr lang="en-US" sz="2400" dirty="0" smtClean="0">
+              <a:solidFill>
+                <a:srgbClr val="F26C4F"/>
+              </a:solidFill>
+            </a:endParaRPr>
+          </a:p>
+          <a:p>
+            <a:pPr>
+              <a:buFont typeface="Arial" pitchFamily="34" charset="0"/>
+              <a:buChar char="•"/>
+            </a:pPr>
+            <a:r>
+              <a:rPr lang="bg-BG" sz="2400" dirty="0" smtClean="0">
+                <a:solidFill>
+                  <a:srgbClr val="F26C4F"/>
+                </a:solidFill>
+              </a:rPr>
+              <a:t> Управлява практически всичко, което е свързано с компютър</a:t>
+            </a:r>
+          </a:p>
+          <a:p>
+            <a:pPr>
+              <a:buFont typeface="Arial" pitchFamily="34" charset="0"/>
+              <a:buChar char="•"/>
+            </a:pPr>
+            <a:r>
+              <a:rPr lang="bg-BG" sz="2400" dirty="0" smtClean="0">
+                <a:solidFill>
+                  <a:srgbClr val="F26C4F"/>
+                </a:solidFill>
+              </a:rPr>
+              <a:t> Безплатен!</a:t>
+            </a:r>
+          </a:p>
+          <a:p>
+            <a:pPr>
+              <a:buFont typeface="Arial" pitchFamily="34" charset="0"/>
+              <a:buChar char="•"/>
+            </a:pPr>
+            <a:r>
+              <a:rPr lang="bg-BG" sz="2400" dirty="0" smtClean="0">
+                <a:solidFill>
+                  <a:srgbClr val="F26C4F"/>
+                </a:solidFill>
+              </a:rPr>
+              <a:t> Вече е в употреба</a:t>
+            </a:r>
+          </a:p>
+        </p:txBody>
+      </p:sp>
     </p:spTree>
   </p:cSld>
   <p:clrMapOvr>
@@ -15731,122 +15965,6 @@
 </file>
 
 <file path=ppt/slides/slide20.xml><?xml version="1.0" encoding="utf-8"?>
-<p:sld xmlns:a="http://schemas.openxmlformats.org/drawingml/2006/main" xmlns:r="http://schemas.openxmlformats.org/officeDocument/2006/relationships" xmlns:p="http://schemas.openxmlformats.org/presentationml/2006/main">
-  <p:cSld>
-    <p:bg>
-      <p:bgPr>
-        <a:solidFill>
-          <a:srgbClr val="1B325F"/>
-        </a:solidFill>
-        <a:effectLst/>
-      </p:bgPr>
-    </p:bg>
-    <p:spTree>
-      <p:nvGrpSpPr>
-        <p:cNvPr id="1" name=""/>
-        <p:cNvGrpSpPr/>
-        <p:nvPr/>
-      </p:nvGrpSpPr>
-      <p:grpSpPr>
-        <a:xfrm>
-          <a:off x="0" y="0"/>
-          <a:ext cx="0" cy="0"/>
-          <a:chOff x="0" y="0"/>
-          <a:chExt cx="0" cy="0"/>
-        </a:xfrm>
-      </p:grpSpPr>
-      <p:pic>
-        <p:nvPicPr>
-          <p:cNvPr id="2" name="Picture 1" descr="question.png"/>
-          <p:cNvPicPr>
-            <a:picLocks noChangeAspect="1"/>
-          </p:cNvPicPr>
-          <p:nvPr/>
-        </p:nvPicPr>
-        <p:blipFill>
-          <a:blip r:embed="rId2" cstate="print"/>
-          <a:stretch>
-            <a:fillRect/>
-          </a:stretch>
-        </p:blipFill>
-        <p:spPr>
-          <a:xfrm>
-            <a:off x="3352800" y="2209800"/>
-            <a:ext cx="2438400" cy="2438400"/>
-          </a:xfrm>
-          <a:prstGeom prst="rect">
-            <a:avLst/>
-          </a:prstGeom>
-        </p:spPr>
-      </p:pic>
-      <p:sp>
-        <p:nvSpPr>
-          <p:cNvPr id="3" name="Rectangle 2"/>
-          <p:cNvSpPr/>
-          <p:nvPr/>
-        </p:nvSpPr>
-        <p:spPr>
-          <a:xfrm>
-            <a:off x="2721243" y="1066800"/>
-            <a:ext cx="3704219" cy="1107996"/>
-          </a:xfrm>
-          <a:prstGeom prst="rect">
-            <a:avLst/>
-          </a:prstGeom>
-          <a:noFill/>
-          <a:ln>
-            <a:noFill/>
-          </a:ln>
-        </p:spPr>
-        <p:txBody>
-          <a:bodyPr wrap="none" lIns="91440" tIns="45720" rIns="91440" bIns="45720">
-            <a:spAutoFit/>
-          </a:bodyPr>
-          <a:lstStyle/>
-          <a:p>
-            <a:r>
-              <a:rPr lang="bg-BG" sz="6600" b="1" dirty="0" smtClean="0">
-                <a:ln w="12700">
-                  <a:solidFill>
-                    <a:schemeClr val="tx1">
-                      <a:lumMod val="95000"/>
-                      <a:lumOff val="5000"/>
-                    </a:schemeClr>
-                  </a:solidFill>
-                  <a:prstDash val="solid"/>
-                </a:ln>
-                <a:solidFill>
-                  <a:srgbClr val="9CC4E4"/>
-                </a:solidFill>
-                <a:effectLst>
-                  <a:outerShdw blurRad="41275" dist="20320" dir="1800000" algn="tl" rotWithShape="0">
-                    <a:srgbClr val="000000">
-                      <a:alpha val="40000"/>
-                    </a:srgbClr>
-                  </a:outerShdw>
-                </a:effectLst>
-              </a:rPr>
-              <a:t>Въпроси?</a:t>
-            </a:r>
-          </a:p>
-        </p:txBody>
-      </p:sp>
-    </p:spTree>
-  </p:cSld>
-  <p:clrMapOvr>
-    <a:masterClrMapping/>
-  </p:clrMapOvr>
-  <p:timing>
-    <p:tnLst>
-      <p:par>
-        <p:cTn id="1" dur="indefinite" restart="never" nodeType="tmRoot"/>
-      </p:par>
-    </p:tnLst>
-  </p:timing>
-</p:sld>
-</file>
-
-<file path=ppt/slides/slide21.xml><?xml version="1.0" encoding="utf-8"?>
 <p:sld xmlns:a="http://schemas.openxmlformats.org/drawingml/2006/main" xmlns:r="http://schemas.openxmlformats.org/officeDocument/2006/relationships" xmlns:p="http://schemas.openxmlformats.org/presentationml/2006/main">
   <p:cSld>
     <p:bg>
@@ -17480,14 +17598,6 @@
               </a:rPr>
               <a:t>Коя добавка е активирана</a:t>
             </a:r>
-            <a:r>
-              <a:rPr lang="bg-BG" sz="1600" dirty="0" smtClean="0">
-                <a:solidFill>
-                  <a:srgbClr val="E9F2F9"/>
-                </a:solidFill>
-              </a:rPr>
-              <a:t/>
-            </a:r>
             <a:br>
               <a:rPr lang="bg-BG" sz="1600" dirty="0" smtClean="0">
                 <a:solidFill>
@@ -17557,15 +17667,7 @@
                   <a:srgbClr val="E9F2F9"/>
                 </a:solidFill>
               </a:rPr>
-              <a:t>Задейства </a:t>
-            </a:r>
-            <a:r>
-              <a:rPr lang="bg-BG" dirty="0" smtClean="0">
-                <a:solidFill>
-                  <a:srgbClr val="E9F2F9"/>
-                </a:solidFill>
-              </a:rPr>
-              <a:t>добавката</a:t>
+              <a:t>Задейства добавката</a:t>
             </a:r>
             <a:endParaRPr lang="en-US" dirty="0">
               <a:solidFill>
@@ -17697,7 +17799,7 @@
         <p:spPr>
           <a:xfrm>
             <a:off x="304800" y="228600"/>
-            <a:ext cx="5243038" cy="738664"/>
+            <a:ext cx="5481950" cy="738664"/>
           </a:xfrm>
           <a:prstGeom prst="rect">
             <a:avLst/>
@@ -17735,20 +17837,20 @@
                   </a:outerShdw>
                 </a:effectLst>
               </a:rPr>
-              <a:t>Какво е граматиката?</a:t>
+              <a:t>Как се прави добавка?</a:t>
             </a:r>
           </a:p>
         </p:txBody>
       </p:sp>
       <p:graphicFrame>
         <p:nvGraphicFramePr>
-          <p:cNvPr id="4" name="Diagram 3"/>
+          <p:cNvPr id="5" name="Diagram 4"/>
           <p:cNvGraphicFramePr/>
           <p:nvPr/>
         </p:nvGraphicFramePr>
         <p:xfrm>
-          <a:off x="92439" y="914400"/>
-          <a:ext cx="8915400" cy="5867400"/>
+          <a:off x="0" y="838200"/>
+          <a:ext cx="9144000" cy="6019800"/>
         </p:xfrm>
         <a:graphic>
           <a:graphicData uri="http://schemas.openxmlformats.org/drawingml/2006/diagram">
@@ -17756,260 +17858,6 @@
           </a:graphicData>
         </a:graphic>
       </p:graphicFrame>
-      <p:sp>
-        <p:nvSpPr>
-          <p:cNvPr id="5" name="Rectangle 4"/>
-          <p:cNvSpPr/>
-          <p:nvPr/>
-        </p:nvSpPr>
-        <p:spPr>
-          <a:xfrm>
-            <a:off x="7315200" y="228600"/>
-            <a:ext cx="1600200" cy="304800"/>
-          </a:xfrm>
-          <a:prstGeom prst="rect">
-            <a:avLst/>
-          </a:prstGeom>
-          <a:ln>
-            <a:solidFill>
-              <a:schemeClr val="bg1"/>
-            </a:solidFill>
-          </a:ln>
-        </p:spPr>
-        <p:style>
-          <a:lnRef idx="2">
-            <a:schemeClr val="accent1">
-              <a:shade val="50000"/>
-            </a:schemeClr>
-          </a:lnRef>
-          <a:fillRef idx="1">
-            <a:schemeClr val="accent1"/>
-          </a:fillRef>
-          <a:effectRef idx="0">
-            <a:schemeClr val="accent1"/>
-          </a:effectRef>
-          <a:fontRef idx="minor">
-            <a:schemeClr val="lt1"/>
-          </a:fontRef>
-        </p:style>
-        <p:txBody>
-          <a:bodyPr rtlCol="0" anchor="ctr"/>
-          <a:lstStyle/>
-          <a:p>
-            <a:pPr algn="ctr"/>
-            <a:r>
-              <a:rPr lang="bg-BG" sz="1100" dirty="0" smtClean="0"/>
-              <a:t>Задължителен елемент</a:t>
-            </a:r>
-          </a:p>
-        </p:txBody>
-      </p:sp>
-      <p:sp>
-        <p:nvSpPr>
-          <p:cNvPr id="6" name="Rectangle 5"/>
-          <p:cNvSpPr/>
-          <p:nvPr/>
-        </p:nvSpPr>
-        <p:spPr>
-          <a:xfrm>
-            <a:off x="7315200" y="609600"/>
-            <a:ext cx="1600200" cy="304800"/>
-          </a:xfrm>
-          <a:prstGeom prst="rect">
-            <a:avLst/>
-          </a:prstGeom>
-          <a:solidFill>
-            <a:srgbClr val="9CC4E4"/>
-          </a:solidFill>
-          <a:ln>
-            <a:solidFill>
-              <a:schemeClr val="bg1"/>
-            </a:solidFill>
-          </a:ln>
-        </p:spPr>
-        <p:style>
-          <a:lnRef idx="2">
-            <a:schemeClr val="accent1">
-              <a:shade val="50000"/>
-            </a:schemeClr>
-          </a:lnRef>
-          <a:fillRef idx="1">
-            <a:schemeClr val="accent1"/>
-          </a:fillRef>
-          <a:effectRef idx="0">
-            <a:schemeClr val="accent1"/>
-          </a:effectRef>
-          <a:fontRef idx="minor">
-            <a:schemeClr val="lt1"/>
-          </a:fontRef>
-        </p:style>
-        <p:txBody>
-          <a:bodyPr rtlCol="0" anchor="ctr"/>
-          <a:lstStyle/>
-          <a:p>
-            <a:pPr algn="ctr"/>
-            <a:r>
-              <a:rPr lang="bg-BG" sz="1100" dirty="0" smtClean="0"/>
-              <a:t>Избираем елемент</a:t>
-            </a:r>
-          </a:p>
-        </p:txBody>
-      </p:sp>
-      <p:sp>
-        <p:nvSpPr>
-          <p:cNvPr id="7" name="Rectangle 6"/>
-          <p:cNvSpPr/>
-          <p:nvPr/>
-        </p:nvSpPr>
-        <p:spPr>
-          <a:xfrm>
-            <a:off x="7315200" y="990600"/>
-            <a:ext cx="1600200" cy="304800"/>
-          </a:xfrm>
-          <a:prstGeom prst="rect">
-            <a:avLst/>
-          </a:prstGeom>
-          <a:solidFill>
-            <a:srgbClr val="1B325F"/>
-          </a:solidFill>
-          <a:ln>
-            <a:solidFill>
-              <a:schemeClr val="bg1"/>
-            </a:solidFill>
-          </a:ln>
-        </p:spPr>
-        <p:style>
-          <a:lnRef idx="2">
-            <a:schemeClr val="accent1">
-              <a:shade val="50000"/>
-            </a:schemeClr>
-          </a:lnRef>
-          <a:fillRef idx="1">
-            <a:schemeClr val="accent1"/>
-          </a:fillRef>
-          <a:effectRef idx="0">
-            <a:schemeClr val="accent1"/>
-          </a:effectRef>
-          <a:fontRef idx="minor">
-            <a:schemeClr val="lt1"/>
-          </a:fontRef>
-        </p:style>
-        <p:txBody>
-          <a:bodyPr rtlCol="0" anchor="ctr"/>
-          <a:lstStyle/>
-          <a:p>
-            <a:pPr algn="ctr"/>
-            <a:r>
-              <a:rPr lang="bg-BG" sz="1100" dirty="0" smtClean="0"/>
-              <a:t>Диктуваем елемент</a:t>
-            </a:r>
-          </a:p>
-        </p:txBody>
-      </p:sp>
-      <p:sp>
-        <p:nvSpPr>
-          <p:cNvPr id="10" name="TextBox 9"/>
-          <p:cNvSpPr txBox="1"/>
-          <p:nvPr/>
-        </p:nvSpPr>
-        <p:spPr>
-          <a:xfrm>
-            <a:off x="7696200" y="3429000"/>
-            <a:ext cx="184731" cy="369332"/>
-          </a:xfrm>
-          <a:prstGeom prst="rect">
-            <a:avLst/>
-          </a:prstGeom>
-          <a:noFill/>
-        </p:spPr>
-        <p:txBody>
-          <a:bodyPr wrap="none" rtlCol="0">
-            <a:spAutoFit/>
-          </a:bodyPr>
-          <a:lstStyle/>
-          <a:p>
-            <a:endParaRPr lang="en-US" dirty="0"/>
-          </a:p>
-        </p:txBody>
-      </p:sp>
-      <p:sp>
-        <p:nvSpPr>
-          <p:cNvPr id="11" name="TextBox 10"/>
-          <p:cNvSpPr txBox="1"/>
-          <p:nvPr/>
-        </p:nvSpPr>
-        <p:spPr>
-          <a:xfrm>
-            <a:off x="7696200" y="3429000"/>
-            <a:ext cx="184731" cy="369332"/>
-          </a:xfrm>
-          <a:prstGeom prst="rect">
-            <a:avLst/>
-          </a:prstGeom>
-          <a:noFill/>
-        </p:spPr>
-        <p:txBody>
-          <a:bodyPr wrap="none" rtlCol="0">
-            <a:spAutoFit/>
-          </a:bodyPr>
-          <a:lstStyle/>
-          <a:p>
-            <a:endParaRPr lang="en-US" dirty="0"/>
-          </a:p>
-        </p:txBody>
-      </p:sp>
-      <p:sp>
-        <p:nvSpPr>
-          <p:cNvPr id="12" name="TextBox 11"/>
-          <p:cNvSpPr txBox="1"/>
-          <p:nvPr/>
-        </p:nvSpPr>
-        <p:spPr>
-          <a:xfrm>
-            <a:off x="7696200" y="3429000"/>
-            <a:ext cx="184731" cy="369332"/>
-          </a:xfrm>
-          <a:prstGeom prst="rect">
-            <a:avLst/>
-          </a:prstGeom>
-          <a:noFill/>
-        </p:spPr>
-        <p:txBody>
-          <a:bodyPr wrap="none" rtlCol="0">
-            <a:spAutoFit/>
-          </a:bodyPr>
-          <a:lstStyle/>
-          <a:p>
-            <a:endParaRPr lang="en-US" dirty="0"/>
-          </a:p>
-        </p:txBody>
-      </p:sp>
-      <p:sp>
-        <p:nvSpPr>
-          <p:cNvPr id="13" name="TextBox 12"/>
-          <p:cNvSpPr txBox="1"/>
-          <p:nvPr/>
-        </p:nvSpPr>
-        <p:spPr>
-          <a:xfrm>
-            <a:off x="7696200" y="3429000"/>
-            <a:ext cx="184731" cy="369332"/>
-          </a:xfrm>
-          <a:prstGeom prst="rect">
-            <a:avLst/>
-          </a:prstGeom>
-          <a:noFill/>
-        </p:spPr>
-        <p:txBody>
-          <a:bodyPr wrap="none" rtlCol="0">
-            <a:spAutoFit/>
-          </a:bodyPr>
-          <a:lstStyle/>
-          <a:p>
-            <a:endParaRPr lang="en-US" dirty="0"/>
-          </a:p>
-        </p:txBody>
-      </p:sp>
     </p:spTree>
   </p:cSld>
   <p:clrMapOvr>

</xml_diff>